<commit_message>
Updated week 11 java code implementations and presentation
</commit_message>
<xml_diff>
--- a/week_11/Threads.pptx
+++ b/week_11/Threads.pptx
@@ -5,19 +5,23 @@
     <p:sldMasterId id="2147483648" r:id="rId1"/>
   </p:sldMasterIdLst>
   <p:notesMasterIdLst>
-    <p:notesMasterId r:id="rId12"/>
+    <p:notesMasterId r:id="rId16"/>
   </p:notesMasterIdLst>
   <p:sldIdLst>
     <p:sldId id="257" r:id="rId2"/>
     <p:sldId id="317" r:id="rId3"/>
     <p:sldId id="318" r:id="rId4"/>
     <p:sldId id="319" r:id="rId5"/>
-    <p:sldId id="320" r:id="rId6"/>
-    <p:sldId id="321" r:id="rId7"/>
-    <p:sldId id="322" r:id="rId8"/>
-    <p:sldId id="323" r:id="rId9"/>
-    <p:sldId id="324" r:id="rId10"/>
-    <p:sldId id="325" r:id="rId11"/>
+    <p:sldId id="329" r:id="rId6"/>
+    <p:sldId id="320" r:id="rId7"/>
+    <p:sldId id="321" r:id="rId8"/>
+    <p:sldId id="322" r:id="rId9"/>
+    <p:sldId id="323" r:id="rId10"/>
+    <p:sldId id="324" r:id="rId11"/>
+    <p:sldId id="325" r:id="rId12"/>
+    <p:sldId id="326" r:id="rId13"/>
+    <p:sldId id="327" r:id="rId14"/>
+    <p:sldId id="328" r:id="rId15"/>
   </p:sldIdLst>
   <p:sldSz cx="12192000" cy="6858000"/>
   <p:notesSz cx="6858000" cy="9144000"/>
@@ -214,7 +218,7 @@
           <a:p>
             <a:fld id="{F666E1FD-E7A0-497B-BBC0-740BAAC97C64}" type="datetimeFigureOut">
               <a:rPr lang="en-PH" smtClean="0"/>
-              <a:t>20/02/2023</a:t>
+              <a:t>21/02/2023</a:t>
             </a:fld>
             <a:endParaRPr lang="en-PH"/>
           </a:p>
@@ -640,7 +644,343 @@
     </p:spTree>
     <p:extLst>
       <p:ext uri="{BB962C8B-B14F-4D97-AF65-F5344CB8AC3E}">
+        <p14:creationId xmlns:p14="http://schemas.microsoft.com/office/powerpoint/2010/main" val="3985730649"/>
+      </p:ext>
+    </p:extLst>
+  </p:cSld>
+  <p:clrMapOvr>
+    <a:masterClrMapping/>
+  </p:clrMapOvr>
+</p:notes>
+</file>
+
+<file path=ppt/notesSlides/notesSlide11.xml><?xml version="1.0" encoding="utf-8"?>
+<p:notes xmlns:a="http://schemas.openxmlformats.org/drawingml/2006/main" xmlns:r="http://schemas.openxmlformats.org/officeDocument/2006/relationships" xmlns:p="http://schemas.openxmlformats.org/presentationml/2006/main">
+  <p:cSld>
+    <p:spTree>
+      <p:nvGrpSpPr>
+        <p:cNvPr id="1" name=""/>
+        <p:cNvGrpSpPr/>
+        <p:nvPr/>
+      </p:nvGrpSpPr>
+      <p:grpSpPr>
+        <a:xfrm>
+          <a:off x="0" y="0"/>
+          <a:ext cx="0" cy="0"/>
+          <a:chOff x="0" y="0"/>
+          <a:chExt cx="0" cy="0"/>
+        </a:xfrm>
+      </p:grpSpPr>
+      <p:sp>
+        <p:nvSpPr>
+          <p:cNvPr id="2" name="Slide Image Placeholder 1"/>
+          <p:cNvSpPr>
+            <a:spLocks noGrp="1" noRot="1" noChangeAspect="1"/>
+          </p:cNvSpPr>
+          <p:nvPr>
+            <p:ph type="sldImg"/>
+          </p:nvPr>
+        </p:nvSpPr>
+        <p:spPr/>
+      </p:sp>
+      <p:sp>
+        <p:nvSpPr>
+          <p:cNvPr id="3" name="Notes Placeholder 2"/>
+          <p:cNvSpPr>
+            <a:spLocks noGrp="1"/>
+          </p:cNvSpPr>
+          <p:nvPr>
+            <p:ph type="body" idx="1"/>
+          </p:nvPr>
+        </p:nvSpPr>
+        <p:spPr/>
+        <p:txBody>
+          <a:bodyPr/>
+          <a:lstStyle/>
+          <a:p>
+            <a:endParaRPr lang="en-PH" dirty="0"/>
+          </a:p>
+        </p:txBody>
+      </p:sp>
+      <p:sp>
+        <p:nvSpPr>
+          <p:cNvPr id="4" name="Slide Number Placeholder 3"/>
+          <p:cNvSpPr>
+            <a:spLocks noGrp="1"/>
+          </p:cNvSpPr>
+          <p:nvPr>
+            <p:ph type="sldNum" sz="quarter" idx="5"/>
+          </p:nvPr>
+        </p:nvSpPr>
+        <p:spPr/>
+        <p:txBody>
+          <a:bodyPr/>
+          <a:lstStyle/>
+          <a:p>
+            <a:fld id="{FE90CCE9-4AAE-4E1F-85AD-521A406D6524}" type="slidenum">
+              <a:rPr lang="en-PH" smtClean="0"/>
+              <a:t>11</a:t>
+            </a:fld>
+            <a:endParaRPr lang="en-PH"/>
+          </a:p>
+        </p:txBody>
+      </p:sp>
+    </p:spTree>
+    <p:extLst>
+      <p:ext uri="{BB962C8B-B14F-4D97-AF65-F5344CB8AC3E}">
         <p14:creationId xmlns:p14="http://schemas.microsoft.com/office/powerpoint/2010/main" val="3826310550"/>
+      </p:ext>
+    </p:extLst>
+  </p:cSld>
+  <p:clrMapOvr>
+    <a:masterClrMapping/>
+  </p:clrMapOvr>
+</p:notes>
+</file>
+
+<file path=ppt/notesSlides/notesSlide12.xml><?xml version="1.0" encoding="utf-8"?>
+<p:notes xmlns:a="http://schemas.openxmlformats.org/drawingml/2006/main" xmlns:r="http://schemas.openxmlformats.org/officeDocument/2006/relationships" xmlns:p="http://schemas.openxmlformats.org/presentationml/2006/main">
+  <p:cSld>
+    <p:spTree>
+      <p:nvGrpSpPr>
+        <p:cNvPr id="1" name=""/>
+        <p:cNvGrpSpPr/>
+        <p:nvPr/>
+      </p:nvGrpSpPr>
+      <p:grpSpPr>
+        <a:xfrm>
+          <a:off x="0" y="0"/>
+          <a:ext cx="0" cy="0"/>
+          <a:chOff x="0" y="0"/>
+          <a:chExt cx="0" cy="0"/>
+        </a:xfrm>
+      </p:grpSpPr>
+      <p:sp>
+        <p:nvSpPr>
+          <p:cNvPr id="2" name="Slide Image Placeholder 1"/>
+          <p:cNvSpPr>
+            <a:spLocks noGrp="1" noRot="1" noChangeAspect="1"/>
+          </p:cNvSpPr>
+          <p:nvPr>
+            <p:ph type="sldImg"/>
+          </p:nvPr>
+        </p:nvSpPr>
+        <p:spPr/>
+      </p:sp>
+      <p:sp>
+        <p:nvSpPr>
+          <p:cNvPr id="3" name="Notes Placeholder 2"/>
+          <p:cNvSpPr>
+            <a:spLocks noGrp="1"/>
+          </p:cNvSpPr>
+          <p:nvPr>
+            <p:ph type="body" idx="1"/>
+          </p:nvPr>
+        </p:nvSpPr>
+        <p:spPr/>
+        <p:txBody>
+          <a:bodyPr/>
+          <a:lstStyle/>
+          <a:p>
+            <a:endParaRPr lang="en-PH" dirty="0"/>
+          </a:p>
+        </p:txBody>
+      </p:sp>
+      <p:sp>
+        <p:nvSpPr>
+          <p:cNvPr id="4" name="Slide Number Placeholder 3"/>
+          <p:cNvSpPr>
+            <a:spLocks noGrp="1"/>
+          </p:cNvSpPr>
+          <p:nvPr>
+            <p:ph type="sldNum" sz="quarter" idx="5"/>
+          </p:nvPr>
+        </p:nvSpPr>
+        <p:spPr/>
+        <p:txBody>
+          <a:bodyPr/>
+          <a:lstStyle/>
+          <a:p>
+            <a:fld id="{FE90CCE9-4AAE-4E1F-85AD-521A406D6524}" type="slidenum">
+              <a:rPr lang="en-PH" smtClean="0"/>
+              <a:t>12</a:t>
+            </a:fld>
+            <a:endParaRPr lang="en-PH"/>
+          </a:p>
+        </p:txBody>
+      </p:sp>
+    </p:spTree>
+    <p:extLst>
+      <p:ext uri="{BB962C8B-B14F-4D97-AF65-F5344CB8AC3E}">
+        <p14:creationId xmlns:p14="http://schemas.microsoft.com/office/powerpoint/2010/main" val="1583685682"/>
+      </p:ext>
+    </p:extLst>
+  </p:cSld>
+  <p:clrMapOvr>
+    <a:masterClrMapping/>
+  </p:clrMapOvr>
+</p:notes>
+</file>
+
+<file path=ppt/notesSlides/notesSlide13.xml><?xml version="1.0" encoding="utf-8"?>
+<p:notes xmlns:a="http://schemas.openxmlformats.org/drawingml/2006/main" xmlns:r="http://schemas.openxmlformats.org/officeDocument/2006/relationships" xmlns:p="http://schemas.openxmlformats.org/presentationml/2006/main">
+  <p:cSld>
+    <p:spTree>
+      <p:nvGrpSpPr>
+        <p:cNvPr id="1" name=""/>
+        <p:cNvGrpSpPr/>
+        <p:nvPr/>
+      </p:nvGrpSpPr>
+      <p:grpSpPr>
+        <a:xfrm>
+          <a:off x="0" y="0"/>
+          <a:ext cx="0" cy="0"/>
+          <a:chOff x="0" y="0"/>
+          <a:chExt cx="0" cy="0"/>
+        </a:xfrm>
+      </p:grpSpPr>
+      <p:sp>
+        <p:nvSpPr>
+          <p:cNvPr id="2" name="Slide Image Placeholder 1"/>
+          <p:cNvSpPr>
+            <a:spLocks noGrp="1" noRot="1" noChangeAspect="1"/>
+          </p:cNvSpPr>
+          <p:nvPr>
+            <p:ph type="sldImg"/>
+          </p:nvPr>
+        </p:nvSpPr>
+        <p:spPr/>
+      </p:sp>
+      <p:sp>
+        <p:nvSpPr>
+          <p:cNvPr id="3" name="Notes Placeholder 2"/>
+          <p:cNvSpPr>
+            <a:spLocks noGrp="1"/>
+          </p:cNvSpPr>
+          <p:nvPr>
+            <p:ph type="body" idx="1"/>
+          </p:nvPr>
+        </p:nvSpPr>
+        <p:spPr/>
+        <p:txBody>
+          <a:bodyPr/>
+          <a:lstStyle/>
+          <a:p>
+            <a:endParaRPr lang="en-PH" dirty="0"/>
+          </a:p>
+        </p:txBody>
+      </p:sp>
+      <p:sp>
+        <p:nvSpPr>
+          <p:cNvPr id="4" name="Slide Number Placeholder 3"/>
+          <p:cNvSpPr>
+            <a:spLocks noGrp="1"/>
+          </p:cNvSpPr>
+          <p:nvPr>
+            <p:ph type="sldNum" sz="quarter" idx="5"/>
+          </p:nvPr>
+        </p:nvSpPr>
+        <p:spPr/>
+        <p:txBody>
+          <a:bodyPr/>
+          <a:lstStyle/>
+          <a:p>
+            <a:fld id="{FE90CCE9-4AAE-4E1F-85AD-521A406D6524}" type="slidenum">
+              <a:rPr lang="en-PH" smtClean="0"/>
+              <a:t>13</a:t>
+            </a:fld>
+            <a:endParaRPr lang="en-PH"/>
+          </a:p>
+        </p:txBody>
+      </p:sp>
+    </p:spTree>
+    <p:extLst>
+      <p:ext uri="{BB962C8B-B14F-4D97-AF65-F5344CB8AC3E}">
+        <p14:creationId xmlns:p14="http://schemas.microsoft.com/office/powerpoint/2010/main" val="432218876"/>
+      </p:ext>
+    </p:extLst>
+  </p:cSld>
+  <p:clrMapOvr>
+    <a:masterClrMapping/>
+  </p:clrMapOvr>
+</p:notes>
+</file>
+
+<file path=ppt/notesSlides/notesSlide14.xml><?xml version="1.0" encoding="utf-8"?>
+<p:notes xmlns:a="http://schemas.openxmlformats.org/drawingml/2006/main" xmlns:r="http://schemas.openxmlformats.org/officeDocument/2006/relationships" xmlns:p="http://schemas.openxmlformats.org/presentationml/2006/main">
+  <p:cSld>
+    <p:spTree>
+      <p:nvGrpSpPr>
+        <p:cNvPr id="1" name=""/>
+        <p:cNvGrpSpPr/>
+        <p:nvPr/>
+      </p:nvGrpSpPr>
+      <p:grpSpPr>
+        <a:xfrm>
+          <a:off x="0" y="0"/>
+          <a:ext cx="0" cy="0"/>
+          <a:chOff x="0" y="0"/>
+          <a:chExt cx="0" cy="0"/>
+        </a:xfrm>
+      </p:grpSpPr>
+      <p:sp>
+        <p:nvSpPr>
+          <p:cNvPr id="2" name="Slide Image Placeholder 1"/>
+          <p:cNvSpPr>
+            <a:spLocks noGrp="1" noRot="1" noChangeAspect="1"/>
+          </p:cNvSpPr>
+          <p:nvPr>
+            <p:ph type="sldImg"/>
+          </p:nvPr>
+        </p:nvSpPr>
+        <p:spPr/>
+      </p:sp>
+      <p:sp>
+        <p:nvSpPr>
+          <p:cNvPr id="3" name="Notes Placeholder 2"/>
+          <p:cNvSpPr>
+            <a:spLocks noGrp="1"/>
+          </p:cNvSpPr>
+          <p:nvPr>
+            <p:ph type="body" idx="1"/>
+          </p:nvPr>
+        </p:nvSpPr>
+        <p:spPr/>
+        <p:txBody>
+          <a:bodyPr/>
+          <a:lstStyle/>
+          <a:p>
+            <a:endParaRPr lang="en-PH" dirty="0"/>
+          </a:p>
+        </p:txBody>
+      </p:sp>
+      <p:sp>
+        <p:nvSpPr>
+          <p:cNvPr id="4" name="Slide Number Placeholder 3"/>
+          <p:cNvSpPr>
+            <a:spLocks noGrp="1"/>
+          </p:cNvSpPr>
+          <p:nvPr>
+            <p:ph type="sldNum" sz="quarter" idx="5"/>
+          </p:nvPr>
+        </p:nvSpPr>
+        <p:spPr/>
+        <p:txBody>
+          <a:bodyPr/>
+          <a:lstStyle/>
+          <a:p>
+            <a:fld id="{FE90CCE9-4AAE-4E1F-85AD-521A406D6524}" type="slidenum">
+              <a:rPr lang="en-PH" smtClean="0"/>
+              <a:t>14</a:t>
+            </a:fld>
+            <a:endParaRPr lang="en-PH"/>
+          </a:p>
+        </p:txBody>
+      </p:sp>
+    </p:spTree>
+    <p:extLst>
+      <p:ext uri="{BB962C8B-B14F-4D97-AF65-F5344CB8AC3E}">
+        <p14:creationId xmlns:p14="http://schemas.microsoft.com/office/powerpoint/2010/main" val="1197805757"/>
       </p:ext>
     </p:extLst>
   </p:cSld>
@@ -1204,7 +1544,7 @@
     </p:spTree>
     <p:extLst>
       <p:ext uri="{BB962C8B-B14F-4D97-AF65-F5344CB8AC3E}">
-        <p14:creationId xmlns:p14="http://schemas.microsoft.com/office/powerpoint/2010/main" val="2988544794"/>
+        <p14:creationId xmlns:p14="http://schemas.microsoft.com/office/powerpoint/2010/main" val="923368164"/>
       </p:ext>
     </p:extLst>
   </p:cSld>
@@ -1288,7 +1628,7 @@
     </p:spTree>
     <p:extLst>
       <p:ext uri="{BB962C8B-B14F-4D97-AF65-F5344CB8AC3E}">
-        <p14:creationId xmlns:p14="http://schemas.microsoft.com/office/powerpoint/2010/main" val="239820307"/>
+        <p14:creationId xmlns:p14="http://schemas.microsoft.com/office/powerpoint/2010/main" val="2988544794"/>
       </p:ext>
     </p:extLst>
   </p:cSld>
@@ -1372,7 +1712,7 @@
     </p:spTree>
     <p:extLst>
       <p:ext uri="{BB962C8B-B14F-4D97-AF65-F5344CB8AC3E}">
-        <p14:creationId xmlns:p14="http://schemas.microsoft.com/office/powerpoint/2010/main" val="461918963"/>
+        <p14:creationId xmlns:p14="http://schemas.microsoft.com/office/powerpoint/2010/main" val="239820307"/>
       </p:ext>
     </p:extLst>
   </p:cSld>
@@ -1456,7 +1796,7 @@
     </p:spTree>
     <p:extLst>
       <p:ext uri="{BB962C8B-B14F-4D97-AF65-F5344CB8AC3E}">
-        <p14:creationId xmlns:p14="http://schemas.microsoft.com/office/powerpoint/2010/main" val="2334409620"/>
+        <p14:creationId xmlns:p14="http://schemas.microsoft.com/office/powerpoint/2010/main" val="461918963"/>
       </p:ext>
     </p:extLst>
   </p:cSld>
@@ -1540,7 +1880,7 @@
     </p:spTree>
     <p:extLst>
       <p:ext uri="{BB962C8B-B14F-4D97-AF65-F5344CB8AC3E}">
-        <p14:creationId xmlns:p14="http://schemas.microsoft.com/office/powerpoint/2010/main" val="3985730649"/>
+        <p14:creationId xmlns:p14="http://schemas.microsoft.com/office/powerpoint/2010/main" val="2334409620"/>
       </p:ext>
     </p:extLst>
   </p:cSld>
@@ -1699,7 +2039,7 @@
           <a:p>
             <a:fld id="{0CCF0B81-6BD8-4C65-9459-815598C5F1F4}" type="datetimeFigureOut">
               <a:rPr lang="en-PH" smtClean="0"/>
-              <a:t>20/02/2023</a:t>
+              <a:t>21/02/2023</a:t>
             </a:fld>
             <a:endParaRPr lang="en-PH"/>
           </a:p>
@@ -1899,7 +2239,7 @@
           <a:p>
             <a:fld id="{0CCF0B81-6BD8-4C65-9459-815598C5F1F4}" type="datetimeFigureOut">
               <a:rPr lang="en-PH" smtClean="0"/>
-              <a:t>20/02/2023</a:t>
+              <a:t>21/02/2023</a:t>
             </a:fld>
             <a:endParaRPr lang="en-PH"/>
           </a:p>
@@ -2109,7 +2449,7 @@
           <a:p>
             <a:fld id="{0CCF0B81-6BD8-4C65-9459-815598C5F1F4}" type="datetimeFigureOut">
               <a:rPr lang="en-PH" smtClean="0"/>
-              <a:t>20/02/2023</a:t>
+              <a:t>21/02/2023</a:t>
             </a:fld>
             <a:endParaRPr lang="en-PH"/>
           </a:p>
@@ -2309,7 +2649,7 @@
           <a:p>
             <a:fld id="{0CCF0B81-6BD8-4C65-9459-815598C5F1F4}" type="datetimeFigureOut">
               <a:rPr lang="en-PH" smtClean="0"/>
-              <a:t>20/02/2023</a:t>
+              <a:t>21/02/2023</a:t>
             </a:fld>
             <a:endParaRPr lang="en-PH"/>
           </a:p>
@@ -2585,7 +2925,7 @@
           <a:p>
             <a:fld id="{0CCF0B81-6BD8-4C65-9459-815598C5F1F4}" type="datetimeFigureOut">
               <a:rPr lang="en-PH" smtClean="0"/>
-              <a:t>20/02/2023</a:t>
+              <a:t>21/02/2023</a:t>
             </a:fld>
             <a:endParaRPr lang="en-PH"/>
           </a:p>
@@ -2853,7 +3193,7 @@
           <a:p>
             <a:fld id="{0CCF0B81-6BD8-4C65-9459-815598C5F1F4}" type="datetimeFigureOut">
               <a:rPr lang="en-PH" smtClean="0"/>
-              <a:t>20/02/2023</a:t>
+              <a:t>21/02/2023</a:t>
             </a:fld>
             <a:endParaRPr lang="en-PH"/>
           </a:p>
@@ -3268,7 +3608,7 @@
           <a:p>
             <a:fld id="{0CCF0B81-6BD8-4C65-9459-815598C5F1F4}" type="datetimeFigureOut">
               <a:rPr lang="en-PH" smtClean="0"/>
-              <a:t>20/02/2023</a:t>
+              <a:t>21/02/2023</a:t>
             </a:fld>
             <a:endParaRPr lang="en-PH"/>
           </a:p>
@@ -3410,7 +3750,7 @@
           <a:p>
             <a:fld id="{0CCF0B81-6BD8-4C65-9459-815598C5F1F4}" type="datetimeFigureOut">
               <a:rPr lang="en-PH" smtClean="0"/>
-              <a:t>20/02/2023</a:t>
+              <a:t>21/02/2023</a:t>
             </a:fld>
             <a:endParaRPr lang="en-PH"/>
           </a:p>
@@ -3523,7 +3863,7 @@
           <a:p>
             <a:fld id="{0CCF0B81-6BD8-4C65-9459-815598C5F1F4}" type="datetimeFigureOut">
               <a:rPr lang="en-PH" smtClean="0"/>
-              <a:t>20/02/2023</a:t>
+              <a:t>21/02/2023</a:t>
             </a:fld>
             <a:endParaRPr lang="en-PH"/>
           </a:p>
@@ -3836,7 +4176,7 @@
           <a:p>
             <a:fld id="{0CCF0B81-6BD8-4C65-9459-815598C5F1F4}" type="datetimeFigureOut">
               <a:rPr lang="en-PH" smtClean="0"/>
-              <a:t>20/02/2023</a:t>
+              <a:t>21/02/2023</a:t>
             </a:fld>
             <a:endParaRPr lang="en-PH"/>
           </a:p>
@@ -4125,7 +4465,7 @@
           <a:p>
             <a:fld id="{0CCF0B81-6BD8-4C65-9459-815598C5F1F4}" type="datetimeFigureOut">
               <a:rPr lang="en-PH" smtClean="0"/>
-              <a:t>20/02/2023</a:t>
+              <a:t>21/02/2023</a:t>
             </a:fld>
             <a:endParaRPr lang="en-PH"/>
           </a:p>
@@ -4368,7 +4708,7 @@
           <a:p>
             <a:fld id="{0CCF0B81-6BD8-4C65-9459-815598C5F1F4}" type="datetimeFigureOut">
               <a:rPr lang="en-PH" smtClean="0"/>
-              <a:t>20/02/2023</a:t>
+              <a:t>21/02/2023</a:t>
             </a:fld>
             <a:endParaRPr lang="en-PH"/>
           </a:p>
@@ -5055,6 +5395,235 @@
         </p:nvSpPr>
         <p:spPr>
           <a:xfrm>
+            <a:off x="1524000" y="1266869"/>
+            <a:ext cx="9144000" cy="5478423"/>
+          </a:xfrm>
+          <a:prstGeom prst="rect">
+            <a:avLst/>
+          </a:prstGeom>
+          <a:noFill/>
+        </p:spPr>
+        <p:txBody>
+          <a:bodyPr wrap="square" rtlCol="0">
+            <a:spAutoFit/>
+          </a:bodyPr>
+          <a:lstStyle/>
+          <a:p>
+            <a:pPr marL="342900" indent="-342900" algn="l">
+              <a:buFont typeface="Wingdings" panose="05000000000000000000" pitchFamily="2" charset="2"/>
+              <a:buChar char="q"/>
+            </a:pPr>
+            <a:r>
+              <a:rPr lang="en-US" sz="2500" b="1" dirty="0"/>
+              <a:t>New State</a:t>
+            </a:r>
+            <a:r>
+              <a:rPr lang="en-US" sz="2500" dirty="0"/>
+              <a:t>. As we use the Thread class to construct a thread entity, the thread is born and is defined as being in the New state. </a:t>
+            </a:r>
+          </a:p>
+          <a:p>
+            <a:pPr marL="342900" indent="-342900" algn="l">
+              <a:buFont typeface="Wingdings" panose="05000000000000000000" pitchFamily="2" charset="2"/>
+              <a:buChar char="q"/>
+            </a:pPr>
+            <a:endParaRPr lang="en-US" sz="2500" dirty="0"/>
+          </a:p>
+          <a:p>
+            <a:pPr marL="342900" indent="-342900" algn="l">
+              <a:buFont typeface="Wingdings" panose="05000000000000000000" pitchFamily="2" charset="2"/>
+              <a:buChar char="q"/>
+            </a:pPr>
+            <a:r>
+              <a:rPr lang="en-US" sz="2500" b="1" dirty="0"/>
+              <a:t>Runnable State</a:t>
+            </a:r>
+            <a:r>
+              <a:rPr lang="en-US" sz="2500" dirty="0"/>
+              <a:t>. A thread in the runnable state is prepared to execute the code. When a new thread's start() function is called, it enters a runnable state.</a:t>
+            </a:r>
+          </a:p>
+          <a:p>
+            <a:pPr marL="342900" indent="-342900" algn="l">
+              <a:buFont typeface="Wingdings" panose="05000000000000000000" pitchFamily="2" charset="2"/>
+              <a:buChar char="q"/>
+            </a:pPr>
+            <a:endParaRPr lang="en-US" sz="2500" dirty="0"/>
+          </a:p>
+          <a:p>
+            <a:pPr marL="342900" indent="-342900" algn="l">
+              <a:buFont typeface="Wingdings" panose="05000000000000000000" pitchFamily="2" charset="2"/>
+              <a:buChar char="q"/>
+            </a:pPr>
+            <a:r>
+              <a:rPr lang="en-US" sz="2500" b="1" dirty="0"/>
+              <a:t>Running State</a:t>
+            </a:r>
+            <a:r>
+              <a:rPr lang="en-US" sz="2500" dirty="0"/>
+              <a:t>. Running implies that the processor (CPU) has assigned a time slot to the thread for execution. When a thread from the runnable state is chosen for execution by the thread scheduler, it joins the running state.</a:t>
+            </a:r>
+          </a:p>
+          <a:p>
+            <a:pPr marL="342900" indent="-342900" algn="l">
+              <a:buFont typeface="Wingdings" panose="05000000000000000000" pitchFamily="2" charset="2"/>
+              <a:buChar char="q"/>
+            </a:pPr>
+            <a:endParaRPr lang="en-US" sz="2500" dirty="0"/>
+          </a:p>
+          <a:p>
+            <a:pPr marL="342900" indent="-342900" algn="l">
+              <a:buFont typeface="Wingdings" panose="05000000000000000000" pitchFamily="2" charset="2"/>
+              <a:buChar char="q"/>
+            </a:pPr>
+            <a:endParaRPr lang="en-US" sz="2500" dirty="0"/>
+          </a:p>
+          <a:p>
+            <a:pPr algn="l"/>
+            <a:endParaRPr lang="en-US" sz="2500" dirty="0"/>
+          </a:p>
+        </p:txBody>
+      </p:sp>
+    </p:spTree>
+    <p:extLst>
+      <p:ext uri="{BB962C8B-B14F-4D97-AF65-F5344CB8AC3E}">
+        <p14:creationId xmlns:p14="http://schemas.microsoft.com/office/powerpoint/2010/main" val="2413565988"/>
+      </p:ext>
+    </p:extLst>
+  </p:cSld>
+  <p:clrMapOvr>
+    <a:masterClrMapping/>
+  </p:clrMapOvr>
+</p:sld>
+</file>
+
+<file path=ppt/slides/slide11.xml><?xml version="1.0" encoding="utf-8"?>
+<p:sld xmlns:a="http://schemas.openxmlformats.org/drawingml/2006/main" xmlns:r="http://schemas.openxmlformats.org/officeDocument/2006/relationships" xmlns:p="http://schemas.openxmlformats.org/presentationml/2006/main">
+  <p:cSld>
+    <p:bg>
+      <p:bgPr>
+        <a:blipFill dpi="0" rotWithShape="1">
+          <a:blip r:embed="rId3">
+            <a:alphaModFix amt="99000"/>
+            <a:lum/>
+          </a:blip>
+          <a:srcRect/>
+          <a:stretch>
+            <a:fillRect t="89000" r="85000" b="-1000"/>
+          </a:stretch>
+        </a:blipFill>
+        <a:effectLst/>
+      </p:bgPr>
+    </p:bg>
+    <p:spTree>
+      <p:nvGrpSpPr>
+        <p:cNvPr id="1" name=""/>
+        <p:cNvGrpSpPr/>
+        <p:nvPr/>
+      </p:nvGrpSpPr>
+      <p:grpSpPr>
+        <a:xfrm>
+          <a:off x="0" y="0"/>
+          <a:ext cx="0" cy="0"/>
+          <a:chOff x="0" y="0"/>
+          <a:chExt cx="0" cy="0"/>
+        </a:xfrm>
+      </p:grpSpPr>
+      <p:sp>
+        <p:nvSpPr>
+          <p:cNvPr id="2" name="Title 1">
+            <a:extLst>
+              <a:ext uri="{FF2B5EF4-FFF2-40B4-BE49-F238E27FC236}">
+                <a16:creationId xmlns:a16="http://schemas.microsoft.com/office/drawing/2014/main" id="{6A3DCE86-C2BA-4713-9E7A-73589E8D6CCF}"/>
+              </a:ext>
+            </a:extLst>
+          </p:cNvPr>
+          <p:cNvSpPr>
+            <a:spLocks noGrp="1"/>
+          </p:cNvSpPr>
+          <p:nvPr>
+            <p:ph type="ctrTitle"/>
+          </p:nvPr>
+        </p:nvSpPr>
+        <p:spPr>
+          <a:xfrm>
+            <a:off x="1524000" y="497150"/>
+            <a:ext cx="9144000" cy="718459"/>
+          </a:xfrm>
+        </p:spPr>
+        <p:txBody>
+          <a:bodyPr>
+            <a:normAutofit fontScale="90000"/>
+          </a:bodyPr>
+          <a:lstStyle/>
+          <a:p>
+            <a:r>
+              <a:rPr lang="en-PH" b="1" dirty="0"/>
+              <a:t>Thread Lifecycle</a:t>
+            </a:r>
+          </a:p>
+        </p:txBody>
+      </p:sp>
+      <p:sp>
+        <p:nvSpPr>
+          <p:cNvPr id="4" name="Footer Placeholder 3">
+            <a:extLst>
+              <a:ext uri="{FF2B5EF4-FFF2-40B4-BE49-F238E27FC236}">
+                <a16:creationId xmlns:a16="http://schemas.microsoft.com/office/drawing/2014/main" id="{638E7DE1-45EE-476A-A474-0F3C264AEDA3}"/>
+              </a:ext>
+            </a:extLst>
+          </p:cNvPr>
+          <p:cNvSpPr>
+            <a:spLocks noGrp="1"/>
+          </p:cNvSpPr>
+          <p:nvPr>
+            <p:ph type="ftr" sz="quarter" idx="11"/>
+          </p:nvPr>
+        </p:nvSpPr>
+        <p:spPr>
+          <a:xfrm>
+            <a:off x="0" y="6139541"/>
+            <a:ext cx="12192000" cy="718459"/>
+          </a:xfrm>
+          <a:ln w="28575">
+            <a:solidFill>
+              <a:schemeClr val="accent5">
+                <a:lumMod val="50000"/>
+              </a:schemeClr>
+            </a:solidFill>
+          </a:ln>
+        </p:spPr>
+        <p:txBody>
+          <a:bodyPr/>
+          <a:lstStyle/>
+          <a:p>
+            <a:pPr algn="r"/>
+            <a:r>
+              <a:rPr lang="en-PH" b="1">
+                <a:solidFill>
+                  <a:schemeClr val="tx1"/>
+                </a:solidFill>
+              </a:rPr>
+              <a:t>CCPRGG2L</a:t>
+            </a:r>
+            <a:endParaRPr lang="en-PH" dirty="0"/>
+          </a:p>
+        </p:txBody>
+      </p:sp>
+      <p:sp>
+        <p:nvSpPr>
+          <p:cNvPr id="3" name="TextBox 2">
+            <a:extLst>
+              <a:ext uri="{FF2B5EF4-FFF2-40B4-BE49-F238E27FC236}">
+                <a16:creationId xmlns:a16="http://schemas.microsoft.com/office/drawing/2014/main" id="{3585BB4D-48BF-F4D5-0836-77023A1B410A}"/>
+              </a:ext>
+            </a:extLst>
+          </p:cNvPr>
+          <p:cNvSpPr txBox="1"/>
+          <p:nvPr/>
+        </p:nvSpPr>
+        <p:spPr>
+          <a:xfrm>
             <a:off x="1524000" y="1515649"/>
             <a:ext cx="9144000" cy="3170099"/>
           </a:xfrm>
@@ -5109,6 +5678,1248 @@
     <p:extLst>
       <p:ext uri="{BB962C8B-B14F-4D97-AF65-F5344CB8AC3E}">
         <p14:creationId xmlns:p14="http://schemas.microsoft.com/office/powerpoint/2010/main" val="773957769"/>
+      </p:ext>
+    </p:extLst>
+  </p:cSld>
+  <p:clrMapOvr>
+    <a:masterClrMapping/>
+  </p:clrMapOvr>
+</p:sld>
+</file>
+
+<file path=ppt/slides/slide12.xml><?xml version="1.0" encoding="utf-8"?>
+<p:sld xmlns:a="http://schemas.openxmlformats.org/drawingml/2006/main" xmlns:r="http://schemas.openxmlformats.org/officeDocument/2006/relationships" xmlns:p="http://schemas.openxmlformats.org/presentationml/2006/main">
+  <p:cSld>
+    <p:bg>
+      <p:bgPr>
+        <a:blipFill dpi="0" rotWithShape="1">
+          <a:blip r:embed="rId3">
+            <a:alphaModFix amt="99000"/>
+            <a:lum/>
+          </a:blip>
+          <a:srcRect/>
+          <a:stretch>
+            <a:fillRect t="89000" r="85000" b="-1000"/>
+          </a:stretch>
+        </a:blipFill>
+        <a:effectLst/>
+      </p:bgPr>
+    </p:bg>
+    <p:spTree>
+      <p:nvGrpSpPr>
+        <p:cNvPr id="1" name=""/>
+        <p:cNvGrpSpPr/>
+        <p:nvPr/>
+      </p:nvGrpSpPr>
+      <p:grpSpPr>
+        <a:xfrm>
+          <a:off x="0" y="0"/>
+          <a:ext cx="0" cy="0"/>
+          <a:chOff x="0" y="0"/>
+          <a:chExt cx="0" cy="0"/>
+        </a:xfrm>
+      </p:grpSpPr>
+      <p:sp>
+        <p:nvSpPr>
+          <p:cNvPr id="2" name="Title 1">
+            <a:extLst>
+              <a:ext uri="{FF2B5EF4-FFF2-40B4-BE49-F238E27FC236}">
+                <a16:creationId xmlns:a16="http://schemas.microsoft.com/office/drawing/2014/main" id="{6A3DCE86-C2BA-4713-9E7A-73589E8D6CCF}"/>
+              </a:ext>
+            </a:extLst>
+          </p:cNvPr>
+          <p:cNvSpPr>
+            <a:spLocks noGrp="1"/>
+          </p:cNvSpPr>
+          <p:nvPr>
+            <p:ph type="ctrTitle"/>
+          </p:nvPr>
+        </p:nvSpPr>
+        <p:spPr>
+          <a:xfrm>
+            <a:off x="1524000" y="497150"/>
+            <a:ext cx="9144000" cy="718459"/>
+          </a:xfrm>
+        </p:spPr>
+        <p:txBody>
+          <a:bodyPr>
+            <a:normAutofit fontScale="90000"/>
+          </a:bodyPr>
+          <a:lstStyle/>
+          <a:p>
+            <a:r>
+              <a:rPr lang="en-PH" b="1" dirty="0"/>
+              <a:t>Common Thread Class Methods</a:t>
+            </a:r>
+          </a:p>
+        </p:txBody>
+      </p:sp>
+      <p:sp>
+        <p:nvSpPr>
+          <p:cNvPr id="4" name="Footer Placeholder 3">
+            <a:extLst>
+              <a:ext uri="{FF2B5EF4-FFF2-40B4-BE49-F238E27FC236}">
+                <a16:creationId xmlns:a16="http://schemas.microsoft.com/office/drawing/2014/main" id="{638E7DE1-45EE-476A-A474-0F3C264AEDA3}"/>
+              </a:ext>
+            </a:extLst>
+          </p:cNvPr>
+          <p:cNvSpPr>
+            <a:spLocks noGrp="1"/>
+          </p:cNvSpPr>
+          <p:nvPr>
+            <p:ph type="ftr" sz="quarter" idx="11"/>
+          </p:nvPr>
+        </p:nvSpPr>
+        <p:spPr>
+          <a:xfrm>
+            <a:off x="0" y="6139541"/>
+            <a:ext cx="12192000" cy="718459"/>
+          </a:xfrm>
+          <a:ln w="28575">
+            <a:solidFill>
+              <a:schemeClr val="accent5">
+                <a:lumMod val="50000"/>
+              </a:schemeClr>
+            </a:solidFill>
+          </a:ln>
+        </p:spPr>
+        <p:txBody>
+          <a:bodyPr/>
+          <a:lstStyle/>
+          <a:p>
+            <a:pPr algn="r"/>
+            <a:r>
+              <a:rPr lang="en-PH" b="1">
+                <a:solidFill>
+                  <a:schemeClr val="tx1"/>
+                </a:solidFill>
+              </a:rPr>
+              <a:t>CCPRGG2L</a:t>
+            </a:r>
+            <a:endParaRPr lang="en-PH" dirty="0"/>
+          </a:p>
+        </p:txBody>
+      </p:sp>
+      <p:graphicFrame>
+        <p:nvGraphicFramePr>
+          <p:cNvPr id="5" name="Table 5">
+            <a:extLst>
+              <a:ext uri="{FF2B5EF4-FFF2-40B4-BE49-F238E27FC236}">
+                <a16:creationId xmlns:a16="http://schemas.microsoft.com/office/drawing/2014/main" id="{57BA64CE-658F-D33F-0261-01D409004B96}"/>
+              </a:ext>
+            </a:extLst>
+          </p:cNvPr>
+          <p:cNvGraphicFramePr>
+            <a:graphicFrameLocks noGrp="1"/>
+          </p:cNvGraphicFramePr>
+          <p:nvPr>
+            <p:extLst>
+              <p:ext uri="{D42A27DB-BD31-4B8C-83A1-F6EECF244321}">
+                <p14:modId xmlns:p14="http://schemas.microsoft.com/office/powerpoint/2010/main" val="4041027692"/>
+              </p:ext>
+            </p:extLst>
+          </p:nvPr>
+        </p:nvGraphicFramePr>
+        <p:xfrm>
+          <a:off x="2032000" y="1769527"/>
+          <a:ext cx="8128000" cy="3606800"/>
+        </p:xfrm>
+        <a:graphic>
+          <a:graphicData uri="http://schemas.openxmlformats.org/drawingml/2006/table">
+            <a:tbl>
+              <a:tblPr firstRow="1" bandRow="1">
+                <a:tableStyleId>{5940675A-B579-460E-94D1-54222C63F5DA}</a:tableStyleId>
+              </a:tblPr>
+              <a:tblGrid>
+                <a:gridCol w="4064000">
+                  <a:extLst>
+                    <a:ext uri="{9D8B030D-6E8A-4147-A177-3AD203B41FA5}">
+                      <a16:colId xmlns:a16="http://schemas.microsoft.com/office/drawing/2014/main" val="3191554605"/>
+                    </a:ext>
+                  </a:extLst>
+                </a:gridCol>
+                <a:gridCol w="4064000">
+                  <a:extLst>
+                    <a:ext uri="{9D8B030D-6E8A-4147-A177-3AD203B41FA5}">
+                      <a16:colId xmlns:a16="http://schemas.microsoft.com/office/drawing/2014/main" val="4130678375"/>
+                    </a:ext>
+                  </a:extLst>
+                </a:gridCol>
+              </a:tblGrid>
+              <a:tr h="370840">
+                <a:tc>
+                  <a:txBody>
+                    <a:bodyPr/>
+                    <a:lstStyle/>
+                    <a:p>
+                      <a:pPr algn="ctr"/>
+                      <a:r>
+                        <a:rPr lang="en-PH" b="1" dirty="0"/>
+                        <a:t>Method</a:t>
+                      </a:r>
+                    </a:p>
+                  </a:txBody>
+                  <a:tcPr/>
+                </a:tc>
+                <a:tc>
+                  <a:txBody>
+                    <a:bodyPr/>
+                    <a:lstStyle/>
+                    <a:p>
+                      <a:pPr algn="ctr"/>
+                      <a:r>
+                        <a:rPr lang="en-PH" b="1" dirty="0"/>
+                        <a:t>Description</a:t>
+                      </a:r>
+                    </a:p>
+                  </a:txBody>
+                  <a:tcPr/>
+                </a:tc>
+                <a:extLst>
+                  <a:ext uri="{0D108BD9-81ED-4DB2-BD59-A6C34878D82A}">
+                    <a16:rowId xmlns:a16="http://schemas.microsoft.com/office/drawing/2014/main" val="2619032072"/>
+                  </a:ext>
+                </a:extLst>
+              </a:tr>
+              <a:tr h="370840">
+                <a:tc>
+                  <a:txBody>
+                    <a:bodyPr/>
+                    <a:lstStyle/>
+                    <a:p>
+                      <a:r>
+                        <a:rPr lang="en-PH" b="1" dirty="0">
+                          <a:solidFill>
+                            <a:srgbClr val="002060"/>
+                          </a:solidFill>
+                        </a:rPr>
+                        <a:t>run()</a:t>
+                      </a:r>
+                    </a:p>
+                  </a:txBody>
+                  <a:tcPr/>
+                </a:tc>
+                <a:tc>
+                  <a:txBody>
+                    <a:bodyPr/>
+                    <a:lstStyle/>
+                    <a:p>
+                      <a:r>
+                        <a:rPr lang="en-PH" dirty="0"/>
+                        <a:t>Returns the number of active threads</a:t>
+                      </a:r>
+                    </a:p>
+                  </a:txBody>
+                  <a:tcPr/>
+                </a:tc>
+                <a:extLst>
+                  <a:ext uri="{0D108BD9-81ED-4DB2-BD59-A6C34878D82A}">
+                    <a16:rowId xmlns:a16="http://schemas.microsoft.com/office/drawing/2014/main" val="3208071617"/>
+                  </a:ext>
+                </a:extLst>
+              </a:tr>
+              <a:tr h="370840">
+                <a:tc>
+                  <a:txBody>
+                    <a:bodyPr/>
+                    <a:lstStyle/>
+                    <a:p>
+                      <a:r>
+                        <a:rPr lang="en-PH" b="1" dirty="0">
+                          <a:solidFill>
+                            <a:srgbClr val="002060"/>
+                          </a:solidFill>
+                        </a:rPr>
+                        <a:t>start()</a:t>
+                      </a:r>
+                    </a:p>
+                  </a:txBody>
+                  <a:tcPr/>
+                </a:tc>
+                <a:tc>
+                  <a:txBody>
+                    <a:bodyPr/>
+                    <a:lstStyle/>
+                    <a:p>
+                      <a:r>
+                        <a:rPr lang="en-PH" dirty="0"/>
+                        <a:t>Changes the name of the thread</a:t>
+                      </a:r>
+                    </a:p>
+                  </a:txBody>
+                  <a:tcPr/>
+                </a:tc>
+                <a:extLst>
+                  <a:ext uri="{0D108BD9-81ED-4DB2-BD59-A6C34878D82A}">
+                    <a16:rowId xmlns:a16="http://schemas.microsoft.com/office/drawing/2014/main" val="3076596265"/>
+                  </a:ext>
+                </a:extLst>
+              </a:tr>
+              <a:tr h="370840">
+                <a:tc>
+                  <a:txBody>
+                    <a:bodyPr/>
+                    <a:lstStyle/>
+                    <a:p>
+                      <a:r>
+                        <a:rPr lang="en-PH" b="1" dirty="0">
+                          <a:solidFill>
+                            <a:srgbClr val="002060"/>
+                          </a:solidFill>
+                        </a:rPr>
+                        <a:t>sleep(milliseconds)</a:t>
+                      </a:r>
+                    </a:p>
+                  </a:txBody>
+                  <a:tcPr/>
+                </a:tc>
+                <a:tc>
+                  <a:txBody>
+                    <a:bodyPr/>
+                    <a:lstStyle/>
+                    <a:p>
+                      <a:r>
+                        <a:rPr lang="en-PH" dirty="0"/>
+                        <a:t>Returns the name of the thread</a:t>
+                      </a:r>
+                    </a:p>
+                  </a:txBody>
+                  <a:tcPr/>
+                </a:tc>
+                <a:extLst>
+                  <a:ext uri="{0D108BD9-81ED-4DB2-BD59-A6C34878D82A}">
+                    <a16:rowId xmlns:a16="http://schemas.microsoft.com/office/drawing/2014/main" val="3281053769"/>
+                  </a:ext>
+                </a:extLst>
+              </a:tr>
+              <a:tr h="370840">
+                <a:tc>
+                  <a:txBody>
+                    <a:bodyPr/>
+                    <a:lstStyle/>
+                    <a:p>
+                      <a:r>
+                        <a:rPr lang="en-PH" b="1" dirty="0" err="1">
+                          <a:solidFill>
+                            <a:srgbClr val="002060"/>
+                          </a:solidFill>
+                        </a:rPr>
+                        <a:t>activeCount</a:t>
+                      </a:r>
+                      <a:r>
+                        <a:rPr lang="en-PH" b="1" dirty="0">
+                          <a:solidFill>
+                            <a:srgbClr val="002060"/>
+                          </a:solidFill>
+                        </a:rPr>
+                        <a:t>()</a:t>
+                      </a:r>
+                    </a:p>
+                  </a:txBody>
+                  <a:tcPr/>
+                </a:tc>
+                <a:tc>
+                  <a:txBody>
+                    <a:bodyPr/>
+                    <a:lstStyle/>
+                    <a:p>
+                      <a:r>
+                        <a:rPr lang="en-PH" dirty="0"/>
+                        <a:t>Returns the number of active threads</a:t>
+                      </a:r>
+                    </a:p>
+                  </a:txBody>
+                  <a:tcPr/>
+                </a:tc>
+                <a:extLst>
+                  <a:ext uri="{0D108BD9-81ED-4DB2-BD59-A6C34878D82A}">
+                    <a16:rowId xmlns:a16="http://schemas.microsoft.com/office/drawing/2014/main" val="3318449091"/>
+                  </a:ext>
+                </a:extLst>
+              </a:tr>
+              <a:tr h="370840">
+                <a:tc>
+                  <a:txBody>
+                    <a:bodyPr/>
+                    <a:lstStyle/>
+                    <a:p>
+                      <a:r>
+                        <a:rPr lang="en-PH" b="1" dirty="0" err="1">
+                          <a:solidFill>
+                            <a:srgbClr val="002060"/>
+                          </a:solidFill>
+                        </a:rPr>
+                        <a:t>setName</a:t>
+                      </a:r>
+                      <a:r>
+                        <a:rPr lang="en-PH" b="1" dirty="0">
+                          <a:solidFill>
+                            <a:srgbClr val="002060"/>
+                          </a:solidFill>
+                        </a:rPr>
+                        <a:t>()</a:t>
+                      </a:r>
+                    </a:p>
+                  </a:txBody>
+                  <a:tcPr/>
+                </a:tc>
+                <a:tc>
+                  <a:txBody>
+                    <a:bodyPr/>
+                    <a:lstStyle/>
+                    <a:p>
+                      <a:r>
+                        <a:rPr lang="en-PH" dirty="0"/>
+                        <a:t>Changes the name of the thread</a:t>
+                      </a:r>
+                    </a:p>
+                  </a:txBody>
+                  <a:tcPr/>
+                </a:tc>
+                <a:extLst>
+                  <a:ext uri="{0D108BD9-81ED-4DB2-BD59-A6C34878D82A}">
+                    <a16:rowId xmlns:a16="http://schemas.microsoft.com/office/drawing/2014/main" val="294295955"/>
+                  </a:ext>
+                </a:extLst>
+              </a:tr>
+              <a:tr h="370840">
+                <a:tc>
+                  <a:txBody>
+                    <a:bodyPr/>
+                    <a:lstStyle/>
+                    <a:p>
+                      <a:r>
+                        <a:rPr lang="en-PH" b="1" dirty="0" err="1">
+                          <a:solidFill>
+                            <a:srgbClr val="002060"/>
+                          </a:solidFill>
+                        </a:rPr>
+                        <a:t>getName</a:t>
+                      </a:r>
+                      <a:r>
+                        <a:rPr lang="en-PH" b="1" dirty="0">
+                          <a:solidFill>
+                            <a:srgbClr val="002060"/>
+                          </a:solidFill>
+                        </a:rPr>
+                        <a:t>()</a:t>
+                      </a:r>
+                    </a:p>
+                  </a:txBody>
+                  <a:tcPr/>
+                </a:tc>
+                <a:tc>
+                  <a:txBody>
+                    <a:bodyPr/>
+                    <a:lstStyle/>
+                    <a:p>
+                      <a:r>
+                        <a:rPr lang="en-PH" dirty="0"/>
+                        <a:t>Returns the name of the thread</a:t>
+                      </a:r>
+                    </a:p>
+                  </a:txBody>
+                  <a:tcPr/>
+                </a:tc>
+                <a:extLst>
+                  <a:ext uri="{0D108BD9-81ED-4DB2-BD59-A6C34878D82A}">
+                    <a16:rowId xmlns:a16="http://schemas.microsoft.com/office/drawing/2014/main" val="3624588915"/>
+                  </a:ext>
+                </a:extLst>
+              </a:tr>
+              <a:tr h="370840">
+                <a:tc>
+                  <a:txBody>
+                    <a:bodyPr/>
+                    <a:lstStyle/>
+                    <a:p>
+                      <a:r>
+                        <a:rPr lang="en-PH" b="1" dirty="0">
+                          <a:solidFill>
+                            <a:srgbClr val="002060"/>
+                          </a:solidFill>
+                        </a:rPr>
+                        <a:t>join</a:t>
+                      </a:r>
+                    </a:p>
+                  </a:txBody>
+                  <a:tcPr/>
+                </a:tc>
+                <a:tc>
+                  <a:txBody>
+                    <a:bodyPr/>
+                    <a:lstStyle/>
+                    <a:p>
+                      <a:r>
+                        <a:rPr lang="en-PH" dirty="0"/>
+                        <a:t>Waits for a thread to die</a:t>
+                      </a:r>
+                    </a:p>
+                  </a:txBody>
+                  <a:tcPr/>
+                </a:tc>
+                <a:extLst>
+                  <a:ext uri="{0D108BD9-81ED-4DB2-BD59-A6C34878D82A}">
+                    <a16:rowId xmlns:a16="http://schemas.microsoft.com/office/drawing/2014/main" val="1557084311"/>
+                  </a:ext>
+                </a:extLst>
+              </a:tr>
+              <a:tr h="370840">
+                <a:tc>
+                  <a:txBody>
+                    <a:bodyPr/>
+                    <a:lstStyle/>
+                    <a:p>
+                      <a:r>
+                        <a:rPr lang="en-PH" b="1" dirty="0">
+                          <a:solidFill>
+                            <a:srgbClr val="002060"/>
+                          </a:solidFill>
+                        </a:rPr>
+                        <a:t>join(milliseconds)</a:t>
+                      </a:r>
+                    </a:p>
+                  </a:txBody>
+                  <a:tcPr/>
+                </a:tc>
+                <a:tc>
+                  <a:txBody>
+                    <a:bodyPr/>
+                    <a:lstStyle/>
+                    <a:p>
+                      <a:r>
+                        <a:rPr lang="en-PH" dirty="0"/>
+                        <a:t>Waits for a thread to die for the specified milliseconds</a:t>
+                      </a:r>
+                    </a:p>
+                  </a:txBody>
+                  <a:tcPr/>
+                </a:tc>
+                <a:extLst>
+                  <a:ext uri="{0D108BD9-81ED-4DB2-BD59-A6C34878D82A}">
+                    <a16:rowId xmlns:a16="http://schemas.microsoft.com/office/drawing/2014/main" val="1909351888"/>
+                  </a:ext>
+                </a:extLst>
+              </a:tr>
+            </a:tbl>
+          </a:graphicData>
+        </a:graphic>
+      </p:graphicFrame>
+    </p:spTree>
+    <p:extLst>
+      <p:ext uri="{BB962C8B-B14F-4D97-AF65-F5344CB8AC3E}">
+        <p14:creationId xmlns:p14="http://schemas.microsoft.com/office/powerpoint/2010/main" val="459187750"/>
+      </p:ext>
+    </p:extLst>
+  </p:cSld>
+  <p:clrMapOvr>
+    <a:masterClrMapping/>
+  </p:clrMapOvr>
+</p:sld>
+</file>
+
+<file path=ppt/slides/slide13.xml><?xml version="1.0" encoding="utf-8"?>
+<p:sld xmlns:a="http://schemas.openxmlformats.org/drawingml/2006/main" xmlns:r="http://schemas.openxmlformats.org/officeDocument/2006/relationships" xmlns:p="http://schemas.openxmlformats.org/presentationml/2006/main">
+  <p:cSld>
+    <p:bg>
+      <p:bgPr>
+        <a:blipFill dpi="0" rotWithShape="1">
+          <a:blip r:embed="rId3">
+            <a:alphaModFix amt="99000"/>
+            <a:lum/>
+          </a:blip>
+          <a:srcRect/>
+          <a:stretch>
+            <a:fillRect t="89000" r="85000" b="-1000"/>
+          </a:stretch>
+        </a:blipFill>
+        <a:effectLst/>
+      </p:bgPr>
+    </p:bg>
+    <p:spTree>
+      <p:nvGrpSpPr>
+        <p:cNvPr id="1" name=""/>
+        <p:cNvGrpSpPr/>
+        <p:nvPr/>
+      </p:nvGrpSpPr>
+      <p:grpSpPr>
+        <a:xfrm>
+          <a:off x="0" y="0"/>
+          <a:ext cx="0" cy="0"/>
+          <a:chOff x="0" y="0"/>
+          <a:chExt cx="0" cy="0"/>
+        </a:xfrm>
+      </p:grpSpPr>
+      <p:sp>
+        <p:nvSpPr>
+          <p:cNvPr id="2" name="Title 1">
+            <a:extLst>
+              <a:ext uri="{FF2B5EF4-FFF2-40B4-BE49-F238E27FC236}">
+                <a16:creationId xmlns:a16="http://schemas.microsoft.com/office/drawing/2014/main" id="{6A3DCE86-C2BA-4713-9E7A-73589E8D6CCF}"/>
+              </a:ext>
+            </a:extLst>
+          </p:cNvPr>
+          <p:cNvSpPr>
+            <a:spLocks noGrp="1"/>
+          </p:cNvSpPr>
+          <p:nvPr>
+            <p:ph type="ctrTitle"/>
+          </p:nvPr>
+        </p:nvSpPr>
+        <p:spPr>
+          <a:xfrm>
+            <a:off x="1524000" y="497150"/>
+            <a:ext cx="9144000" cy="718459"/>
+          </a:xfrm>
+        </p:spPr>
+        <p:txBody>
+          <a:bodyPr>
+            <a:normAutofit fontScale="90000"/>
+          </a:bodyPr>
+          <a:lstStyle/>
+          <a:p>
+            <a:r>
+              <a:rPr lang="en-PH" b="1" dirty="0"/>
+              <a:t>Common Thread Class Methods</a:t>
+            </a:r>
+          </a:p>
+        </p:txBody>
+      </p:sp>
+      <p:sp>
+        <p:nvSpPr>
+          <p:cNvPr id="4" name="Footer Placeholder 3">
+            <a:extLst>
+              <a:ext uri="{FF2B5EF4-FFF2-40B4-BE49-F238E27FC236}">
+                <a16:creationId xmlns:a16="http://schemas.microsoft.com/office/drawing/2014/main" id="{638E7DE1-45EE-476A-A474-0F3C264AEDA3}"/>
+              </a:ext>
+            </a:extLst>
+          </p:cNvPr>
+          <p:cNvSpPr>
+            <a:spLocks noGrp="1"/>
+          </p:cNvSpPr>
+          <p:nvPr>
+            <p:ph type="ftr" sz="quarter" idx="11"/>
+          </p:nvPr>
+        </p:nvSpPr>
+        <p:spPr>
+          <a:xfrm>
+            <a:off x="0" y="6139541"/>
+            <a:ext cx="12192000" cy="718459"/>
+          </a:xfrm>
+          <a:ln w="28575">
+            <a:solidFill>
+              <a:schemeClr val="accent5">
+                <a:lumMod val="50000"/>
+              </a:schemeClr>
+            </a:solidFill>
+          </a:ln>
+        </p:spPr>
+        <p:txBody>
+          <a:bodyPr/>
+          <a:lstStyle/>
+          <a:p>
+            <a:pPr algn="r"/>
+            <a:r>
+              <a:rPr lang="en-PH" b="1">
+                <a:solidFill>
+                  <a:schemeClr val="tx1"/>
+                </a:solidFill>
+              </a:rPr>
+              <a:t>CCPRGG2L</a:t>
+            </a:r>
+            <a:endParaRPr lang="en-PH" dirty="0"/>
+          </a:p>
+        </p:txBody>
+      </p:sp>
+      <p:graphicFrame>
+        <p:nvGraphicFramePr>
+          <p:cNvPr id="5" name="Table 5">
+            <a:extLst>
+              <a:ext uri="{FF2B5EF4-FFF2-40B4-BE49-F238E27FC236}">
+                <a16:creationId xmlns:a16="http://schemas.microsoft.com/office/drawing/2014/main" id="{57BA64CE-658F-D33F-0261-01D409004B96}"/>
+              </a:ext>
+            </a:extLst>
+          </p:cNvPr>
+          <p:cNvGraphicFramePr>
+            <a:graphicFrameLocks noGrp="1"/>
+          </p:cNvGraphicFramePr>
+          <p:nvPr>
+            <p:extLst>
+              <p:ext uri="{D42A27DB-BD31-4B8C-83A1-F6EECF244321}">
+                <p14:modId xmlns:p14="http://schemas.microsoft.com/office/powerpoint/2010/main" val="1271944968"/>
+              </p:ext>
+            </p:extLst>
+          </p:nvPr>
+        </p:nvGraphicFramePr>
+        <p:xfrm>
+          <a:off x="2032000" y="1513495"/>
+          <a:ext cx="8128000" cy="3855720"/>
+        </p:xfrm>
+        <a:graphic>
+          <a:graphicData uri="http://schemas.openxmlformats.org/drawingml/2006/table">
+            <a:tbl>
+              <a:tblPr firstRow="1" bandRow="1">
+                <a:tableStyleId>{5940675A-B579-460E-94D1-54222C63F5DA}</a:tableStyleId>
+              </a:tblPr>
+              <a:tblGrid>
+                <a:gridCol w="4064000">
+                  <a:extLst>
+                    <a:ext uri="{9D8B030D-6E8A-4147-A177-3AD203B41FA5}">
+                      <a16:colId xmlns:a16="http://schemas.microsoft.com/office/drawing/2014/main" val="3191554605"/>
+                    </a:ext>
+                  </a:extLst>
+                </a:gridCol>
+                <a:gridCol w="4064000">
+                  <a:extLst>
+                    <a:ext uri="{9D8B030D-6E8A-4147-A177-3AD203B41FA5}">
+                      <a16:colId xmlns:a16="http://schemas.microsoft.com/office/drawing/2014/main" val="4130678375"/>
+                    </a:ext>
+                  </a:extLst>
+                </a:gridCol>
+              </a:tblGrid>
+              <a:tr h="370840">
+                <a:tc>
+                  <a:txBody>
+                    <a:bodyPr/>
+                    <a:lstStyle/>
+                    <a:p>
+                      <a:pPr algn="ctr"/>
+                      <a:r>
+                        <a:rPr lang="en-PH" b="1" dirty="0"/>
+                        <a:t>Method</a:t>
+                      </a:r>
+                    </a:p>
+                  </a:txBody>
+                  <a:tcPr/>
+                </a:tc>
+                <a:tc>
+                  <a:txBody>
+                    <a:bodyPr/>
+                    <a:lstStyle/>
+                    <a:p>
+                      <a:pPr algn="ctr"/>
+                      <a:r>
+                        <a:rPr lang="en-PH" b="1" dirty="0"/>
+                        <a:t>Description</a:t>
+                      </a:r>
+                    </a:p>
+                  </a:txBody>
+                  <a:tcPr/>
+                </a:tc>
+                <a:extLst>
+                  <a:ext uri="{0D108BD9-81ED-4DB2-BD59-A6C34878D82A}">
+                    <a16:rowId xmlns:a16="http://schemas.microsoft.com/office/drawing/2014/main" val="2619032072"/>
+                  </a:ext>
+                </a:extLst>
+              </a:tr>
+              <a:tr h="370840">
+                <a:tc>
+                  <a:txBody>
+                    <a:bodyPr/>
+                    <a:lstStyle/>
+                    <a:p>
+                      <a:r>
+                        <a:rPr lang="en-PH" b="1" dirty="0" err="1">
+                          <a:solidFill>
+                            <a:srgbClr val="002060"/>
+                          </a:solidFill>
+                        </a:rPr>
+                        <a:t>setPriority</a:t>
+                      </a:r>
+                      <a:r>
+                        <a:rPr lang="en-PH" b="1" dirty="0">
+                          <a:solidFill>
+                            <a:srgbClr val="002060"/>
+                          </a:solidFill>
+                        </a:rPr>
+                        <a:t>()</a:t>
+                      </a:r>
+                    </a:p>
+                  </a:txBody>
+                  <a:tcPr/>
+                </a:tc>
+                <a:tc>
+                  <a:txBody>
+                    <a:bodyPr/>
+                    <a:lstStyle/>
+                    <a:p>
+                      <a:r>
+                        <a:rPr lang="en-PH" dirty="0"/>
+                        <a:t>Changes the priority of the thread</a:t>
+                      </a:r>
+                      <a:br>
+                        <a:rPr lang="en-PH" dirty="0"/>
+                      </a:br>
+                      <a:r>
+                        <a:rPr lang="en-PH" b="1" dirty="0"/>
+                        <a:t>1 </a:t>
+                      </a:r>
+                      <a:r>
+                        <a:rPr lang="en-PH" dirty="0"/>
+                        <a:t>– lowest priority</a:t>
+                      </a:r>
+                    </a:p>
+                    <a:p>
+                      <a:pPr marL="0" marR="0" lvl="0" indent="0" algn="l" defTabSz="914400" rtl="0" eaLnBrk="1" fontAlgn="auto" latinLnBrk="0" hangingPunct="1">
+                        <a:lnSpc>
+                          <a:spcPct val="100000"/>
+                        </a:lnSpc>
+                        <a:spcBef>
+                          <a:spcPts val="0"/>
+                        </a:spcBef>
+                        <a:spcAft>
+                          <a:spcPts val="0"/>
+                        </a:spcAft>
+                        <a:buClrTx/>
+                        <a:buSzTx/>
+                        <a:buFontTx/>
+                        <a:buNone/>
+                        <a:tabLst/>
+                        <a:defRPr/>
+                      </a:pPr>
+                      <a:r>
+                        <a:rPr lang="en-PH" b="1" dirty="0"/>
+                        <a:t>5</a:t>
+                      </a:r>
+                      <a:r>
+                        <a:rPr lang="en-PH" dirty="0"/>
+                        <a:t> – default priority</a:t>
+                      </a:r>
+                    </a:p>
+                    <a:p>
+                      <a:pPr marL="0" marR="0" lvl="0" indent="0" algn="l" defTabSz="914400" rtl="0" eaLnBrk="1" fontAlgn="auto" latinLnBrk="0" hangingPunct="1">
+                        <a:lnSpc>
+                          <a:spcPct val="100000"/>
+                        </a:lnSpc>
+                        <a:spcBef>
+                          <a:spcPts val="0"/>
+                        </a:spcBef>
+                        <a:spcAft>
+                          <a:spcPts val="0"/>
+                        </a:spcAft>
+                        <a:buClrTx/>
+                        <a:buSzTx/>
+                        <a:buFontTx/>
+                        <a:buNone/>
+                        <a:tabLst/>
+                        <a:defRPr/>
+                      </a:pPr>
+                      <a:r>
+                        <a:rPr lang="en-PH" b="1" dirty="0"/>
+                        <a:t>10 </a:t>
+                      </a:r>
+                      <a:r>
+                        <a:rPr lang="en-PH" dirty="0"/>
+                        <a:t>– Highest priority</a:t>
+                      </a:r>
+                    </a:p>
+                    <a:p>
+                      <a:endParaRPr lang="en-PH" dirty="0"/>
+                    </a:p>
+                  </a:txBody>
+                  <a:tcPr/>
+                </a:tc>
+                <a:extLst>
+                  <a:ext uri="{0D108BD9-81ED-4DB2-BD59-A6C34878D82A}">
+                    <a16:rowId xmlns:a16="http://schemas.microsoft.com/office/drawing/2014/main" val="919243701"/>
+                  </a:ext>
+                </a:extLst>
+              </a:tr>
+              <a:tr h="370840">
+                <a:tc>
+                  <a:txBody>
+                    <a:bodyPr/>
+                    <a:lstStyle/>
+                    <a:p>
+                      <a:r>
+                        <a:rPr lang="en-PH" b="1" dirty="0" err="1">
+                          <a:solidFill>
+                            <a:srgbClr val="002060"/>
+                          </a:solidFill>
+                        </a:rPr>
+                        <a:t>getPriority</a:t>
+                      </a:r>
+                      <a:r>
+                        <a:rPr lang="en-PH" b="1" dirty="0">
+                          <a:solidFill>
+                            <a:srgbClr val="002060"/>
+                          </a:solidFill>
+                        </a:rPr>
+                        <a:t>()</a:t>
+                      </a:r>
+                    </a:p>
+                  </a:txBody>
+                  <a:tcPr/>
+                </a:tc>
+                <a:tc>
+                  <a:txBody>
+                    <a:bodyPr/>
+                    <a:lstStyle/>
+                    <a:p>
+                      <a:pPr marL="0" marR="0" lvl="0" indent="0" algn="l" defTabSz="914400" rtl="0" eaLnBrk="1" fontAlgn="auto" latinLnBrk="0" hangingPunct="1">
+                        <a:lnSpc>
+                          <a:spcPct val="100000"/>
+                        </a:lnSpc>
+                        <a:spcBef>
+                          <a:spcPts val="0"/>
+                        </a:spcBef>
+                        <a:spcAft>
+                          <a:spcPts val="0"/>
+                        </a:spcAft>
+                        <a:buClrTx/>
+                        <a:buSzTx/>
+                        <a:buFontTx/>
+                        <a:buNone/>
+                        <a:tabLst/>
+                        <a:defRPr/>
+                      </a:pPr>
+                      <a:r>
+                        <a:rPr lang="en-PH" dirty="0"/>
+                        <a:t>Returns the priority of the thread</a:t>
+                      </a:r>
+                    </a:p>
+                  </a:txBody>
+                  <a:tcPr/>
+                </a:tc>
+                <a:extLst>
+                  <a:ext uri="{0D108BD9-81ED-4DB2-BD59-A6C34878D82A}">
+                    <a16:rowId xmlns:a16="http://schemas.microsoft.com/office/drawing/2014/main" val="2453742171"/>
+                  </a:ext>
+                </a:extLst>
+              </a:tr>
+              <a:tr h="370840">
+                <a:tc>
+                  <a:txBody>
+                    <a:bodyPr/>
+                    <a:lstStyle/>
+                    <a:p>
+                      <a:r>
+                        <a:rPr lang="en-PH" b="1" dirty="0" err="1">
+                          <a:solidFill>
+                            <a:srgbClr val="002060"/>
+                          </a:solidFill>
+                        </a:rPr>
+                        <a:t>isAlive</a:t>
+                      </a:r>
+                      <a:r>
+                        <a:rPr lang="en-PH" b="1" dirty="0">
+                          <a:solidFill>
+                            <a:srgbClr val="002060"/>
+                          </a:solidFill>
+                        </a:rPr>
+                        <a:t>()</a:t>
+                      </a:r>
+                    </a:p>
+                  </a:txBody>
+                  <a:tcPr/>
+                </a:tc>
+                <a:tc>
+                  <a:txBody>
+                    <a:bodyPr/>
+                    <a:lstStyle/>
+                    <a:p>
+                      <a:r>
+                        <a:rPr lang="en-PH" dirty="0"/>
+                        <a:t>Returns true if the thread is active</a:t>
+                      </a:r>
+                    </a:p>
+                  </a:txBody>
+                  <a:tcPr/>
+                </a:tc>
+                <a:extLst>
+                  <a:ext uri="{0D108BD9-81ED-4DB2-BD59-A6C34878D82A}">
+                    <a16:rowId xmlns:a16="http://schemas.microsoft.com/office/drawing/2014/main" val="2947490993"/>
+                  </a:ext>
+                </a:extLst>
+              </a:tr>
+              <a:tr h="370840">
+                <a:tc>
+                  <a:txBody>
+                    <a:bodyPr/>
+                    <a:lstStyle/>
+                    <a:p>
+                      <a:r>
+                        <a:rPr lang="en-PH" b="1" dirty="0" err="1">
+                          <a:solidFill>
+                            <a:srgbClr val="002060"/>
+                          </a:solidFill>
+                        </a:rPr>
+                        <a:t>isDaemon</a:t>
+                      </a:r>
+                      <a:r>
+                        <a:rPr lang="en-PH" b="1" dirty="0">
+                          <a:solidFill>
+                            <a:srgbClr val="002060"/>
+                          </a:solidFill>
+                        </a:rPr>
+                        <a:t>()</a:t>
+                      </a:r>
+                    </a:p>
+                  </a:txBody>
+                  <a:tcPr/>
+                </a:tc>
+                <a:tc>
+                  <a:txBody>
+                    <a:bodyPr/>
+                    <a:lstStyle/>
+                    <a:p>
+                      <a:r>
+                        <a:rPr lang="en-PH" dirty="0"/>
+                        <a:t>Returns true if the thread is a Daemon thread.</a:t>
+                      </a:r>
+                    </a:p>
+                  </a:txBody>
+                  <a:tcPr/>
+                </a:tc>
+                <a:extLst>
+                  <a:ext uri="{0D108BD9-81ED-4DB2-BD59-A6C34878D82A}">
+                    <a16:rowId xmlns:a16="http://schemas.microsoft.com/office/drawing/2014/main" val="1806844972"/>
+                  </a:ext>
+                </a:extLst>
+              </a:tr>
+              <a:tr h="370840">
+                <a:tc>
+                  <a:txBody>
+                    <a:bodyPr/>
+                    <a:lstStyle/>
+                    <a:p>
+                      <a:r>
+                        <a:rPr lang="en-PH" b="1" dirty="0" err="1">
+                          <a:solidFill>
+                            <a:srgbClr val="002060"/>
+                          </a:solidFill>
+                        </a:rPr>
+                        <a:t>setDaemon</a:t>
+                      </a:r>
+                      <a:r>
+                        <a:rPr lang="en-PH" b="1" dirty="0">
+                          <a:solidFill>
+                            <a:srgbClr val="002060"/>
+                          </a:solidFill>
+                        </a:rPr>
+                        <a:t>()</a:t>
+                      </a:r>
+                    </a:p>
+                  </a:txBody>
+                  <a:tcPr/>
+                </a:tc>
+                <a:tc>
+                  <a:txBody>
+                    <a:bodyPr/>
+                    <a:lstStyle/>
+                    <a:p>
+                      <a:r>
+                        <a:rPr lang="en-PH" dirty="0"/>
+                        <a:t>Marks the thread as a daemon or user thread</a:t>
+                      </a:r>
+                    </a:p>
+                  </a:txBody>
+                  <a:tcPr/>
+                </a:tc>
+                <a:extLst>
+                  <a:ext uri="{0D108BD9-81ED-4DB2-BD59-A6C34878D82A}">
+                    <a16:rowId xmlns:a16="http://schemas.microsoft.com/office/drawing/2014/main" val="3403576372"/>
+                  </a:ext>
+                </a:extLst>
+              </a:tr>
+            </a:tbl>
+          </a:graphicData>
+        </a:graphic>
+      </p:graphicFrame>
+    </p:spTree>
+    <p:extLst>
+      <p:ext uri="{BB962C8B-B14F-4D97-AF65-F5344CB8AC3E}">
+        <p14:creationId xmlns:p14="http://schemas.microsoft.com/office/powerpoint/2010/main" val="3522589436"/>
+      </p:ext>
+    </p:extLst>
+  </p:cSld>
+  <p:clrMapOvr>
+    <a:masterClrMapping/>
+  </p:clrMapOvr>
+</p:sld>
+</file>
+
+<file path=ppt/slides/slide14.xml><?xml version="1.0" encoding="utf-8"?>
+<p:sld xmlns:a="http://schemas.openxmlformats.org/drawingml/2006/main" xmlns:r="http://schemas.openxmlformats.org/officeDocument/2006/relationships" xmlns:p="http://schemas.openxmlformats.org/presentationml/2006/main">
+  <p:cSld>
+    <p:bg>
+      <p:bgPr>
+        <a:blipFill dpi="0" rotWithShape="1">
+          <a:blip r:embed="rId3">
+            <a:alphaModFix amt="99000"/>
+            <a:lum/>
+          </a:blip>
+          <a:srcRect/>
+          <a:stretch>
+            <a:fillRect t="89000" r="85000" b="-1000"/>
+          </a:stretch>
+        </a:blipFill>
+        <a:effectLst/>
+      </p:bgPr>
+    </p:bg>
+    <p:spTree>
+      <p:nvGrpSpPr>
+        <p:cNvPr id="1" name=""/>
+        <p:cNvGrpSpPr/>
+        <p:nvPr/>
+      </p:nvGrpSpPr>
+      <p:grpSpPr>
+        <a:xfrm>
+          <a:off x="0" y="0"/>
+          <a:ext cx="0" cy="0"/>
+          <a:chOff x="0" y="0"/>
+          <a:chExt cx="0" cy="0"/>
+        </a:xfrm>
+      </p:grpSpPr>
+      <p:sp>
+        <p:nvSpPr>
+          <p:cNvPr id="2" name="Title 1">
+            <a:extLst>
+              <a:ext uri="{FF2B5EF4-FFF2-40B4-BE49-F238E27FC236}">
+                <a16:creationId xmlns:a16="http://schemas.microsoft.com/office/drawing/2014/main" id="{6A3DCE86-C2BA-4713-9E7A-73589E8D6CCF}"/>
+              </a:ext>
+            </a:extLst>
+          </p:cNvPr>
+          <p:cNvSpPr>
+            <a:spLocks noGrp="1"/>
+          </p:cNvSpPr>
+          <p:nvPr>
+            <p:ph type="ctrTitle"/>
+          </p:nvPr>
+        </p:nvSpPr>
+        <p:spPr>
+          <a:xfrm>
+            <a:off x="1524000" y="497150"/>
+            <a:ext cx="9144000" cy="718459"/>
+          </a:xfrm>
+        </p:spPr>
+        <p:txBody>
+          <a:bodyPr>
+            <a:normAutofit fontScale="90000"/>
+          </a:bodyPr>
+          <a:lstStyle/>
+          <a:p>
+            <a:r>
+              <a:rPr lang="en-PH" b="1" dirty="0"/>
+              <a:t>Daemon Threads</a:t>
+            </a:r>
+          </a:p>
+        </p:txBody>
+      </p:sp>
+      <p:sp>
+        <p:nvSpPr>
+          <p:cNvPr id="4" name="Footer Placeholder 3">
+            <a:extLst>
+              <a:ext uri="{FF2B5EF4-FFF2-40B4-BE49-F238E27FC236}">
+                <a16:creationId xmlns:a16="http://schemas.microsoft.com/office/drawing/2014/main" id="{638E7DE1-45EE-476A-A474-0F3C264AEDA3}"/>
+              </a:ext>
+            </a:extLst>
+          </p:cNvPr>
+          <p:cNvSpPr>
+            <a:spLocks noGrp="1"/>
+          </p:cNvSpPr>
+          <p:nvPr>
+            <p:ph type="ftr" sz="quarter" idx="11"/>
+          </p:nvPr>
+        </p:nvSpPr>
+        <p:spPr>
+          <a:xfrm>
+            <a:off x="0" y="6139541"/>
+            <a:ext cx="12192000" cy="718459"/>
+          </a:xfrm>
+          <a:ln w="28575">
+            <a:solidFill>
+              <a:schemeClr val="accent5">
+                <a:lumMod val="50000"/>
+              </a:schemeClr>
+            </a:solidFill>
+          </a:ln>
+        </p:spPr>
+        <p:txBody>
+          <a:bodyPr/>
+          <a:lstStyle/>
+          <a:p>
+            <a:pPr algn="r"/>
+            <a:r>
+              <a:rPr lang="en-PH" b="1">
+                <a:solidFill>
+                  <a:schemeClr val="tx1"/>
+                </a:solidFill>
+              </a:rPr>
+              <a:t>CCPRGG2L</a:t>
+            </a:r>
+            <a:endParaRPr lang="en-PH" dirty="0"/>
+          </a:p>
+        </p:txBody>
+      </p:sp>
+      <p:sp>
+        <p:nvSpPr>
+          <p:cNvPr id="3" name="TextBox 2">
+            <a:extLst>
+              <a:ext uri="{FF2B5EF4-FFF2-40B4-BE49-F238E27FC236}">
+                <a16:creationId xmlns:a16="http://schemas.microsoft.com/office/drawing/2014/main" id="{3585BB4D-48BF-F4D5-0836-77023A1B410A}"/>
+              </a:ext>
+            </a:extLst>
+          </p:cNvPr>
+          <p:cNvSpPr txBox="1"/>
+          <p:nvPr/>
+        </p:nvSpPr>
+        <p:spPr>
+          <a:xfrm>
+            <a:off x="1524000" y="1515649"/>
+            <a:ext cx="9144000" cy="1631216"/>
+          </a:xfrm>
+          <a:prstGeom prst="rect">
+            <a:avLst/>
+          </a:prstGeom>
+          <a:noFill/>
+        </p:spPr>
+        <p:txBody>
+          <a:bodyPr wrap="square" rtlCol="0">
+            <a:spAutoFit/>
+          </a:bodyPr>
+          <a:lstStyle/>
+          <a:p>
+            <a:pPr marL="342900" indent="-342900" algn="l">
+              <a:buFont typeface="Wingdings" panose="05000000000000000000" pitchFamily="2" charset="2"/>
+              <a:buChar char="q"/>
+            </a:pPr>
+            <a:r>
+              <a:rPr lang="en-US" sz="2500" dirty="0"/>
+              <a:t>A low priority thread that runs in background to perform tasks such as garbage collection.</a:t>
+            </a:r>
+          </a:p>
+          <a:p>
+            <a:pPr marL="342900" indent="-342900" algn="l">
+              <a:buFont typeface="Wingdings" panose="05000000000000000000" pitchFamily="2" charset="2"/>
+              <a:buChar char="q"/>
+            </a:pPr>
+            <a:endParaRPr lang="en-US" sz="2500" dirty="0"/>
+          </a:p>
+          <a:p>
+            <a:pPr marL="342900" indent="-342900" algn="l">
+              <a:buFont typeface="Wingdings" panose="05000000000000000000" pitchFamily="2" charset="2"/>
+              <a:buChar char="q"/>
+            </a:pPr>
+            <a:r>
+              <a:rPr lang="en-US" sz="2500" dirty="0"/>
+              <a:t>All non-daemon threads are referred to as </a:t>
+            </a:r>
+            <a:r>
+              <a:rPr lang="en-US" sz="2500" b="1" dirty="0"/>
+              <a:t>User threads</a:t>
+            </a:r>
+            <a:r>
+              <a:rPr lang="en-US" sz="2500" dirty="0"/>
+              <a:t>.</a:t>
+            </a:r>
+          </a:p>
+        </p:txBody>
+      </p:sp>
+    </p:spTree>
+    <p:extLst>
+      <p:ext uri="{BB962C8B-B14F-4D97-AF65-F5344CB8AC3E}">
+        <p14:creationId xmlns:p14="http://schemas.microsoft.com/office/powerpoint/2010/main" val="134539261"/>
       </p:ext>
     </p:extLst>
   </p:cSld>
@@ -5723,7 +7534,7 @@
           <a:p>
             <a:r>
               <a:rPr lang="en-PH" b="1" dirty="0"/>
-              <a:t>Creating a thread</a:t>
+              <a:t>What is Multithreading?</a:t>
             </a:r>
           </a:p>
         </p:txBody>
@@ -5789,7 +7600,7 @@
         <p:spPr>
           <a:xfrm>
             <a:off x="1524000" y="1509386"/>
-            <a:ext cx="9144000" cy="1384995"/>
+            <a:ext cx="9144000" cy="5093702"/>
           </a:xfrm>
           <a:prstGeom prst="rect">
             <a:avLst/>
@@ -5802,114 +7613,103 @@
           </a:bodyPr>
           <a:lstStyle/>
           <a:p>
-            <a:pPr marL="457200" indent="-457200" algn="just" fontAlgn="base">
+            <a:pPr marL="342900" indent="-342900" algn="l">
               <a:buFont typeface="Wingdings" panose="05000000000000000000" pitchFamily="2" charset="2"/>
               <a:buChar char="q"/>
             </a:pPr>
             <a:r>
-              <a:rPr lang="en-US" sz="2800" dirty="0">
-                <a:solidFill>
-                  <a:srgbClr val="273239"/>
-                </a:solidFill>
-                <a:latin typeface="urw-din"/>
-              </a:rPr>
-              <a:t>E</a:t>
-            </a:r>
-            <a:r>
-              <a:rPr lang="en-US" sz="2800" b="0" i="0" dirty="0">
-                <a:solidFill>
-                  <a:srgbClr val="273239"/>
-                </a:solidFill>
-                <a:effectLst/>
-                <a:latin typeface="urw-din"/>
-              </a:rPr>
-              <a:t>xtending </a:t>
-            </a:r>
-            <a:r>
-              <a:rPr lang="en-US" sz="2800" dirty="0">
-                <a:solidFill>
-                  <a:srgbClr val="273239"/>
-                </a:solidFill>
-                <a:latin typeface="urw-din"/>
-              </a:rPr>
-              <a:t>the </a:t>
-            </a:r>
-            <a:r>
-              <a:rPr lang="en-US" sz="2800" b="1" i="0" dirty="0">
-                <a:solidFill>
-                  <a:srgbClr val="273239"/>
-                </a:solidFill>
-                <a:effectLst/>
-                <a:latin typeface="urw-din"/>
-              </a:rPr>
-              <a:t>Thread</a:t>
-            </a:r>
-            <a:r>
-              <a:rPr lang="en-US" sz="2800" b="0" i="0" dirty="0">
-                <a:solidFill>
-                  <a:srgbClr val="273239"/>
-                </a:solidFill>
-                <a:effectLst/>
-                <a:latin typeface="urw-din"/>
-              </a:rPr>
-              <a:t> Class.</a:t>
-            </a:r>
-          </a:p>
-          <a:p>
-            <a:pPr marL="457200" indent="-457200" algn="just" fontAlgn="base">
+              <a:rPr lang="en-US" sz="2500" dirty="0"/>
+              <a:t>The process of executing multiple threads simultaneously.</a:t>
+            </a:r>
+          </a:p>
+          <a:p>
+            <a:pPr marL="342900" indent="-342900" algn="l">
               <a:buFont typeface="Wingdings" panose="05000000000000000000" pitchFamily="2" charset="2"/>
               <a:buChar char="q"/>
             </a:pPr>
-            <a:endParaRPr lang="en-US" sz="2800" b="0" i="0" dirty="0">
-              <a:solidFill>
-                <a:srgbClr val="273239"/>
-              </a:solidFill>
-              <a:effectLst/>
-              <a:latin typeface="urw-din"/>
-            </a:endParaRPr>
-          </a:p>
-          <a:p>
-            <a:pPr marL="457200" indent="-457200" algn="just" fontAlgn="base">
+            <a:endParaRPr lang="en-US" sz="2500" dirty="0"/>
+          </a:p>
+          <a:p>
+            <a:pPr marL="342900" indent="-342900" algn="l">
               <a:buFont typeface="Wingdings" panose="05000000000000000000" pitchFamily="2" charset="2"/>
               <a:buChar char="q"/>
             </a:pPr>
             <a:r>
-              <a:rPr lang="en-US" sz="2800" b="0" i="0" dirty="0">
-                <a:solidFill>
-                  <a:srgbClr val="273239"/>
-                </a:solidFill>
-                <a:effectLst/>
-                <a:latin typeface="urw-din"/>
-              </a:rPr>
-              <a:t>Implementing a </a:t>
-            </a:r>
-            <a:r>
-              <a:rPr lang="en-US" sz="2800" b="1" i="0" dirty="0">
-                <a:solidFill>
-                  <a:srgbClr val="273239"/>
-                </a:solidFill>
-                <a:effectLst/>
-                <a:latin typeface="urw-din"/>
-              </a:rPr>
-              <a:t>Runnable</a:t>
-            </a:r>
-            <a:r>
-              <a:rPr lang="en-US" sz="2800" b="0" i="0" dirty="0">
-                <a:solidFill>
-                  <a:srgbClr val="273239"/>
-                </a:solidFill>
-                <a:effectLst/>
-                <a:latin typeface="urw-din"/>
-              </a:rPr>
-              <a:t> interface.</a:t>
-            </a:r>
+              <a:rPr lang="en-US" sz="2500" dirty="0"/>
+              <a:t>Helps maximum utilization of the CPU.</a:t>
+            </a:r>
+          </a:p>
+          <a:p>
+            <a:pPr marL="342900" indent="-342900" algn="l">
+              <a:buFont typeface="Wingdings" panose="05000000000000000000" pitchFamily="2" charset="2"/>
+              <a:buChar char="q"/>
+            </a:pPr>
+            <a:endParaRPr lang="en-US" sz="2500" dirty="0"/>
+          </a:p>
+          <a:p>
+            <a:pPr marL="342900" indent="-342900" algn="l">
+              <a:buFont typeface="Wingdings" panose="05000000000000000000" pitchFamily="2" charset="2"/>
+              <a:buChar char="q"/>
+            </a:pPr>
+            <a:r>
+              <a:rPr lang="en-US" sz="2500" dirty="0"/>
+              <a:t>Each thread are independent, they do not affect execution of other threads.</a:t>
+            </a:r>
+          </a:p>
+          <a:p>
+            <a:pPr marL="342900" indent="-342900" algn="l">
+              <a:buFont typeface="Wingdings" panose="05000000000000000000" pitchFamily="2" charset="2"/>
+              <a:buChar char="q"/>
+            </a:pPr>
+            <a:endParaRPr lang="en-US" sz="2500" dirty="0"/>
+          </a:p>
+          <a:p>
+            <a:pPr marL="342900" indent="-342900" algn="l">
+              <a:buFont typeface="Wingdings" panose="05000000000000000000" pitchFamily="2" charset="2"/>
+              <a:buChar char="q"/>
+            </a:pPr>
+            <a:r>
+              <a:rPr lang="en-US" sz="2500" dirty="0"/>
+              <a:t>An exception in one thread will not interrupt other threads</a:t>
+            </a:r>
+          </a:p>
+          <a:p>
+            <a:pPr marL="342900" indent="-342900" algn="l">
+              <a:buFont typeface="Wingdings" panose="05000000000000000000" pitchFamily="2" charset="2"/>
+              <a:buChar char="q"/>
+            </a:pPr>
+            <a:endParaRPr lang="en-US" sz="2500" dirty="0"/>
+          </a:p>
+          <a:p>
+            <a:pPr marL="342900" indent="-342900" algn="l">
+              <a:buFont typeface="Wingdings" panose="05000000000000000000" pitchFamily="2" charset="2"/>
+              <a:buChar char="q"/>
+            </a:pPr>
+            <a:r>
+              <a:rPr lang="en-US" sz="2500" dirty="0"/>
+              <a:t>Mostly used for serving multiple clients, multiplayer games or other mutually independent tasks.</a:t>
+            </a:r>
+          </a:p>
+          <a:p>
+            <a:pPr marL="342900" indent="-342900" algn="l">
+              <a:buFont typeface="Wingdings" panose="05000000000000000000" pitchFamily="2" charset="2"/>
+              <a:buChar char="q"/>
+            </a:pPr>
+            <a:endParaRPr lang="en-US" sz="2500" dirty="0"/>
+          </a:p>
+          <a:p>
+            <a:pPr marL="342900" indent="-342900" algn="l">
+              <a:buFont typeface="Wingdings" panose="05000000000000000000" pitchFamily="2" charset="2"/>
+              <a:buChar char="q"/>
+            </a:pPr>
+            <a:endParaRPr lang="en-US" sz="2500" dirty="0"/>
           </a:p>
         </p:txBody>
       </p:sp>
     </p:spTree>
     <p:extLst>
       <p:ext uri="{BB962C8B-B14F-4D97-AF65-F5344CB8AC3E}">
-        <p14:creationId xmlns:p14="http://schemas.microsoft.com/office/powerpoint/2010/main" val="1809970441"/>
+        <p14:creationId xmlns:p14="http://schemas.microsoft.com/office/powerpoint/2010/main" val="3120585888"/>
       </p:ext>
     </p:extLst>
   </p:cSld>
@@ -5981,7 +7781,7 @@
           <a:p>
             <a:r>
               <a:rPr lang="en-PH" b="1" dirty="0"/>
-              <a:t>Extending the Thread Class</a:t>
+              <a:t>Creating a thread</a:t>
             </a:r>
           </a:p>
         </p:txBody>
@@ -6034,10 +7834,10 @@
       </p:sp>
       <p:sp>
         <p:nvSpPr>
-          <p:cNvPr id="5" name="TextBox 4">
-            <a:extLst>
-              <a:ext uri="{FF2B5EF4-FFF2-40B4-BE49-F238E27FC236}">
-                <a16:creationId xmlns:a16="http://schemas.microsoft.com/office/drawing/2014/main" id="{F9AC5282-A147-49E6-959C-FAD202E26B2C}"/>
+          <p:cNvPr id="3" name="TextBox 2">
+            <a:extLst>
+              <a:ext uri="{FF2B5EF4-FFF2-40B4-BE49-F238E27FC236}">
+                <a16:creationId xmlns:a16="http://schemas.microsoft.com/office/drawing/2014/main" id="{96543C04-C868-4D51-86F6-424469F84118}"/>
               </a:ext>
             </a:extLst>
           </p:cNvPr>
@@ -6046,8 +7846,8 @@
         </p:nvSpPr>
         <p:spPr>
           <a:xfrm>
-            <a:off x="1523999" y="1647024"/>
-            <a:ext cx="6887227" cy="477054"/>
+            <a:off x="1524000" y="1509386"/>
+            <a:ext cx="9144000" cy="1384995"/>
           </a:xfrm>
           <a:prstGeom prst="rect">
             <a:avLst/>
@@ -6060,474 +7860,120 @@
           </a:bodyPr>
           <a:lstStyle/>
           <a:p>
-            <a:r>
-              <a:rPr lang="en-PH" sz="2500" dirty="0">
+            <a:pPr marL="457200" indent="-457200" algn="just" fontAlgn="base">
+              <a:buFont typeface="Wingdings" panose="05000000000000000000" pitchFamily="2" charset="2"/>
+              <a:buChar char="q"/>
+            </a:pPr>
+            <a:r>
+              <a:rPr lang="en-US" sz="2800" dirty="0">
                 <a:solidFill>
-                  <a:srgbClr val="7030A0"/>
+                  <a:srgbClr val="273239"/>
                 </a:solidFill>
-                <a:latin typeface="Consolas" panose="020B0609020204030204" pitchFamily="49" charset="0"/>
+                <a:latin typeface="urw-din"/>
               </a:rPr>
-              <a:t>public class </a:t>
-            </a:r>
-            <a:r>
-              <a:rPr lang="en-PH" sz="2500" dirty="0" err="1">
+              <a:t>E</a:t>
+            </a:r>
+            <a:r>
+              <a:rPr lang="en-US" sz="2800" b="0" i="0" dirty="0">
                 <a:solidFill>
-                  <a:srgbClr val="0070C0"/>
+                  <a:srgbClr val="273239"/>
                 </a:solidFill>
-                <a:latin typeface="Consolas" panose="020B0609020204030204" pitchFamily="49" charset="0"/>
+                <a:effectLst/>
+                <a:latin typeface="urw-din"/>
               </a:rPr>
-              <a:t>myThread</a:t>
-            </a:r>
-            <a:r>
-              <a:rPr lang="en-PH" sz="2500" dirty="0">
+              <a:t>xtending </a:t>
+            </a:r>
+            <a:r>
+              <a:rPr lang="en-US" sz="2800" dirty="0">
                 <a:solidFill>
-                  <a:srgbClr val="7030A0"/>
+                  <a:srgbClr val="273239"/>
                 </a:solidFill>
-                <a:latin typeface="Consolas" panose="020B0609020204030204" pitchFamily="49" charset="0"/>
+                <a:latin typeface="urw-din"/>
               </a:rPr>
-              <a:t> extends </a:t>
-            </a:r>
-            <a:r>
-              <a:rPr lang="en-PH" sz="2500" dirty="0">
+              <a:t>the </a:t>
+            </a:r>
+            <a:r>
+              <a:rPr lang="en-US" sz="2800" b="1" i="0" dirty="0">
                 <a:solidFill>
-                  <a:srgbClr val="0070C0"/>
+                  <a:srgbClr val="273239"/>
                 </a:solidFill>
-                <a:latin typeface="Consolas" panose="020B0609020204030204" pitchFamily="49" charset="0"/>
+                <a:effectLst/>
+                <a:latin typeface="urw-din"/>
               </a:rPr>
-              <a:t>Thread </a:t>
-            </a:r>
-            <a:r>
-              <a:rPr lang="en-PH" sz="2500" dirty="0">
-                <a:latin typeface="Consolas" panose="020B0609020204030204" pitchFamily="49" charset="0"/>
+              <a:t>Thread</a:t>
+            </a:r>
+            <a:r>
+              <a:rPr lang="en-US" sz="2800" b="0" i="0" dirty="0">
+                <a:solidFill>
+                  <a:srgbClr val="273239"/>
+                </a:solidFill>
+                <a:effectLst/>
+                <a:latin typeface="urw-din"/>
               </a:rPr>
-              <a:t>{</a:t>
-            </a:r>
-            <a:endParaRPr lang="en-PH" sz="2500" dirty="0"/>
-          </a:p>
-        </p:txBody>
-      </p:sp>
-      <p:sp>
-        <p:nvSpPr>
-          <p:cNvPr id="9" name="TextBox 8">
-            <a:extLst>
-              <a:ext uri="{FF2B5EF4-FFF2-40B4-BE49-F238E27FC236}">
-                <a16:creationId xmlns:a16="http://schemas.microsoft.com/office/drawing/2014/main" id="{323B4072-E162-690F-F474-35AF6637EA82}"/>
-              </a:ext>
-            </a:extLst>
-          </p:cNvPr>
-          <p:cNvSpPr txBox="1"/>
-          <p:nvPr/>
-        </p:nvSpPr>
-        <p:spPr>
-          <a:xfrm>
-            <a:off x="1523999" y="4198441"/>
-            <a:ext cx="375781" cy="477054"/>
-          </a:xfrm>
-          <a:prstGeom prst="rect">
-            <a:avLst/>
-          </a:prstGeom>
-          <a:noFill/>
-        </p:spPr>
-        <p:txBody>
-          <a:bodyPr wrap="square" rtlCol="0">
-            <a:spAutoFit/>
-          </a:bodyPr>
-          <a:lstStyle/>
-          <a:p>
-            <a:r>
-              <a:rPr lang="en-PH" sz="2500" dirty="0">
-                <a:latin typeface="Consolas" panose="020B0609020204030204" pitchFamily="49" charset="0"/>
+              <a:t> Class.</a:t>
+            </a:r>
+          </a:p>
+          <a:p>
+            <a:pPr marL="457200" indent="-457200" algn="just" fontAlgn="base">
+              <a:buFont typeface="Wingdings" panose="05000000000000000000" pitchFamily="2" charset="2"/>
+              <a:buChar char="q"/>
+            </a:pPr>
+            <a:endParaRPr lang="en-US" sz="2800" b="0" i="0" dirty="0">
+              <a:solidFill>
+                <a:srgbClr val="273239"/>
+              </a:solidFill>
+              <a:effectLst/>
+              <a:latin typeface="urw-din"/>
+            </a:endParaRPr>
+          </a:p>
+          <a:p>
+            <a:pPr marL="457200" indent="-457200" algn="just" fontAlgn="base">
+              <a:buFont typeface="Wingdings" panose="05000000000000000000" pitchFamily="2" charset="2"/>
+              <a:buChar char="q"/>
+            </a:pPr>
+            <a:r>
+              <a:rPr lang="en-US" sz="2800" b="0" i="0" dirty="0">
+                <a:solidFill>
+                  <a:srgbClr val="273239"/>
+                </a:solidFill>
+                <a:effectLst/>
+                <a:latin typeface="urw-din"/>
               </a:rPr>
-              <a:t>}</a:t>
-            </a:r>
-            <a:endParaRPr lang="en-PH" sz="2500" dirty="0"/>
-          </a:p>
-        </p:txBody>
-      </p:sp>
-      <p:sp>
-        <p:nvSpPr>
-          <p:cNvPr id="10" name="TextBox 9">
-            <a:extLst>
-              <a:ext uri="{FF2B5EF4-FFF2-40B4-BE49-F238E27FC236}">
-                <a16:creationId xmlns:a16="http://schemas.microsoft.com/office/drawing/2014/main" id="{4D0F0BAC-48BC-12D7-4628-028A500146AF}"/>
-              </a:ext>
-            </a:extLst>
-          </p:cNvPr>
-          <p:cNvSpPr txBox="1"/>
-          <p:nvPr/>
-        </p:nvSpPr>
-        <p:spPr>
-          <a:xfrm>
-            <a:off x="1899781" y="2421032"/>
-            <a:ext cx="8240038" cy="2015936"/>
-          </a:xfrm>
-          <a:prstGeom prst="rect">
-            <a:avLst/>
-          </a:prstGeom>
-          <a:noFill/>
-        </p:spPr>
-        <p:txBody>
-          <a:bodyPr wrap="square" rtlCol="0">
-            <a:spAutoFit/>
-          </a:bodyPr>
-          <a:lstStyle/>
-          <a:p>
-            <a:r>
-              <a:rPr lang="en-PH" sz="2500" dirty="0">
+              <a:t>Implementing a </a:t>
+            </a:r>
+            <a:r>
+              <a:rPr lang="en-US" sz="2800" b="1" i="0" dirty="0">
                 <a:solidFill>
-                  <a:srgbClr val="7030A0"/>
+                  <a:srgbClr val="273239"/>
                 </a:solidFill>
-                <a:latin typeface="Consolas" panose="020B0609020204030204" pitchFamily="49" charset="0"/>
+                <a:effectLst/>
+                <a:latin typeface="urw-din"/>
               </a:rPr>
-              <a:t>public</a:t>
-            </a:r>
-            <a:r>
-              <a:rPr lang="en-PH" sz="2500" dirty="0">
-                <a:latin typeface="Consolas" panose="020B0609020204030204" pitchFamily="49" charset="0"/>
+              <a:t>Runnable</a:t>
+            </a:r>
+            <a:r>
+              <a:rPr lang="en-US" sz="2800" b="0" i="0" dirty="0">
+                <a:solidFill>
+                  <a:srgbClr val="273239"/>
+                </a:solidFill>
+                <a:effectLst/>
+                <a:latin typeface="urw-din"/>
               </a:rPr>
-              <a:t> </a:t>
-            </a:r>
-            <a:r>
-              <a:rPr lang="en-PH" sz="2500" dirty="0">
-                <a:solidFill>
-                  <a:srgbClr val="00B0F0"/>
-                </a:solidFill>
-                <a:latin typeface="Consolas" panose="020B0609020204030204" pitchFamily="49" charset="0"/>
-              </a:rPr>
-              <a:t>void </a:t>
-            </a:r>
-            <a:r>
-              <a:rPr lang="en-PH" sz="2500" dirty="0">
-                <a:solidFill>
-                  <a:srgbClr val="0070C0"/>
-                </a:solidFill>
-                <a:latin typeface="Consolas" panose="020B0609020204030204" pitchFamily="49" charset="0"/>
-              </a:rPr>
-              <a:t>run</a:t>
-            </a:r>
-            <a:r>
-              <a:rPr lang="en-PH" sz="2500" dirty="0">
-                <a:latin typeface="Consolas" panose="020B0609020204030204" pitchFamily="49" charset="0"/>
-              </a:rPr>
-              <a:t>() {</a:t>
-            </a:r>
-          </a:p>
-          <a:p>
-            <a:endParaRPr lang="en-PH" sz="2500" dirty="0">
-              <a:latin typeface="Consolas" panose="020B0609020204030204" pitchFamily="49" charset="0"/>
-            </a:endParaRPr>
-          </a:p>
-          <a:p>
-            <a:r>
-              <a:rPr lang="en-PH" sz="2500" dirty="0">
-                <a:latin typeface="Consolas" panose="020B0609020204030204" pitchFamily="49" charset="0"/>
-              </a:rPr>
-              <a:t>	</a:t>
-            </a:r>
-            <a:r>
-              <a:rPr lang="en-PH" sz="2500" dirty="0" err="1">
-                <a:latin typeface="Consolas" panose="020B0609020204030204" pitchFamily="49" charset="0"/>
-              </a:rPr>
-              <a:t>System.out.println</a:t>
-            </a:r>
-            <a:r>
-              <a:rPr lang="en-PH" sz="2500" dirty="0">
-                <a:latin typeface="Consolas" panose="020B0609020204030204" pitchFamily="49" charset="0"/>
-              </a:rPr>
-              <a:t>(“Thread is running”);</a:t>
-            </a:r>
-          </a:p>
-          <a:p>
-            <a:r>
-              <a:rPr lang="en-PH" sz="2500" dirty="0">
-                <a:latin typeface="Consolas" panose="020B0609020204030204" pitchFamily="49" charset="0"/>
-              </a:rPr>
-              <a:t>}</a:t>
-            </a:r>
-          </a:p>
-          <a:p>
-            <a:endParaRPr lang="en-PH" sz="2500" dirty="0"/>
+              <a:t> interface.</a:t>
+            </a:r>
           </a:p>
         </p:txBody>
       </p:sp>
     </p:spTree>
     <p:extLst>
       <p:ext uri="{BB962C8B-B14F-4D97-AF65-F5344CB8AC3E}">
-        <p14:creationId xmlns:p14="http://schemas.microsoft.com/office/powerpoint/2010/main" val="3970590419"/>
+        <p14:creationId xmlns:p14="http://schemas.microsoft.com/office/powerpoint/2010/main" val="1809970441"/>
       </p:ext>
     </p:extLst>
   </p:cSld>
   <p:clrMapOvr>
     <a:masterClrMapping/>
   </p:clrMapOvr>
-  <p:timing>
-    <p:tnLst>
-      <p:par>
-        <p:cTn id="1" dur="indefinite" restart="never" nodeType="tmRoot">
-          <p:childTnLst>
-            <p:seq concurrent="1" nextAc="seek">
-              <p:cTn id="2" dur="indefinite" nodeType="mainSeq">
-                <p:childTnLst>
-                  <p:par>
-                    <p:cTn id="3" fill="hold">
-                      <p:stCondLst>
-                        <p:cond delay="indefinite"/>
-                      </p:stCondLst>
-                      <p:childTnLst>
-                        <p:par>
-                          <p:cTn id="4" fill="hold">
-                            <p:stCondLst>
-                              <p:cond delay="0"/>
-                            </p:stCondLst>
-                            <p:childTnLst>
-                              <p:par>
-                                <p:cTn id="5" presetID="14" presetClass="entr" presetSubtype="10" fill="hold" grpId="0" nodeType="clickEffect">
-                                  <p:stCondLst>
-                                    <p:cond delay="0"/>
-                                  </p:stCondLst>
-                                  <p:childTnLst>
-                                    <p:set>
-                                      <p:cBhvr>
-                                        <p:cTn id="6" dur="1" fill="hold">
-                                          <p:stCondLst>
-                                            <p:cond delay="0"/>
-                                          </p:stCondLst>
-                                        </p:cTn>
-                                        <p:tgtEl>
-                                          <p:spTgt spid="5"/>
-                                        </p:tgtEl>
-                                        <p:attrNameLst>
-                                          <p:attrName>style.visibility</p:attrName>
-                                        </p:attrNameLst>
-                                      </p:cBhvr>
-                                      <p:to>
-                                        <p:strVal val="visible"/>
-                                      </p:to>
-                                    </p:set>
-                                    <p:animEffect transition="in" filter="randombar(horizontal)">
-                                      <p:cBhvr>
-                                        <p:cTn id="7" dur="500"/>
-                                        <p:tgtEl>
-                                          <p:spTgt spid="5"/>
-                                        </p:tgtEl>
-                                      </p:cBhvr>
-                                    </p:animEffect>
-                                  </p:childTnLst>
-                                </p:cTn>
-                              </p:par>
-                              <p:par>
-                                <p:cTn id="8" presetID="42" presetClass="entr" presetSubtype="0" fill="hold" grpId="0" nodeType="withEffect">
-                                  <p:stCondLst>
-                                    <p:cond delay="0"/>
-                                  </p:stCondLst>
-                                  <p:childTnLst>
-                                    <p:set>
-                                      <p:cBhvr>
-                                        <p:cTn id="9" dur="1" fill="hold">
-                                          <p:stCondLst>
-                                            <p:cond delay="0"/>
-                                          </p:stCondLst>
-                                        </p:cTn>
-                                        <p:tgtEl>
-                                          <p:spTgt spid="9"/>
-                                        </p:tgtEl>
-                                        <p:attrNameLst>
-                                          <p:attrName>style.visibility</p:attrName>
-                                        </p:attrNameLst>
-                                      </p:cBhvr>
-                                      <p:to>
-                                        <p:strVal val="visible"/>
-                                      </p:to>
-                                    </p:set>
-                                    <p:animEffect transition="in" filter="fade">
-                                      <p:cBhvr>
-                                        <p:cTn id="10" dur="1000"/>
-                                        <p:tgtEl>
-                                          <p:spTgt spid="9"/>
-                                        </p:tgtEl>
-                                      </p:cBhvr>
-                                    </p:animEffect>
-                                    <p:anim calcmode="lin" valueType="num">
-                                      <p:cBhvr>
-                                        <p:cTn id="11" dur="1000" fill="hold"/>
-                                        <p:tgtEl>
-                                          <p:spTgt spid="9"/>
-                                        </p:tgtEl>
-                                        <p:attrNameLst>
-                                          <p:attrName>ppt_x</p:attrName>
-                                        </p:attrNameLst>
-                                      </p:cBhvr>
-                                      <p:tavLst>
-                                        <p:tav tm="0">
-                                          <p:val>
-                                            <p:strVal val="#ppt_x"/>
-                                          </p:val>
-                                        </p:tav>
-                                        <p:tav tm="100000">
-                                          <p:val>
-                                            <p:strVal val="#ppt_x"/>
-                                          </p:val>
-                                        </p:tav>
-                                      </p:tavLst>
-                                    </p:anim>
-                                    <p:anim calcmode="lin" valueType="num">
-                                      <p:cBhvr>
-                                        <p:cTn id="12" dur="1000" fill="hold"/>
-                                        <p:tgtEl>
-                                          <p:spTgt spid="9"/>
-                                        </p:tgtEl>
-                                        <p:attrNameLst>
-                                          <p:attrName>ppt_y</p:attrName>
-                                        </p:attrNameLst>
-                                      </p:cBhvr>
-                                      <p:tavLst>
-                                        <p:tav tm="0">
-                                          <p:val>
-                                            <p:strVal val="#ppt_y+.1"/>
-                                          </p:val>
-                                        </p:tav>
-                                        <p:tav tm="100000">
-                                          <p:val>
-                                            <p:strVal val="#ppt_y"/>
-                                          </p:val>
-                                        </p:tav>
-                                      </p:tavLst>
-                                    </p:anim>
-                                  </p:childTnLst>
-                                </p:cTn>
-                              </p:par>
-                            </p:childTnLst>
-                          </p:cTn>
-                        </p:par>
-                      </p:childTnLst>
-                    </p:cTn>
-                  </p:par>
-                  <p:par>
-                    <p:cTn id="13" fill="hold">
-                      <p:stCondLst>
-                        <p:cond delay="indefinite"/>
-                      </p:stCondLst>
-                      <p:childTnLst>
-                        <p:par>
-                          <p:cTn id="14" fill="hold">
-                            <p:stCondLst>
-                              <p:cond delay="0"/>
-                            </p:stCondLst>
-                            <p:childTnLst>
-                              <p:par>
-                                <p:cTn id="15" presetID="42" presetClass="entr" presetSubtype="0" fill="hold" grpId="0" nodeType="clickEffect">
-                                  <p:stCondLst>
-                                    <p:cond delay="0"/>
-                                  </p:stCondLst>
-                                  <p:childTnLst>
-                                    <p:set>
-                                      <p:cBhvr>
-                                        <p:cTn id="16" dur="1" fill="hold">
-                                          <p:stCondLst>
-                                            <p:cond delay="0"/>
-                                          </p:stCondLst>
-                                        </p:cTn>
-                                        <p:tgtEl>
-                                          <p:spTgt spid="10"/>
-                                        </p:tgtEl>
-                                        <p:attrNameLst>
-                                          <p:attrName>style.visibility</p:attrName>
-                                        </p:attrNameLst>
-                                      </p:cBhvr>
-                                      <p:to>
-                                        <p:strVal val="visible"/>
-                                      </p:to>
-                                    </p:set>
-                                    <p:animEffect transition="in" filter="fade">
-                                      <p:cBhvr>
-                                        <p:cTn id="17" dur="1000"/>
-                                        <p:tgtEl>
-                                          <p:spTgt spid="10"/>
-                                        </p:tgtEl>
-                                      </p:cBhvr>
-                                    </p:animEffect>
-                                    <p:anim calcmode="lin" valueType="num">
-                                      <p:cBhvr>
-                                        <p:cTn id="18" dur="1000" fill="hold"/>
-                                        <p:tgtEl>
-                                          <p:spTgt spid="10"/>
-                                        </p:tgtEl>
-                                        <p:attrNameLst>
-                                          <p:attrName>ppt_x</p:attrName>
-                                        </p:attrNameLst>
-                                      </p:cBhvr>
-                                      <p:tavLst>
-                                        <p:tav tm="0">
-                                          <p:val>
-                                            <p:strVal val="#ppt_x"/>
-                                          </p:val>
-                                        </p:tav>
-                                        <p:tav tm="100000">
-                                          <p:val>
-                                            <p:strVal val="#ppt_x"/>
-                                          </p:val>
-                                        </p:tav>
-                                      </p:tavLst>
-                                    </p:anim>
-                                    <p:anim calcmode="lin" valueType="num">
-                                      <p:cBhvr>
-                                        <p:cTn id="19" dur="1000" fill="hold"/>
-                                        <p:tgtEl>
-                                          <p:spTgt spid="10"/>
-                                        </p:tgtEl>
-                                        <p:attrNameLst>
-                                          <p:attrName>ppt_y</p:attrName>
-                                        </p:attrNameLst>
-                                      </p:cBhvr>
-                                      <p:tavLst>
-                                        <p:tav tm="0">
-                                          <p:val>
-                                            <p:strVal val="#ppt_y+.1"/>
-                                          </p:val>
-                                        </p:tav>
-                                        <p:tav tm="100000">
-                                          <p:val>
-                                            <p:strVal val="#ppt_y"/>
-                                          </p:val>
-                                        </p:tav>
-                                      </p:tavLst>
-                                    </p:anim>
-                                  </p:childTnLst>
-                                </p:cTn>
-                              </p:par>
-                            </p:childTnLst>
-                          </p:cTn>
-                        </p:par>
-                      </p:childTnLst>
-                    </p:cTn>
-                  </p:par>
-                </p:childTnLst>
-              </p:cTn>
-              <p:prevCondLst>
-                <p:cond evt="onPrev" delay="0">
-                  <p:tgtEl>
-                    <p:sldTgt/>
-                  </p:tgtEl>
-                </p:cond>
-              </p:prevCondLst>
-              <p:nextCondLst>
-                <p:cond evt="onNext" delay="0">
-                  <p:tgtEl>
-                    <p:sldTgt/>
-                  </p:tgtEl>
-                </p:cond>
-              </p:nextCondLst>
-            </p:seq>
-          </p:childTnLst>
-        </p:cTn>
-      </p:par>
-    </p:tnLst>
-    <p:bldLst>
-      <p:bldP spid="5" grpId="0"/>
-      <p:bldP spid="9" grpId="0"/>
-      <p:bldP spid="10" grpId="0"/>
-    </p:bldLst>
-  </p:timing>
 </p:sld>
 </file>
 
@@ -6587,13 +8033,13 @@
         </p:spPr>
         <p:txBody>
           <a:bodyPr>
-            <a:noAutofit/>
+            <a:normAutofit fontScale="90000"/>
           </a:bodyPr>
           <a:lstStyle/>
           <a:p>
             <a:r>
-              <a:rPr lang="en-PH" sz="5000" b="1" dirty="0"/>
-              <a:t>Implementing a Runnable Interface</a:t>
+              <a:rPr lang="en-PH" b="1" dirty="0"/>
+              <a:t>Extending the Thread Class</a:t>
             </a:r>
           </a:p>
         </p:txBody>
@@ -6659,7 +8105,7 @@
         <p:spPr>
           <a:xfrm>
             <a:off x="1523999" y="1647024"/>
-            <a:ext cx="7751524" cy="477054"/>
+            <a:ext cx="6887227" cy="477054"/>
           </a:xfrm>
           <a:prstGeom prst="rect">
             <a:avLst/>
@@ -6697,7 +8143,7 @@
                 </a:solidFill>
                 <a:latin typeface="Consolas" panose="020B0609020204030204" pitchFamily="49" charset="0"/>
               </a:rPr>
-              <a:t> implements </a:t>
+              <a:t> extends </a:t>
             </a:r>
             <a:r>
               <a:rPr lang="en-PH" sz="2500" dirty="0">
@@ -6706,7 +8152,7 @@
                 </a:solidFill>
                 <a:latin typeface="Consolas" panose="020B0609020204030204" pitchFamily="49" charset="0"/>
               </a:rPr>
-              <a:t>Runnable </a:t>
+              <a:t>Thread </a:t>
             </a:r>
             <a:r>
               <a:rPr lang="en-PH" sz="2500" dirty="0">
@@ -6865,7 +8311,7 @@
     </p:spTree>
     <p:extLst>
       <p:ext uri="{BB962C8B-B14F-4D97-AF65-F5344CB8AC3E}">
-        <p14:creationId xmlns:p14="http://schemas.microsoft.com/office/powerpoint/2010/main" val="55429838"/>
+        <p14:creationId xmlns:p14="http://schemas.microsoft.com/office/powerpoint/2010/main" val="3970590419"/>
       </p:ext>
     </p:extLst>
   </p:cSld>
@@ -7199,6 +8645,618 @@
         </p:spPr>
         <p:txBody>
           <a:bodyPr>
+            <a:noAutofit/>
+          </a:bodyPr>
+          <a:lstStyle/>
+          <a:p>
+            <a:r>
+              <a:rPr lang="en-PH" sz="5000" b="1" dirty="0"/>
+              <a:t>Implementing a Runnable Interface</a:t>
+            </a:r>
+          </a:p>
+        </p:txBody>
+      </p:sp>
+      <p:sp>
+        <p:nvSpPr>
+          <p:cNvPr id="4" name="Footer Placeholder 3">
+            <a:extLst>
+              <a:ext uri="{FF2B5EF4-FFF2-40B4-BE49-F238E27FC236}">
+                <a16:creationId xmlns:a16="http://schemas.microsoft.com/office/drawing/2014/main" id="{638E7DE1-45EE-476A-A474-0F3C264AEDA3}"/>
+              </a:ext>
+            </a:extLst>
+          </p:cNvPr>
+          <p:cNvSpPr>
+            <a:spLocks noGrp="1"/>
+          </p:cNvSpPr>
+          <p:nvPr>
+            <p:ph type="ftr" sz="quarter" idx="11"/>
+          </p:nvPr>
+        </p:nvSpPr>
+        <p:spPr>
+          <a:xfrm>
+            <a:off x="0" y="6139541"/>
+            <a:ext cx="12192000" cy="718459"/>
+          </a:xfrm>
+          <a:ln w="28575">
+            <a:solidFill>
+              <a:schemeClr val="accent5">
+                <a:lumMod val="50000"/>
+              </a:schemeClr>
+            </a:solidFill>
+          </a:ln>
+        </p:spPr>
+        <p:txBody>
+          <a:bodyPr/>
+          <a:lstStyle/>
+          <a:p>
+            <a:pPr algn="r"/>
+            <a:r>
+              <a:rPr lang="en-PH" b="1">
+                <a:solidFill>
+                  <a:schemeClr val="tx1"/>
+                </a:solidFill>
+              </a:rPr>
+              <a:t>CCPRGG2L</a:t>
+            </a:r>
+            <a:endParaRPr lang="en-PH" dirty="0"/>
+          </a:p>
+        </p:txBody>
+      </p:sp>
+      <p:sp>
+        <p:nvSpPr>
+          <p:cNvPr id="5" name="TextBox 4">
+            <a:extLst>
+              <a:ext uri="{FF2B5EF4-FFF2-40B4-BE49-F238E27FC236}">
+                <a16:creationId xmlns:a16="http://schemas.microsoft.com/office/drawing/2014/main" id="{F9AC5282-A147-49E6-959C-FAD202E26B2C}"/>
+              </a:ext>
+            </a:extLst>
+          </p:cNvPr>
+          <p:cNvSpPr txBox="1"/>
+          <p:nvPr/>
+        </p:nvSpPr>
+        <p:spPr>
+          <a:xfrm>
+            <a:off x="1523999" y="1647024"/>
+            <a:ext cx="7751524" cy="477054"/>
+          </a:xfrm>
+          <a:prstGeom prst="rect">
+            <a:avLst/>
+          </a:prstGeom>
+          <a:noFill/>
+        </p:spPr>
+        <p:txBody>
+          <a:bodyPr wrap="square" rtlCol="0">
+            <a:spAutoFit/>
+          </a:bodyPr>
+          <a:lstStyle/>
+          <a:p>
+            <a:r>
+              <a:rPr lang="en-PH" sz="2500" dirty="0">
+                <a:solidFill>
+                  <a:srgbClr val="7030A0"/>
+                </a:solidFill>
+                <a:latin typeface="Consolas" panose="020B0609020204030204" pitchFamily="49" charset="0"/>
+              </a:rPr>
+              <a:t>public class </a:t>
+            </a:r>
+            <a:r>
+              <a:rPr lang="en-PH" sz="2500" dirty="0" err="1">
+                <a:solidFill>
+                  <a:srgbClr val="0070C0"/>
+                </a:solidFill>
+                <a:latin typeface="Consolas" panose="020B0609020204030204" pitchFamily="49" charset="0"/>
+              </a:rPr>
+              <a:t>myThread</a:t>
+            </a:r>
+            <a:r>
+              <a:rPr lang="en-PH" sz="2500" dirty="0">
+                <a:solidFill>
+                  <a:srgbClr val="7030A0"/>
+                </a:solidFill>
+                <a:latin typeface="Consolas" panose="020B0609020204030204" pitchFamily="49" charset="0"/>
+              </a:rPr>
+              <a:t> implements </a:t>
+            </a:r>
+            <a:r>
+              <a:rPr lang="en-PH" sz="2500" dirty="0">
+                <a:solidFill>
+                  <a:srgbClr val="0070C0"/>
+                </a:solidFill>
+                <a:latin typeface="Consolas" panose="020B0609020204030204" pitchFamily="49" charset="0"/>
+              </a:rPr>
+              <a:t>Runnable </a:t>
+            </a:r>
+            <a:r>
+              <a:rPr lang="en-PH" sz="2500" dirty="0">
+                <a:latin typeface="Consolas" panose="020B0609020204030204" pitchFamily="49" charset="0"/>
+              </a:rPr>
+              <a:t>{</a:t>
+            </a:r>
+            <a:endParaRPr lang="en-PH" sz="2500" dirty="0"/>
+          </a:p>
+        </p:txBody>
+      </p:sp>
+      <p:sp>
+        <p:nvSpPr>
+          <p:cNvPr id="9" name="TextBox 8">
+            <a:extLst>
+              <a:ext uri="{FF2B5EF4-FFF2-40B4-BE49-F238E27FC236}">
+                <a16:creationId xmlns:a16="http://schemas.microsoft.com/office/drawing/2014/main" id="{323B4072-E162-690F-F474-35AF6637EA82}"/>
+              </a:ext>
+            </a:extLst>
+          </p:cNvPr>
+          <p:cNvSpPr txBox="1"/>
+          <p:nvPr/>
+        </p:nvSpPr>
+        <p:spPr>
+          <a:xfrm>
+            <a:off x="1523999" y="4198441"/>
+            <a:ext cx="375781" cy="477054"/>
+          </a:xfrm>
+          <a:prstGeom prst="rect">
+            <a:avLst/>
+          </a:prstGeom>
+          <a:noFill/>
+        </p:spPr>
+        <p:txBody>
+          <a:bodyPr wrap="square" rtlCol="0">
+            <a:spAutoFit/>
+          </a:bodyPr>
+          <a:lstStyle/>
+          <a:p>
+            <a:r>
+              <a:rPr lang="en-PH" sz="2500" dirty="0">
+                <a:latin typeface="Consolas" panose="020B0609020204030204" pitchFamily="49" charset="0"/>
+              </a:rPr>
+              <a:t>}</a:t>
+            </a:r>
+            <a:endParaRPr lang="en-PH" sz="2500" dirty="0"/>
+          </a:p>
+        </p:txBody>
+      </p:sp>
+      <p:sp>
+        <p:nvSpPr>
+          <p:cNvPr id="10" name="TextBox 9">
+            <a:extLst>
+              <a:ext uri="{FF2B5EF4-FFF2-40B4-BE49-F238E27FC236}">
+                <a16:creationId xmlns:a16="http://schemas.microsoft.com/office/drawing/2014/main" id="{4D0F0BAC-48BC-12D7-4628-028A500146AF}"/>
+              </a:ext>
+            </a:extLst>
+          </p:cNvPr>
+          <p:cNvSpPr txBox="1"/>
+          <p:nvPr/>
+        </p:nvSpPr>
+        <p:spPr>
+          <a:xfrm>
+            <a:off x="1899781" y="2421032"/>
+            <a:ext cx="8240038" cy="2015936"/>
+          </a:xfrm>
+          <a:prstGeom prst="rect">
+            <a:avLst/>
+          </a:prstGeom>
+          <a:noFill/>
+        </p:spPr>
+        <p:txBody>
+          <a:bodyPr wrap="square" rtlCol="0">
+            <a:spAutoFit/>
+          </a:bodyPr>
+          <a:lstStyle/>
+          <a:p>
+            <a:r>
+              <a:rPr lang="en-PH" sz="2500" dirty="0">
+                <a:solidFill>
+                  <a:srgbClr val="7030A0"/>
+                </a:solidFill>
+                <a:latin typeface="Consolas" panose="020B0609020204030204" pitchFamily="49" charset="0"/>
+              </a:rPr>
+              <a:t>public</a:t>
+            </a:r>
+            <a:r>
+              <a:rPr lang="en-PH" sz="2500" dirty="0">
+                <a:latin typeface="Consolas" panose="020B0609020204030204" pitchFamily="49" charset="0"/>
+              </a:rPr>
+              <a:t> </a:t>
+            </a:r>
+            <a:r>
+              <a:rPr lang="en-PH" sz="2500" dirty="0">
+                <a:solidFill>
+                  <a:srgbClr val="00B0F0"/>
+                </a:solidFill>
+                <a:latin typeface="Consolas" panose="020B0609020204030204" pitchFamily="49" charset="0"/>
+              </a:rPr>
+              <a:t>void </a:t>
+            </a:r>
+            <a:r>
+              <a:rPr lang="en-PH" sz="2500" dirty="0">
+                <a:solidFill>
+                  <a:srgbClr val="0070C0"/>
+                </a:solidFill>
+                <a:latin typeface="Consolas" panose="020B0609020204030204" pitchFamily="49" charset="0"/>
+              </a:rPr>
+              <a:t>run</a:t>
+            </a:r>
+            <a:r>
+              <a:rPr lang="en-PH" sz="2500" dirty="0">
+                <a:latin typeface="Consolas" panose="020B0609020204030204" pitchFamily="49" charset="0"/>
+              </a:rPr>
+              <a:t>() {</a:t>
+            </a:r>
+          </a:p>
+          <a:p>
+            <a:endParaRPr lang="en-PH" sz="2500" dirty="0">
+              <a:latin typeface="Consolas" panose="020B0609020204030204" pitchFamily="49" charset="0"/>
+            </a:endParaRPr>
+          </a:p>
+          <a:p>
+            <a:r>
+              <a:rPr lang="en-PH" sz="2500" dirty="0">
+                <a:latin typeface="Consolas" panose="020B0609020204030204" pitchFamily="49" charset="0"/>
+              </a:rPr>
+              <a:t>	</a:t>
+            </a:r>
+            <a:r>
+              <a:rPr lang="en-PH" sz="2500" dirty="0" err="1">
+                <a:latin typeface="Consolas" panose="020B0609020204030204" pitchFamily="49" charset="0"/>
+              </a:rPr>
+              <a:t>System.out.println</a:t>
+            </a:r>
+            <a:r>
+              <a:rPr lang="en-PH" sz="2500" dirty="0">
+                <a:latin typeface="Consolas" panose="020B0609020204030204" pitchFamily="49" charset="0"/>
+              </a:rPr>
+              <a:t>(“Thread is running”);</a:t>
+            </a:r>
+          </a:p>
+          <a:p>
+            <a:r>
+              <a:rPr lang="en-PH" sz="2500" dirty="0">
+                <a:latin typeface="Consolas" panose="020B0609020204030204" pitchFamily="49" charset="0"/>
+              </a:rPr>
+              <a:t>}</a:t>
+            </a:r>
+          </a:p>
+          <a:p>
+            <a:endParaRPr lang="en-PH" sz="2500" dirty="0"/>
+          </a:p>
+        </p:txBody>
+      </p:sp>
+    </p:spTree>
+    <p:extLst>
+      <p:ext uri="{BB962C8B-B14F-4D97-AF65-F5344CB8AC3E}">
+        <p14:creationId xmlns:p14="http://schemas.microsoft.com/office/powerpoint/2010/main" val="55429838"/>
+      </p:ext>
+    </p:extLst>
+  </p:cSld>
+  <p:clrMapOvr>
+    <a:masterClrMapping/>
+  </p:clrMapOvr>
+  <p:timing>
+    <p:tnLst>
+      <p:par>
+        <p:cTn id="1" dur="indefinite" restart="never" nodeType="tmRoot">
+          <p:childTnLst>
+            <p:seq concurrent="1" nextAc="seek">
+              <p:cTn id="2" dur="indefinite" nodeType="mainSeq">
+                <p:childTnLst>
+                  <p:par>
+                    <p:cTn id="3" fill="hold">
+                      <p:stCondLst>
+                        <p:cond delay="indefinite"/>
+                      </p:stCondLst>
+                      <p:childTnLst>
+                        <p:par>
+                          <p:cTn id="4" fill="hold">
+                            <p:stCondLst>
+                              <p:cond delay="0"/>
+                            </p:stCondLst>
+                            <p:childTnLst>
+                              <p:par>
+                                <p:cTn id="5" presetID="14" presetClass="entr" presetSubtype="10" fill="hold" grpId="0" nodeType="clickEffect">
+                                  <p:stCondLst>
+                                    <p:cond delay="0"/>
+                                  </p:stCondLst>
+                                  <p:childTnLst>
+                                    <p:set>
+                                      <p:cBhvr>
+                                        <p:cTn id="6" dur="1" fill="hold">
+                                          <p:stCondLst>
+                                            <p:cond delay="0"/>
+                                          </p:stCondLst>
+                                        </p:cTn>
+                                        <p:tgtEl>
+                                          <p:spTgt spid="5"/>
+                                        </p:tgtEl>
+                                        <p:attrNameLst>
+                                          <p:attrName>style.visibility</p:attrName>
+                                        </p:attrNameLst>
+                                      </p:cBhvr>
+                                      <p:to>
+                                        <p:strVal val="visible"/>
+                                      </p:to>
+                                    </p:set>
+                                    <p:animEffect transition="in" filter="randombar(horizontal)">
+                                      <p:cBhvr>
+                                        <p:cTn id="7" dur="500"/>
+                                        <p:tgtEl>
+                                          <p:spTgt spid="5"/>
+                                        </p:tgtEl>
+                                      </p:cBhvr>
+                                    </p:animEffect>
+                                  </p:childTnLst>
+                                </p:cTn>
+                              </p:par>
+                              <p:par>
+                                <p:cTn id="8" presetID="42" presetClass="entr" presetSubtype="0" fill="hold" grpId="0" nodeType="withEffect">
+                                  <p:stCondLst>
+                                    <p:cond delay="0"/>
+                                  </p:stCondLst>
+                                  <p:childTnLst>
+                                    <p:set>
+                                      <p:cBhvr>
+                                        <p:cTn id="9" dur="1" fill="hold">
+                                          <p:stCondLst>
+                                            <p:cond delay="0"/>
+                                          </p:stCondLst>
+                                        </p:cTn>
+                                        <p:tgtEl>
+                                          <p:spTgt spid="9"/>
+                                        </p:tgtEl>
+                                        <p:attrNameLst>
+                                          <p:attrName>style.visibility</p:attrName>
+                                        </p:attrNameLst>
+                                      </p:cBhvr>
+                                      <p:to>
+                                        <p:strVal val="visible"/>
+                                      </p:to>
+                                    </p:set>
+                                    <p:animEffect transition="in" filter="fade">
+                                      <p:cBhvr>
+                                        <p:cTn id="10" dur="1000"/>
+                                        <p:tgtEl>
+                                          <p:spTgt spid="9"/>
+                                        </p:tgtEl>
+                                      </p:cBhvr>
+                                    </p:animEffect>
+                                    <p:anim calcmode="lin" valueType="num">
+                                      <p:cBhvr>
+                                        <p:cTn id="11" dur="1000" fill="hold"/>
+                                        <p:tgtEl>
+                                          <p:spTgt spid="9"/>
+                                        </p:tgtEl>
+                                        <p:attrNameLst>
+                                          <p:attrName>ppt_x</p:attrName>
+                                        </p:attrNameLst>
+                                      </p:cBhvr>
+                                      <p:tavLst>
+                                        <p:tav tm="0">
+                                          <p:val>
+                                            <p:strVal val="#ppt_x"/>
+                                          </p:val>
+                                        </p:tav>
+                                        <p:tav tm="100000">
+                                          <p:val>
+                                            <p:strVal val="#ppt_x"/>
+                                          </p:val>
+                                        </p:tav>
+                                      </p:tavLst>
+                                    </p:anim>
+                                    <p:anim calcmode="lin" valueType="num">
+                                      <p:cBhvr>
+                                        <p:cTn id="12" dur="1000" fill="hold"/>
+                                        <p:tgtEl>
+                                          <p:spTgt spid="9"/>
+                                        </p:tgtEl>
+                                        <p:attrNameLst>
+                                          <p:attrName>ppt_y</p:attrName>
+                                        </p:attrNameLst>
+                                      </p:cBhvr>
+                                      <p:tavLst>
+                                        <p:tav tm="0">
+                                          <p:val>
+                                            <p:strVal val="#ppt_y+.1"/>
+                                          </p:val>
+                                        </p:tav>
+                                        <p:tav tm="100000">
+                                          <p:val>
+                                            <p:strVal val="#ppt_y"/>
+                                          </p:val>
+                                        </p:tav>
+                                      </p:tavLst>
+                                    </p:anim>
+                                  </p:childTnLst>
+                                </p:cTn>
+                              </p:par>
+                            </p:childTnLst>
+                          </p:cTn>
+                        </p:par>
+                      </p:childTnLst>
+                    </p:cTn>
+                  </p:par>
+                  <p:par>
+                    <p:cTn id="13" fill="hold">
+                      <p:stCondLst>
+                        <p:cond delay="indefinite"/>
+                      </p:stCondLst>
+                      <p:childTnLst>
+                        <p:par>
+                          <p:cTn id="14" fill="hold">
+                            <p:stCondLst>
+                              <p:cond delay="0"/>
+                            </p:stCondLst>
+                            <p:childTnLst>
+                              <p:par>
+                                <p:cTn id="15" presetID="42" presetClass="entr" presetSubtype="0" fill="hold" grpId="0" nodeType="clickEffect">
+                                  <p:stCondLst>
+                                    <p:cond delay="0"/>
+                                  </p:stCondLst>
+                                  <p:childTnLst>
+                                    <p:set>
+                                      <p:cBhvr>
+                                        <p:cTn id="16" dur="1" fill="hold">
+                                          <p:stCondLst>
+                                            <p:cond delay="0"/>
+                                          </p:stCondLst>
+                                        </p:cTn>
+                                        <p:tgtEl>
+                                          <p:spTgt spid="10"/>
+                                        </p:tgtEl>
+                                        <p:attrNameLst>
+                                          <p:attrName>style.visibility</p:attrName>
+                                        </p:attrNameLst>
+                                      </p:cBhvr>
+                                      <p:to>
+                                        <p:strVal val="visible"/>
+                                      </p:to>
+                                    </p:set>
+                                    <p:animEffect transition="in" filter="fade">
+                                      <p:cBhvr>
+                                        <p:cTn id="17" dur="1000"/>
+                                        <p:tgtEl>
+                                          <p:spTgt spid="10"/>
+                                        </p:tgtEl>
+                                      </p:cBhvr>
+                                    </p:animEffect>
+                                    <p:anim calcmode="lin" valueType="num">
+                                      <p:cBhvr>
+                                        <p:cTn id="18" dur="1000" fill="hold"/>
+                                        <p:tgtEl>
+                                          <p:spTgt spid="10"/>
+                                        </p:tgtEl>
+                                        <p:attrNameLst>
+                                          <p:attrName>ppt_x</p:attrName>
+                                        </p:attrNameLst>
+                                      </p:cBhvr>
+                                      <p:tavLst>
+                                        <p:tav tm="0">
+                                          <p:val>
+                                            <p:strVal val="#ppt_x"/>
+                                          </p:val>
+                                        </p:tav>
+                                        <p:tav tm="100000">
+                                          <p:val>
+                                            <p:strVal val="#ppt_x"/>
+                                          </p:val>
+                                        </p:tav>
+                                      </p:tavLst>
+                                    </p:anim>
+                                    <p:anim calcmode="lin" valueType="num">
+                                      <p:cBhvr>
+                                        <p:cTn id="19" dur="1000" fill="hold"/>
+                                        <p:tgtEl>
+                                          <p:spTgt spid="10"/>
+                                        </p:tgtEl>
+                                        <p:attrNameLst>
+                                          <p:attrName>ppt_y</p:attrName>
+                                        </p:attrNameLst>
+                                      </p:cBhvr>
+                                      <p:tavLst>
+                                        <p:tav tm="0">
+                                          <p:val>
+                                            <p:strVal val="#ppt_y+.1"/>
+                                          </p:val>
+                                        </p:tav>
+                                        <p:tav tm="100000">
+                                          <p:val>
+                                            <p:strVal val="#ppt_y"/>
+                                          </p:val>
+                                        </p:tav>
+                                      </p:tavLst>
+                                    </p:anim>
+                                  </p:childTnLst>
+                                </p:cTn>
+                              </p:par>
+                            </p:childTnLst>
+                          </p:cTn>
+                        </p:par>
+                      </p:childTnLst>
+                    </p:cTn>
+                  </p:par>
+                </p:childTnLst>
+              </p:cTn>
+              <p:prevCondLst>
+                <p:cond evt="onPrev" delay="0">
+                  <p:tgtEl>
+                    <p:sldTgt/>
+                  </p:tgtEl>
+                </p:cond>
+              </p:prevCondLst>
+              <p:nextCondLst>
+                <p:cond evt="onNext" delay="0">
+                  <p:tgtEl>
+                    <p:sldTgt/>
+                  </p:tgtEl>
+                </p:cond>
+              </p:nextCondLst>
+            </p:seq>
+          </p:childTnLst>
+        </p:cTn>
+      </p:par>
+    </p:tnLst>
+    <p:bldLst>
+      <p:bldP spid="5" grpId="0"/>
+      <p:bldP spid="9" grpId="0"/>
+      <p:bldP spid="10" grpId="0"/>
+    </p:bldLst>
+  </p:timing>
+</p:sld>
+</file>
+
+<file path=ppt/slides/slide9.xml><?xml version="1.0" encoding="utf-8"?>
+<p:sld xmlns:a="http://schemas.openxmlformats.org/drawingml/2006/main" xmlns:r="http://schemas.openxmlformats.org/officeDocument/2006/relationships" xmlns:p="http://schemas.openxmlformats.org/presentationml/2006/main">
+  <p:cSld>
+    <p:bg>
+      <p:bgPr>
+        <a:blipFill dpi="0" rotWithShape="1">
+          <a:blip r:embed="rId3">
+            <a:alphaModFix amt="99000"/>
+            <a:lum/>
+          </a:blip>
+          <a:srcRect/>
+          <a:stretch>
+            <a:fillRect t="89000" r="85000" b="-1000"/>
+          </a:stretch>
+        </a:blipFill>
+        <a:effectLst/>
+      </p:bgPr>
+    </p:bg>
+    <p:spTree>
+      <p:nvGrpSpPr>
+        <p:cNvPr id="1" name=""/>
+        <p:cNvGrpSpPr/>
+        <p:nvPr/>
+      </p:nvGrpSpPr>
+      <p:grpSpPr>
+        <a:xfrm>
+          <a:off x="0" y="0"/>
+          <a:ext cx="0" cy="0"/>
+          <a:chOff x="0" y="0"/>
+          <a:chExt cx="0" cy="0"/>
+        </a:xfrm>
+      </p:grpSpPr>
+      <p:sp>
+        <p:nvSpPr>
+          <p:cNvPr id="2" name="Title 1">
+            <a:extLst>
+              <a:ext uri="{FF2B5EF4-FFF2-40B4-BE49-F238E27FC236}">
+                <a16:creationId xmlns:a16="http://schemas.microsoft.com/office/drawing/2014/main" id="{6A3DCE86-C2BA-4713-9E7A-73589E8D6CCF}"/>
+              </a:ext>
+            </a:extLst>
+          </p:cNvPr>
+          <p:cNvSpPr>
+            <a:spLocks noGrp="1"/>
+          </p:cNvSpPr>
+          <p:nvPr>
+            <p:ph type="ctrTitle"/>
+          </p:nvPr>
+        </p:nvSpPr>
+        <p:spPr>
+          <a:xfrm>
+            <a:off x="1524000" y="497150"/>
+            <a:ext cx="9144000" cy="718459"/>
+          </a:xfrm>
+        </p:spPr>
+        <p:txBody>
+          <a:bodyPr>
             <a:normAutofit fontScale="90000"/>
           </a:bodyPr>
           <a:lstStyle/>
@@ -8041,235 +10099,6 @@
     <p:extLst>
       <p:ext uri="{BB962C8B-B14F-4D97-AF65-F5344CB8AC3E}">
         <p14:creationId xmlns:p14="http://schemas.microsoft.com/office/powerpoint/2010/main" val="4199068472"/>
-      </p:ext>
-    </p:extLst>
-  </p:cSld>
-  <p:clrMapOvr>
-    <a:masterClrMapping/>
-  </p:clrMapOvr>
-</p:sld>
-</file>
-
-<file path=ppt/slides/slide9.xml><?xml version="1.0" encoding="utf-8"?>
-<p:sld xmlns:a="http://schemas.openxmlformats.org/drawingml/2006/main" xmlns:r="http://schemas.openxmlformats.org/officeDocument/2006/relationships" xmlns:p="http://schemas.openxmlformats.org/presentationml/2006/main">
-  <p:cSld>
-    <p:bg>
-      <p:bgPr>
-        <a:blipFill dpi="0" rotWithShape="1">
-          <a:blip r:embed="rId3">
-            <a:alphaModFix amt="99000"/>
-            <a:lum/>
-          </a:blip>
-          <a:srcRect/>
-          <a:stretch>
-            <a:fillRect t="89000" r="85000" b="-1000"/>
-          </a:stretch>
-        </a:blipFill>
-        <a:effectLst/>
-      </p:bgPr>
-    </p:bg>
-    <p:spTree>
-      <p:nvGrpSpPr>
-        <p:cNvPr id="1" name=""/>
-        <p:cNvGrpSpPr/>
-        <p:nvPr/>
-      </p:nvGrpSpPr>
-      <p:grpSpPr>
-        <a:xfrm>
-          <a:off x="0" y="0"/>
-          <a:ext cx="0" cy="0"/>
-          <a:chOff x="0" y="0"/>
-          <a:chExt cx="0" cy="0"/>
-        </a:xfrm>
-      </p:grpSpPr>
-      <p:sp>
-        <p:nvSpPr>
-          <p:cNvPr id="2" name="Title 1">
-            <a:extLst>
-              <a:ext uri="{FF2B5EF4-FFF2-40B4-BE49-F238E27FC236}">
-                <a16:creationId xmlns:a16="http://schemas.microsoft.com/office/drawing/2014/main" id="{6A3DCE86-C2BA-4713-9E7A-73589E8D6CCF}"/>
-              </a:ext>
-            </a:extLst>
-          </p:cNvPr>
-          <p:cNvSpPr>
-            <a:spLocks noGrp="1"/>
-          </p:cNvSpPr>
-          <p:nvPr>
-            <p:ph type="ctrTitle"/>
-          </p:nvPr>
-        </p:nvSpPr>
-        <p:spPr>
-          <a:xfrm>
-            <a:off x="1524000" y="497150"/>
-            <a:ext cx="9144000" cy="718459"/>
-          </a:xfrm>
-        </p:spPr>
-        <p:txBody>
-          <a:bodyPr>
-            <a:normAutofit fontScale="90000"/>
-          </a:bodyPr>
-          <a:lstStyle/>
-          <a:p>
-            <a:r>
-              <a:rPr lang="en-PH" b="1" dirty="0"/>
-              <a:t>Thread Lifecycle</a:t>
-            </a:r>
-          </a:p>
-        </p:txBody>
-      </p:sp>
-      <p:sp>
-        <p:nvSpPr>
-          <p:cNvPr id="4" name="Footer Placeholder 3">
-            <a:extLst>
-              <a:ext uri="{FF2B5EF4-FFF2-40B4-BE49-F238E27FC236}">
-                <a16:creationId xmlns:a16="http://schemas.microsoft.com/office/drawing/2014/main" id="{638E7DE1-45EE-476A-A474-0F3C264AEDA3}"/>
-              </a:ext>
-            </a:extLst>
-          </p:cNvPr>
-          <p:cNvSpPr>
-            <a:spLocks noGrp="1"/>
-          </p:cNvSpPr>
-          <p:nvPr>
-            <p:ph type="ftr" sz="quarter" idx="11"/>
-          </p:nvPr>
-        </p:nvSpPr>
-        <p:spPr>
-          <a:xfrm>
-            <a:off x="0" y="6139541"/>
-            <a:ext cx="12192000" cy="718459"/>
-          </a:xfrm>
-          <a:ln w="28575">
-            <a:solidFill>
-              <a:schemeClr val="accent5">
-                <a:lumMod val="50000"/>
-              </a:schemeClr>
-            </a:solidFill>
-          </a:ln>
-        </p:spPr>
-        <p:txBody>
-          <a:bodyPr/>
-          <a:lstStyle/>
-          <a:p>
-            <a:pPr algn="r"/>
-            <a:r>
-              <a:rPr lang="en-PH" b="1">
-                <a:solidFill>
-                  <a:schemeClr val="tx1"/>
-                </a:solidFill>
-              </a:rPr>
-              <a:t>CCPRGG2L</a:t>
-            </a:r>
-            <a:endParaRPr lang="en-PH" dirty="0"/>
-          </a:p>
-        </p:txBody>
-      </p:sp>
-      <p:sp>
-        <p:nvSpPr>
-          <p:cNvPr id="3" name="TextBox 2">
-            <a:extLst>
-              <a:ext uri="{FF2B5EF4-FFF2-40B4-BE49-F238E27FC236}">
-                <a16:creationId xmlns:a16="http://schemas.microsoft.com/office/drawing/2014/main" id="{3585BB4D-48BF-F4D5-0836-77023A1B410A}"/>
-              </a:ext>
-            </a:extLst>
-          </p:cNvPr>
-          <p:cNvSpPr txBox="1"/>
-          <p:nvPr/>
-        </p:nvSpPr>
-        <p:spPr>
-          <a:xfrm>
-            <a:off x="1524000" y="1266869"/>
-            <a:ext cx="9144000" cy="5478423"/>
-          </a:xfrm>
-          <a:prstGeom prst="rect">
-            <a:avLst/>
-          </a:prstGeom>
-          <a:noFill/>
-        </p:spPr>
-        <p:txBody>
-          <a:bodyPr wrap="square" rtlCol="0">
-            <a:spAutoFit/>
-          </a:bodyPr>
-          <a:lstStyle/>
-          <a:p>
-            <a:pPr marL="342900" indent="-342900" algn="l">
-              <a:buFont typeface="Wingdings" panose="05000000000000000000" pitchFamily="2" charset="2"/>
-              <a:buChar char="q"/>
-            </a:pPr>
-            <a:r>
-              <a:rPr lang="en-US" sz="2500" b="1" dirty="0"/>
-              <a:t>New State</a:t>
-            </a:r>
-            <a:r>
-              <a:rPr lang="en-US" sz="2500" dirty="0"/>
-              <a:t>. As we use the Thread class to construct a thread entity, the thread is born and is defined as being in the New state. </a:t>
-            </a:r>
-          </a:p>
-          <a:p>
-            <a:pPr marL="342900" indent="-342900" algn="l">
-              <a:buFont typeface="Wingdings" panose="05000000000000000000" pitchFamily="2" charset="2"/>
-              <a:buChar char="q"/>
-            </a:pPr>
-            <a:endParaRPr lang="en-US" sz="2500" dirty="0"/>
-          </a:p>
-          <a:p>
-            <a:pPr marL="342900" indent="-342900" algn="l">
-              <a:buFont typeface="Wingdings" panose="05000000000000000000" pitchFamily="2" charset="2"/>
-              <a:buChar char="q"/>
-            </a:pPr>
-            <a:r>
-              <a:rPr lang="en-US" sz="2500" b="1" dirty="0"/>
-              <a:t>Runnable State</a:t>
-            </a:r>
-            <a:r>
-              <a:rPr lang="en-US" sz="2500" dirty="0"/>
-              <a:t>. A thread in the runnable state is prepared to execute the code. When a new thread's start() function is called, it enters a runnable state.</a:t>
-            </a:r>
-          </a:p>
-          <a:p>
-            <a:pPr marL="342900" indent="-342900" algn="l">
-              <a:buFont typeface="Wingdings" panose="05000000000000000000" pitchFamily="2" charset="2"/>
-              <a:buChar char="q"/>
-            </a:pPr>
-            <a:endParaRPr lang="en-US" sz="2500" dirty="0"/>
-          </a:p>
-          <a:p>
-            <a:pPr marL="342900" indent="-342900" algn="l">
-              <a:buFont typeface="Wingdings" panose="05000000000000000000" pitchFamily="2" charset="2"/>
-              <a:buChar char="q"/>
-            </a:pPr>
-            <a:r>
-              <a:rPr lang="en-US" sz="2500" b="1" dirty="0"/>
-              <a:t>Running State</a:t>
-            </a:r>
-            <a:r>
-              <a:rPr lang="en-US" sz="2500" dirty="0"/>
-              <a:t>. Running implies that the processor (CPU) has assigned a time slot to the thread for execution. When a thread from the runnable state is chosen for execution by the thread scheduler, it joins the running state.</a:t>
-            </a:r>
-          </a:p>
-          <a:p>
-            <a:pPr marL="342900" indent="-342900" algn="l">
-              <a:buFont typeface="Wingdings" panose="05000000000000000000" pitchFamily="2" charset="2"/>
-              <a:buChar char="q"/>
-            </a:pPr>
-            <a:endParaRPr lang="en-US" sz="2500" dirty="0"/>
-          </a:p>
-          <a:p>
-            <a:pPr marL="342900" indent="-342900" algn="l">
-              <a:buFont typeface="Wingdings" panose="05000000000000000000" pitchFamily="2" charset="2"/>
-              <a:buChar char="q"/>
-            </a:pPr>
-            <a:endParaRPr lang="en-US" sz="2500" dirty="0"/>
-          </a:p>
-          <a:p>
-            <a:pPr algn="l"/>
-            <a:endParaRPr lang="en-US" sz="2500" dirty="0"/>
-          </a:p>
-        </p:txBody>
-      </p:sp>
-    </p:spTree>
-    <p:extLst>
-      <p:ext uri="{BB962C8B-B14F-4D97-AF65-F5344CB8AC3E}">
-        <p14:creationId xmlns:p14="http://schemas.microsoft.com/office/powerpoint/2010/main" val="2413565988"/>
       </p:ext>
     </p:extLst>
   </p:cSld>

</xml_diff>

<commit_message>
Added use cases in presentation
</commit_message>
<xml_diff>
--- a/week_11/Threads.pptx
+++ b/week_11/Threads.pptx
@@ -5,7 +5,7 @@
     <p:sldMasterId id="2147483648" r:id="rId1"/>
   </p:sldMasterIdLst>
   <p:notesMasterIdLst>
-    <p:notesMasterId r:id="rId16"/>
+    <p:notesMasterId r:id="rId18"/>
   </p:notesMasterIdLst>
   <p:sldIdLst>
     <p:sldId id="257" r:id="rId2"/>
@@ -13,15 +13,17 @@
     <p:sldId id="318" r:id="rId4"/>
     <p:sldId id="319" r:id="rId5"/>
     <p:sldId id="329" r:id="rId6"/>
-    <p:sldId id="320" r:id="rId7"/>
-    <p:sldId id="321" r:id="rId8"/>
-    <p:sldId id="322" r:id="rId9"/>
-    <p:sldId id="323" r:id="rId10"/>
-    <p:sldId id="324" r:id="rId11"/>
-    <p:sldId id="325" r:id="rId12"/>
-    <p:sldId id="326" r:id="rId13"/>
-    <p:sldId id="327" r:id="rId14"/>
-    <p:sldId id="328" r:id="rId15"/>
+    <p:sldId id="330" r:id="rId7"/>
+    <p:sldId id="331" r:id="rId8"/>
+    <p:sldId id="320" r:id="rId9"/>
+    <p:sldId id="321" r:id="rId10"/>
+    <p:sldId id="322" r:id="rId11"/>
+    <p:sldId id="323" r:id="rId12"/>
+    <p:sldId id="324" r:id="rId13"/>
+    <p:sldId id="325" r:id="rId14"/>
+    <p:sldId id="326" r:id="rId15"/>
+    <p:sldId id="327" r:id="rId16"/>
+    <p:sldId id="328" r:id="rId17"/>
   </p:sldIdLst>
   <p:sldSz cx="12192000" cy="6858000"/>
   <p:notesSz cx="6858000" cy="9144000"/>
@@ -644,7 +646,7 @@
     </p:spTree>
     <p:extLst>
       <p:ext uri="{BB962C8B-B14F-4D97-AF65-F5344CB8AC3E}">
-        <p14:creationId xmlns:p14="http://schemas.microsoft.com/office/powerpoint/2010/main" val="3985730649"/>
+        <p14:creationId xmlns:p14="http://schemas.microsoft.com/office/powerpoint/2010/main" val="461918963"/>
       </p:ext>
     </p:extLst>
   </p:cSld>
@@ -728,7 +730,7 @@
     </p:spTree>
     <p:extLst>
       <p:ext uri="{BB962C8B-B14F-4D97-AF65-F5344CB8AC3E}">
-        <p14:creationId xmlns:p14="http://schemas.microsoft.com/office/powerpoint/2010/main" val="3826310550"/>
+        <p14:creationId xmlns:p14="http://schemas.microsoft.com/office/powerpoint/2010/main" val="2334409620"/>
       </p:ext>
     </p:extLst>
   </p:cSld>
@@ -812,7 +814,7 @@
     </p:spTree>
     <p:extLst>
       <p:ext uri="{BB962C8B-B14F-4D97-AF65-F5344CB8AC3E}">
-        <p14:creationId xmlns:p14="http://schemas.microsoft.com/office/powerpoint/2010/main" val="1583685682"/>
+        <p14:creationId xmlns:p14="http://schemas.microsoft.com/office/powerpoint/2010/main" val="3985730649"/>
       </p:ext>
     </p:extLst>
   </p:cSld>
@@ -896,7 +898,7 @@
     </p:spTree>
     <p:extLst>
       <p:ext uri="{BB962C8B-B14F-4D97-AF65-F5344CB8AC3E}">
-        <p14:creationId xmlns:p14="http://schemas.microsoft.com/office/powerpoint/2010/main" val="432218876"/>
+        <p14:creationId xmlns:p14="http://schemas.microsoft.com/office/powerpoint/2010/main" val="3826310550"/>
       </p:ext>
     </p:extLst>
   </p:cSld>
@@ -972,6 +974,174 @@
             <a:fld id="{FE90CCE9-4AAE-4E1F-85AD-521A406D6524}" type="slidenum">
               <a:rPr lang="en-PH" smtClean="0"/>
               <a:t>14</a:t>
+            </a:fld>
+            <a:endParaRPr lang="en-PH"/>
+          </a:p>
+        </p:txBody>
+      </p:sp>
+    </p:spTree>
+    <p:extLst>
+      <p:ext uri="{BB962C8B-B14F-4D97-AF65-F5344CB8AC3E}">
+        <p14:creationId xmlns:p14="http://schemas.microsoft.com/office/powerpoint/2010/main" val="1583685682"/>
+      </p:ext>
+    </p:extLst>
+  </p:cSld>
+  <p:clrMapOvr>
+    <a:masterClrMapping/>
+  </p:clrMapOvr>
+</p:notes>
+</file>
+
+<file path=ppt/notesSlides/notesSlide15.xml><?xml version="1.0" encoding="utf-8"?>
+<p:notes xmlns:a="http://schemas.openxmlformats.org/drawingml/2006/main" xmlns:r="http://schemas.openxmlformats.org/officeDocument/2006/relationships" xmlns:p="http://schemas.openxmlformats.org/presentationml/2006/main">
+  <p:cSld>
+    <p:spTree>
+      <p:nvGrpSpPr>
+        <p:cNvPr id="1" name=""/>
+        <p:cNvGrpSpPr/>
+        <p:nvPr/>
+      </p:nvGrpSpPr>
+      <p:grpSpPr>
+        <a:xfrm>
+          <a:off x="0" y="0"/>
+          <a:ext cx="0" cy="0"/>
+          <a:chOff x="0" y="0"/>
+          <a:chExt cx="0" cy="0"/>
+        </a:xfrm>
+      </p:grpSpPr>
+      <p:sp>
+        <p:nvSpPr>
+          <p:cNvPr id="2" name="Slide Image Placeholder 1"/>
+          <p:cNvSpPr>
+            <a:spLocks noGrp="1" noRot="1" noChangeAspect="1"/>
+          </p:cNvSpPr>
+          <p:nvPr>
+            <p:ph type="sldImg"/>
+          </p:nvPr>
+        </p:nvSpPr>
+        <p:spPr/>
+      </p:sp>
+      <p:sp>
+        <p:nvSpPr>
+          <p:cNvPr id="3" name="Notes Placeholder 2"/>
+          <p:cNvSpPr>
+            <a:spLocks noGrp="1"/>
+          </p:cNvSpPr>
+          <p:nvPr>
+            <p:ph type="body" idx="1"/>
+          </p:nvPr>
+        </p:nvSpPr>
+        <p:spPr/>
+        <p:txBody>
+          <a:bodyPr/>
+          <a:lstStyle/>
+          <a:p>
+            <a:endParaRPr lang="en-PH" dirty="0"/>
+          </a:p>
+        </p:txBody>
+      </p:sp>
+      <p:sp>
+        <p:nvSpPr>
+          <p:cNvPr id="4" name="Slide Number Placeholder 3"/>
+          <p:cNvSpPr>
+            <a:spLocks noGrp="1"/>
+          </p:cNvSpPr>
+          <p:nvPr>
+            <p:ph type="sldNum" sz="quarter" idx="5"/>
+          </p:nvPr>
+        </p:nvSpPr>
+        <p:spPr/>
+        <p:txBody>
+          <a:bodyPr/>
+          <a:lstStyle/>
+          <a:p>
+            <a:fld id="{FE90CCE9-4AAE-4E1F-85AD-521A406D6524}" type="slidenum">
+              <a:rPr lang="en-PH" smtClean="0"/>
+              <a:t>15</a:t>
+            </a:fld>
+            <a:endParaRPr lang="en-PH"/>
+          </a:p>
+        </p:txBody>
+      </p:sp>
+    </p:spTree>
+    <p:extLst>
+      <p:ext uri="{BB962C8B-B14F-4D97-AF65-F5344CB8AC3E}">
+        <p14:creationId xmlns:p14="http://schemas.microsoft.com/office/powerpoint/2010/main" val="432218876"/>
+      </p:ext>
+    </p:extLst>
+  </p:cSld>
+  <p:clrMapOvr>
+    <a:masterClrMapping/>
+  </p:clrMapOvr>
+</p:notes>
+</file>
+
+<file path=ppt/notesSlides/notesSlide16.xml><?xml version="1.0" encoding="utf-8"?>
+<p:notes xmlns:a="http://schemas.openxmlformats.org/drawingml/2006/main" xmlns:r="http://schemas.openxmlformats.org/officeDocument/2006/relationships" xmlns:p="http://schemas.openxmlformats.org/presentationml/2006/main">
+  <p:cSld>
+    <p:spTree>
+      <p:nvGrpSpPr>
+        <p:cNvPr id="1" name=""/>
+        <p:cNvGrpSpPr/>
+        <p:nvPr/>
+      </p:nvGrpSpPr>
+      <p:grpSpPr>
+        <a:xfrm>
+          <a:off x="0" y="0"/>
+          <a:ext cx="0" cy="0"/>
+          <a:chOff x="0" y="0"/>
+          <a:chExt cx="0" cy="0"/>
+        </a:xfrm>
+      </p:grpSpPr>
+      <p:sp>
+        <p:nvSpPr>
+          <p:cNvPr id="2" name="Slide Image Placeholder 1"/>
+          <p:cNvSpPr>
+            <a:spLocks noGrp="1" noRot="1" noChangeAspect="1"/>
+          </p:cNvSpPr>
+          <p:nvPr>
+            <p:ph type="sldImg"/>
+          </p:nvPr>
+        </p:nvSpPr>
+        <p:spPr/>
+      </p:sp>
+      <p:sp>
+        <p:nvSpPr>
+          <p:cNvPr id="3" name="Notes Placeholder 2"/>
+          <p:cNvSpPr>
+            <a:spLocks noGrp="1"/>
+          </p:cNvSpPr>
+          <p:nvPr>
+            <p:ph type="body" idx="1"/>
+          </p:nvPr>
+        </p:nvSpPr>
+        <p:spPr/>
+        <p:txBody>
+          <a:bodyPr/>
+          <a:lstStyle/>
+          <a:p>
+            <a:endParaRPr lang="en-PH" dirty="0"/>
+          </a:p>
+        </p:txBody>
+      </p:sp>
+      <p:sp>
+        <p:nvSpPr>
+          <p:cNvPr id="4" name="Slide Number Placeholder 3"/>
+          <p:cNvSpPr>
+            <a:spLocks noGrp="1"/>
+          </p:cNvSpPr>
+          <p:nvPr>
+            <p:ph type="sldNum" sz="quarter" idx="5"/>
+          </p:nvPr>
+        </p:nvSpPr>
+        <p:spPr/>
+        <p:txBody>
+          <a:bodyPr/>
+          <a:lstStyle/>
+          <a:p>
+            <a:fld id="{FE90CCE9-4AAE-4E1F-85AD-521A406D6524}" type="slidenum">
+              <a:rPr lang="en-PH" smtClean="0"/>
+              <a:t>16</a:t>
             </a:fld>
             <a:endParaRPr lang="en-PH"/>
           </a:p>
@@ -1628,7 +1798,7 @@
     </p:spTree>
     <p:extLst>
       <p:ext uri="{BB962C8B-B14F-4D97-AF65-F5344CB8AC3E}">
-        <p14:creationId xmlns:p14="http://schemas.microsoft.com/office/powerpoint/2010/main" val="2988544794"/>
+        <p14:creationId xmlns:p14="http://schemas.microsoft.com/office/powerpoint/2010/main" val="348434841"/>
       </p:ext>
     </p:extLst>
   </p:cSld>
@@ -1712,7 +1882,7 @@
     </p:spTree>
     <p:extLst>
       <p:ext uri="{BB962C8B-B14F-4D97-AF65-F5344CB8AC3E}">
-        <p14:creationId xmlns:p14="http://schemas.microsoft.com/office/powerpoint/2010/main" val="239820307"/>
+        <p14:creationId xmlns:p14="http://schemas.microsoft.com/office/powerpoint/2010/main" val="3588469666"/>
       </p:ext>
     </p:extLst>
   </p:cSld>
@@ -1796,7 +1966,7 @@
     </p:spTree>
     <p:extLst>
       <p:ext uri="{BB962C8B-B14F-4D97-AF65-F5344CB8AC3E}">
-        <p14:creationId xmlns:p14="http://schemas.microsoft.com/office/powerpoint/2010/main" val="461918963"/>
+        <p14:creationId xmlns:p14="http://schemas.microsoft.com/office/powerpoint/2010/main" val="2988544794"/>
       </p:ext>
     </p:extLst>
   </p:cSld>
@@ -1880,7 +2050,7 @@
     </p:spTree>
     <p:extLst>
       <p:ext uri="{BB962C8B-B14F-4D97-AF65-F5344CB8AC3E}">
-        <p14:creationId xmlns:p14="http://schemas.microsoft.com/office/powerpoint/2010/main" val="2334409620"/>
+        <p14:creationId xmlns:p14="http://schemas.microsoft.com/office/powerpoint/2010/main" val="239820307"/>
       </p:ext>
     </p:extLst>
   </p:cSld>
@@ -5324,13 +5494,13 @@
         </p:spPr>
         <p:txBody>
           <a:bodyPr>
-            <a:normAutofit fontScale="90000"/>
+            <a:noAutofit/>
           </a:bodyPr>
           <a:lstStyle/>
           <a:p>
             <a:r>
-              <a:rPr lang="en-PH" b="1" dirty="0"/>
-              <a:t>Thread Lifecycle</a:t>
+              <a:rPr lang="en-PH" sz="5000" b="1" dirty="0"/>
+              <a:t>Implementing a Runnable Interface</a:t>
             </a:r>
           </a:p>
         </p:txBody>
@@ -5383,10 +5553,10 @@
       </p:sp>
       <p:sp>
         <p:nvSpPr>
-          <p:cNvPr id="3" name="TextBox 2">
-            <a:extLst>
-              <a:ext uri="{FF2B5EF4-FFF2-40B4-BE49-F238E27FC236}">
-                <a16:creationId xmlns:a16="http://schemas.microsoft.com/office/drawing/2014/main" id="{3585BB4D-48BF-F4D5-0836-77023A1B410A}"/>
+          <p:cNvPr id="5" name="TextBox 4">
+            <a:extLst>
+              <a:ext uri="{FF2B5EF4-FFF2-40B4-BE49-F238E27FC236}">
+                <a16:creationId xmlns:a16="http://schemas.microsoft.com/office/drawing/2014/main" id="{F9AC5282-A147-49E6-959C-FAD202E26B2C}"/>
               </a:ext>
             </a:extLst>
           </p:cNvPr>
@@ -5395,8 +5565,8 @@
         </p:nvSpPr>
         <p:spPr>
           <a:xfrm>
-            <a:off x="1524000" y="1266869"/>
-            <a:ext cx="9144000" cy="5478423"/>
+            <a:off x="1523999" y="1647024"/>
+            <a:ext cx="7751524" cy="477054"/>
           </a:xfrm>
           <a:prstGeom prst="rect">
             <a:avLst/>
@@ -5409,91 +5579,474 @@
           </a:bodyPr>
           <a:lstStyle/>
           <a:p>
-            <a:pPr marL="342900" indent="-342900" algn="l">
-              <a:buFont typeface="Wingdings" panose="05000000000000000000" pitchFamily="2" charset="2"/>
-              <a:buChar char="q"/>
-            </a:pPr>
-            <a:r>
-              <a:rPr lang="en-US" sz="2500" b="1" dirty="0"/>
-              <a:t>New State</a:t>
-            </a:r>
-            <a:r>
-              <a:rPr lang="en-US" sz="2500" dirty="0"/>
-              <a:t>. As we use the Thread class to construct a thread entity, the thread is born and is defined as being in the New state. </a:t>
-            </a:r>
-          </a:p>
-          <a:p>
-            <a:pPr marL="342900" indent="-342900" algn="l">
-              <a:buFont typeface="Wingdings" panose="05000000000000000000" pitchFamily="2" charset="2"/>
-              <a:buChar char="q"/>
-            </a:pPr>
-            <a:endParaRPr lang="en-US" sz="2500" dirty="0"/>
-          </a:p>
-          <a:p>
-            <a:pPr marL="342900" indent="-342900" algn="l">
-              <a:buFont typeface="Wingdings" panose="05000000000000000000" pitchFamily="2" charset="2"/>
-              <a:buChar char="q"/>
-            </a:pPr>
-            <a:r>
-              <a:rPr lang="en-US" sz="2500" b="1" dirty="0"/>
-              <a:t>Runnable State</a:t>
-            </a:r>
-            <a:r>
-              <a:rPr lang="en-US" sz="2500" dirty="0"/>
-              <a:t>. A thread in the runnable state is prepared to execute the code. When a new thread's start() function is called, it enters a runnable state.</a:t>
-            </a:r>
-          </a:p>
-          <a:p>
-            <a:pPr marL="342900" indent="-342900" algn="l">
-              <a:buFont typeface="Wingdings" panose="05000000000000000000" pitchFamily="2" charset="2"/>
-              <a:buChar char="q"/>
-            </a:pPr>
-            <a:endParaRPr lang="en-US" sz="2500" dirty="0"/>
-          </a:p>
-          <a:p>
-            <a:pPr marL="342900" indent="-342900" algn="l">
-              <a:buFont typeface="Wingdings" panose="05000000000000000000" pitchFamily="2" charset="2"/>
-              <a:buChar char="q"/>
-            </a:pPr>
-            <a:r>
-              <a:rPr lang="en-US" sz="2500" b="1" dirty="0"/>
-              <a:t>Running State</a:t>
-            </a:r>
-            <a:r>
-              <a:rPr lang="en-US" sz="2500" dirty="0"/>
-              <a:t>. Running implies that the processor (CPU) has assigned a time slot to the thread for execution. When a thread from the runnable state is chosen for execution by the thread scheduler, it joins the running state.</a:t>
-            </a:r>
-          </a:p>
-          <a:p>
-            <a:pPr marL="342900" indent="-342900" algn="l">
-              <a:buFont typeface="Wingdings" panose="05000000000000000000" pitchFamily="2" charset="2"/>
-              <a:buChar char="q"/>
-            </a:pPr>
-            <a:endParaRPr lang="en-US" sz="2500" dirty="0"/>
-          </a:p>
-          <a:p>
-            <a:pPr marL="342900" indent="-342900" algn="l">
-              <a:buFont typeface="Wingdings" panose="05000000000000000000" pitchFamily="2" charset="2"/>
-              <a:buChar char="q"/>
-            </a:pPr>
-            <a:endParaRPr lang="en-US" sz="2500" dirty="0"/>
-          </a:p>
-          <a:p>
-            <a:pPr algn="l"/>
-            <a:endParaRPr lang="en-US" sz="2500" dirty="0"/>
+            <a:r>
+              <a:rPr lang="en-PH" sz="2500" dirty="0">
+                <a:solidFill>
+                  <a:srgbClr val="7030A0"/>
+                </a:solidFill>
+                <a:latin typeface="Consolas" panose="020B0609020204030204" pitchFamily="49" charset="0"/>
+              </a:rPr>
+              <a:t>public class </a:t>
+            </a:r>
+            <a:r>
+              <a:rPr lang="en-PH" sz="2500" dirty="0" err="1">
+                <a:solidFill>
+                  <a:srgbClr val="0070C0"/>
+                </a:solidFill>
+                <a:latin typeface="Consolas" panose="020B0609020204030204" pitchFamily="49" charset="0"/>
+              </a:rPr>
+              <a:t>myThread</a:t>
+            </a:r>
+            <a:r>
+              <a:rPr lang="en-PH" sz="2500" dirty="0">
+                <a:solidFill>
+                  <a:srgbClr val="7030A0"/>
+                </a:solidFill>
+                <a:latin typeface="Consolas" panose="020B0609020204030204" pitchFamily="49" charset="0"/>
+              </a:rPr>
+              <a:t> implements </a:t>
+            </a:r>
+            <a:r>
+              <a:rPr lang="en-PH" sz="2500" dirty="0">
+                <a:solidFill>
+                  <a:srgbClr val="0070C0"/>
+                </a:solidFill>
+                <a:latin typeface="Consolas" panose="020B0609020204030204" pitchFamily="49" charset="0"/>
+              </a:rPr>
+              <a:t>Runnable </a:t>
+            </a:r>
+            <a:r>
+              <a:rPr lang="en-PH" sz="2500" dirty="0">
+                <a:latin typeface="Consolas" panose="020B0609020204030204" pitchFamily="49" charset="0"/>
+              </a:rPr>
+              <a:t>{</a:t>
+            </a:r>
+            <a:endParaRPr lang="en-PH" sz="2500" dirty="0"/>
+          </a:p>
+        </p:txBody>
+      </p:sp>
+      <p:sp>
+        <p:nvSpPr>
+          <p:cNvPr id="9" name="TextBox 8">
+            <a:extLst>
+              <a:ext uri="{FF2B5EF4-FFF2-40B4-BE49-F238E27FC236}">
+                <a16:creationId xmlns:a16="http://schemas.microsoft.com/office/drawing/2014/main" id="{323B4072-E162-690F-F474-35AF6637EA82}"/>
+              </a:ext>
+            </a:extLst>
+          </p:cNvPr>
+          <p:cNvSpPr txBox="1"/>
+          <p:nvPr/>
+        </p:nvSpPr>
+        <p:spPr>
+          <a:xfrm>
+            <a:off x="1523999" y="4198441"/>
+            <a:ext cx="375781" cy="477054"/>
+          </a:xfrm>
+          <a:prstGeom prst="rect">
+            <a:avLst/>
+          </a:prstGeom>
+          <a:noFill/>
+        </p:spPr>
+        <p:txBody>
+          <a:bodyPr wrap="square" rtlCol="0">
+            <a:spAutoFit/>
+          </a:bodyPr>
+          <a:lstStyle/>
+          <a:p>
+            <a:r>
+              <a:rPr lang="en-PH" sz="2500" dirty="0">
+                <a:latin typeface="Consolas" panose="020B0609020204030204" pitchFamily="49" charset="0"/>
+              </a:rPr>
+              <a:t>}</a:t>
+            </a:r>
+            <a:endParaRPr lang="en-PH" sz="2500" dirty="0"/>
+          </a:p>
+        </p:txBody>
+      </p:sp>
+      <p:sp>
+        <p:nvSpPr>
+          <p:cNvPr id="10" name="TextBox 9">
+            <a:extLst>
+              <a:ext uri="{FF2B5EF4-FFF2-40B4-BE49-F238E27FC236}">
+                <a16:creationId xmlns:a16="http://schemas.microsoft.com/office/drawing/2014/main" id="{4D0F0BAC-48BC-12D7-4628-028A500146AF}"/>
+              </a:ext>
+            </a:extLst>
+          </p:cNvPr>
+          <p:cNvSpPr txBox="1"/>
+          <p:nvPr/>
+        </p:nvSpPr>
+        <p:spPr>
+          <a:xfrm>
+            <a:off x="1899781" y="2421032"/>
+            <a:ext cx="8240038" cy="2015936"/>
+          </a:xfrm>
+          <a:prstGeom prst="rect">
+            <a:avLst/>
+          </a:prstGeom>
+          <a:noFill/>
+        </p:spPr>
+        <p:txBody>
+          <a:bodyPr wrap="square" rtlCol="0">
+            <a:spAutoFit/>
+          </a:bodyPr>
+          <a:lstStyle/>
+          <a:p>
+            <a:r>
+              <a:rPr lang="en-PH" sz="2500" dirty="0">
+                <a:solidFill>
+                  <a:srgbClr val="7030A0"/>
+                </a:solidFill>
+                <a:latin typeface="Consolas" panose="020B0609020204030204" pitchFamily="49" charset="0"/>
+              </a:rPr>
+              <a:t>public</a:t>
+            </a:r>
+            <a:r>
+              <a:rPr lang="en-PH" sz="2500" dirty="0">
+                <a:latin typeface="Consolas" panose="020B0609020204030204" pitchFamily="49" charset="0"/>
+              </a:rPr>
+              <a:t> </a:t>
+            </a:r>
+            <a:r>
+              <a:rPr lang="en-PH" sz="2500" dirty="0">
+                <a:solidFill>
+                  <a:srgbClr val="00B0F0"/>
+                </a:solidFill>
+                <a:latin typeface="Consolas" panose="020B0609020204030204" pitchFamily="49" charset="0"/>
+              </a:rPr>
+              <a:t>void </a:t>
+            </a:r>
+            <a:r>
+              <a:rPr lang="en-PH" sz="2500" dirty="0">
+                <a:solidFill>
+                  <a:srgbClr val="0070C0"/>
+                </a:solidFill>
+                <a:latin typeface="Consolas" panose="020B0609020204030204" pitchFamily="49" charset="0"/>
+              </a:rPr>
+              <a:t>run</a:t>
+            </a:r>
+            <a:r>
+              <a:rPr lang="en-PH" sz="2500" dirty="0">
+                <a:latin typeface="Consolas" panose="020B0609020204030204" pitchFamily="49" charset="0"/>
+              </a:rPr>
+              <a:t>() {</a:t>
+            </a:r>
+          </a:p>
+          <a:p>
+            <a:endParaRPr lang="en-PH" sz="2500" dirty="0">
+              <a:latin typeface="Consolas" panose="020B0609020204030204" pitchFamily="49" charset="0"/>
+            </a:endParaRPr>
+          </a:p>
+          <a:p>
+            <a:r>
+              <a:rPr lang="en-PH" sz="2500" dirty="0">
+                <a:latin typeface="Consolas" panose="020B0609020204030204" pitchFamily="49" charset="0"/>
+              </a:rPr>
+              <a:t>	</a:t>
+            </a:r>
+            <a:r>
+              <a:rPr lang="en-PH" sz="2500" dirty="0" err="1">
+                <a:latin typeface="Consolas" panose="020B0609020204030204" pitchFamily="49" charset="0"/>
+              </a:rPr>
+              <a:t>System.out.println</a:t>
+            </a:r>
+            <a:r>
+              <a:rPr lang="en-PH" sz="2500" dirty="0">
+                <a:latin typeface="Consolas" panose="020B0609020204030204" pitchFamily="49" charset="0"/>
+              </a:rPr>
+              <a:t>(“Thread is running”);</a:t>
+            </a:r>
+          </a:p>
+          <a:p>
+            <a:r>
+              <a:rPr lang="en-PH" sz="2500" dirty="0">
+                <a:latin typeface="Consolas" panose="020B0609020204030204" pitchFamily="49" charset="0"/>
+              </a:rPr>
+              <a:t>}</a:t>
+            </a:r>
+          </a:p>
+          <a:p>
+            <a:endParaRPr lang="en-PH" sz="2500" dirty="0"/>
           </a:p>
         </p:txBody>
       </p:sp>
     </p:spTree>
     <p:extLst>
       <p:ext uri="{BB962C8B-B14F-4D97-AF65-F5344CB8AC3E}">
-        <p14:creationId xmlns:p14="http://schemas.microsoft.com/office/powerpoint/2010/main" val="2413565988"/>
+        <p14:creationId xmlns:p14="http://schemas.microsoft.com/office/powerpoint/2010/main" val="55429838"/>
       </p:ext>
     </p:extLst>
   </p:cSld>
   <p:clrMapOvr>
     <a:masterClrMapping/>
   </p:clrMapOvr>
+  <p:timing>
+    <p:tnLst>
+      <p:par>
+        <p:cTn id="1" dur="indefinite" restart="never" nodeType="tmRoot">
+          <p:childTnLst>
+            <p:seq concurrent="1" nextAc="seek">
+              <p:cTn id="2" dur="indefinite" nodeType="mainSeq">
+                <p:childTnLst>
+                  <p:par>
+                    <p:cTn id="3" fill="hold">
+                      <p:stCondLst>
+                        <p:cond delay="indefinite"/>
+                      </p:stCondLst>
+                      <p:childTnLst>
+                        <p:par>
+                          <p:cTn id="4" fill="hold">
+                            <p:stCondLst>
+                              <p:cond delay="0"/>
+                            </p:stCondLst>
+                            <p:childTnLst>
+                              <p:par>
+                                <p:cTn id="5" presetID="14" presetClass="entr" presetSubtype="10" fill="hold" grpId="0" nodeType="clickEffect">
+                                  <p:stCondLst>
+                                    <p:cond delay="0"/>
+                                  </p:stCondLst>
+                                  <p:childTnLst>
+                                    <p:set>
+                                      <p:cBhvr>
+                                        <p:cTn id="6" dur="1" fill="hold">
+                                          <p:stCondLst>
+                                            <p:cond delay="0"/>
+                                          </p:stCondLst>
+                                        </p:cTn>
+                                        <p:tgtEl>
+                                          <p:spTgt spid="5"/>
+                                        </p:tgtEl>
+                                        <p:attrNameLst>
+                                          <p:attrName>style.visibility</p:attrName>
+                                        </p:attrNameLst>
+                                      </p:cBhvr>
+                                      <p:to>
+                                        <p:strVal val="visible"/>
+                                      </p:to>
+                                    </p:set>
+                                    <p:animEffect transition="in" filter="randombar(horizontal)">
+                                      <p:cBhvr>
+                                        <p:cTn id="7" dur="500"/>
+                                        <p:tgtEl>
+                                          <p:spTgt spid="5"/>
+                                        </p:tgtEl>
+                                      </p:cBhvr>
+                                    </p:animEffect>
+                                  </p:childTnLst>
+                                </p:cTn>
+                              </p:par>
+                              <p:par>
+                                <p:cTn id="8" presetID="42" presetClass="entr" presetSubtype="0" fill="hold" grpId="0" nodeType="withEffect">
+                                  <p:stCondLst>
+                                    <p:cond delay="0"/>
+                                  </p:stCondLst>
+                                  <p:childTnLst>
+                                    <p:set>
+                                      <p:cBhvr>
+                                        <p:cTn id="9" dur="1" fill="hold">
+                                          <p:stCondLst>
+                                            <p:cond delay="0"/>
+                                          </p:stCondLst>
+                                        </p:cTn>
+                                        <p:tgtEl>
+                                          <p:spTgt spid="9"/>
+                                        </p:tgtEl>
+                                        <p:attrNameLst>
+                                          <p:attrName>style.visibility</p:attrName>
+                                        </p:attrNameLst>
+                                      </p:cBhvr>
+                                      <p:to>
+                                        <p:strVal val="visible"/>
+                                      </p:to>
+                                    </p:set>
+                                    <p:animEffect transition="in" filter="fade">
+                                      <p:cBhvr>
+                                        <p:cTn id="10" dur="1000"/>
+                                        <p:tgtEl>
+                                          <p:spTgt spid="9"/>
+                                        </p:tgtEl>
+                                      </p:cBhvr>
+                                    </p:animEffect>
+                                    <p:anim calcmode="lin" valueType="num">
+                                      <p:cBhvr>
+                                        <p:cTn id="11" dur="1000" fill="hold"/>
+                                        <p:tgtEl>
+                                          <p:spTgt spid="9"/>
+                                        </p:tgtEl>
+                                        <p:attrNameLst>
+                                          <p:attrName>ppt_x</p:attrName>
+                                        </p:attrNameLst>
+                                      </p:cBhvr>
+                                      <p:tavLst>
+                                        <p:tav tm="0">
+                                          <p:val>
+                                            <p:strVal val="#ppt_x"/>
+                                          </p:val>
+                                        </p:tav>
+                                        <p:tav tm="100000">
+                                          <p:val>
+                                            <p:strVal val="#ppt_x"/>
+                                          </p:val>
+                                        </p:tav>
+                                      </p:tavLst>
+                                    </p:anim>
+                                    <p:anim calcmode="lin" valueType="num">
+                                      <p:cBhvr>
+                                        <p:cTn id="12" dur="1000" fill="hold"/>
+                                        <p:tgtEl>
+                                          <p:spTgt spid="9"/>
+                                        </p:tgtEl>
+                                        <p:attrNameLst>
+                                          <p:attrName>ppt_y</p:attrName>
+                                        </p:attrNameLst>
+                                      </p:cBhvr>
+                                      <p:tavLst>
+                                        <p:tav tm="0">
+                                          <p:val>
+                                            <p:strVal val="#ppt_y+.1"/>
+                                          </p:val>
+                                        </p:tav>
+                                        <p:tav tm="100000">
+                                          <p:val>
+                                            <p:strVal val="#ppt_y"/>
+                                          </p:val>
+                                        </p:tav>
+                                      </p:tavLst>
+                                    </p:anim>
+                                  </p:childTnLst>
+                                </p:cTn>
+                              </p:par>
+                            </p:childTnLst>
+                          </p:cTn>
+                        </p:par>
+                      </p:childTnLst>
+                    </p:cTn>
+                  </p:par>
+                  <p:par>
+                    <p:cTn id="13" fill="hold">
+                      <p:stCondLst>
+                        <p:cond delay="indefinite"/>
+                      </p:stCondLst>
+                      <p:childTnLst>
+                        <p:par>
+                          <p:cTn id="14" fill="hold">
+                            <p:stCondLst>
+                              <p:cond delay="0"/>
+                            </p:stCondLst>
+                            <p:childTnLst>
+                              <p:par>
+                                <p:cTn id="15" presetID="42" presetClass="entr" presetSubtype="0" fill="hold" grpId="0" nodeType="clickEffect">
+                                  <p:stCondLst>
+                                    <p:cond delay="0"/>
+                                  </p:stCondLst>
+                                  <p:childTnLst>
+                                    <p:set>
+                                      <p:cBhvr>
+                                        <p:cTn id="16" dur="1" fill="hold">
+                                          <p:stCondLst>
+                                            <p:cond delay="0"/>
+                                          </p:stCondLst>
+                                        </p:cTn>
+                                        <p:tgtEl>
+                                          <p:spTgt spid="10"/>
+                                        </p:tgtEl>
+                                        <p:attrNameLst>
+                                          <p:attrName>style.visibility</p:attrName>
+                                        </p:attrNameLst>
+                                      </p:cBhvr>
+                                      <p:to>
+                                        <p:strVal val="visible"/>
+                                      </p:to>
+                                    </p:set>
+                                    <p:animEffect transition="in" filter="fade">
+                                      <p:cBhvr>
+                                        <p:cTn id="17" dur="1000"/>
+                                        <p:tgtEl>
+                                          <p:spTgt spid="10"/>
+                                        </p:tgtEl>
+                                      </p:cBhvr>
+                                    </p:animEffect>
+                                    <p:anim calcmode="lin" valueType="num">
+                                      <p:cBhvr>
+                                        <p:cTn id="18" dur="1000" fill="hold"/>
+                                        <p:tgtEl>
+                                          <p:spTgt spid="10"/>
+                                        </p:tgtEl>
+                                        <p:attrNameLst>
+                                          <p:attrName>ppt_x</p:attrName>
+                                        </p:attrNameLst>
+                                      </p:cBhvr>
+                                      <p:tavLst>
+                                        <p:tav tm="0">
+                                          <p:val>
+                                            <p:strVal val="#ppt_x"/>
+                                          </p:val>
+                                        </p:tav>
+                                        <p:tav tm="100000">
+                                          <p:val>
+                                            <p:strVal val="#ppt_x"/>
+                                          </p:val>
+                                        </p:tav>
+                                      </p:tavLst>
+                                    </p:anim>
+                                    <p:anim calcmode="lin" valueType="num">
+                                      <p:cBhvr>
+                                        <p:cTn id="19" dur="1000" fill="hold"/>
+                                        <p:tgtEl>
+                                          <p:spTgt spid="10"/>
+                                        </p:tgtEl>
+                                        <p:attrNameLst>
+                                          <p:attrName>ppt_y</p:attrName>
+                                        </p:attrNameLst>
+                                      </p:cBhvr>
+                                      <p:tavLst>
+                                        <p:tav tm="0">
+                                          <p:val>
+                                            <p:strVal val="#ppt_y+.1"/>
+                                          </p:val>
+                                        </p:tav>
+                                        <p:tav tm="100000">
+                                          <p:val>
+                                            <p:strVal val="#ppt_y"/>
+                                          </p:val>
+                                        </p:tav>
+                                      </p:tavLst>
+                                    </p:anim>
+                                  </p:childTnLst>
+                                </p:cTn>
+                              </p:par>
+                            </p:childTnLst>
+                          </p:cTn>
+                        </p:par>
+                      </p:childTnLst>
+                    </p:cTn>
+                  </p:par>
+                </p:childTnLst>
+              </p:cTn>
+              <p:prevCondLst>
+                <p:cond evt="onPrev" delay="0">
+                  <p:tgtEl>
+                    <p:sldTgt/>
+                  </p:tgtEl>
+                </p:cond>
+              </p:prevCondLst>
+              <p:nextCondLst>
+                <p:cond evt="onNext" delay="0">
+                  <p:tgtEl>
+                    <p:sldTgt/>
+                  </p:tgtEl>
+                </p:cond>
+              </p:nextCondLst>
+            </p:seq>
+          </p:childTnLst>
+        </p:cTn>
+      </p:par>
+    </p:tnLst>
+    <p:bldLst>
+      <p:bldP spid="5" grpId="0"/>
+      <p:bldP spid="9" grpId="0"/>
+      <p:bldP spid="10" grpId="0"/>
+    </p:bldLst>
+  </p:timing>
 </p:sld>
 </file>
 
@@ -5612,6 +6165,1142 @@
       </p:sp>
       <p:sp>
         <p:nvSpPr>
+          <p:cNvPr id="5" name="Rectangle 4">
+            <a:extLst>
+              <a:ext uri="{FF2B5EF4-FFF2-40B4-BE49-F238E27FC236}">
+                <a16:creationId xmlns:a16="http://schemas.microsoft.com/office/drawing/2014/main" id="{59E25336-F742-2A51-E156-CD38D257A34C}"/>
+              </a:ext>
+            </a:extLst>
+          </p:cNvPr>
+          <p:cNvSpPr/>
+          <p:nvPr/>
+        </p:nvSpPr>
+        <p:spPr>
+          <a:xfrm>
+            <a:off x="2605899" y="1285559"/>
+            <a:ext cx="1129619" cy="619129"/>
+          </a:xfrm>
+          <a:prstGeom prst="rect">
+            <a:avLst/>
+          </a:prstGeom>
+        </p:spPr>
+        <p:style>
+          <a:lnRef idx="0">
+            <a:schemeClr val="accent6"/>
+          </a:lnRef>
+          <a:fillRef idx="3">
+            <a:schemeClr val="accent6"/>
+          </a:fillRef>
+          <a:effectRef idx="3">
+            <a:schemeClr val="accent6"/>
+          </a:effectRef>
+          <a:fontRef idx="minor">
+            <a:schemeClr val="lt1"/>
+          </a:fontRef>
+        </p:style>
+        <p:txBody>
+          <a:bodyPr rtlCol="0" anchor="ctr"/>
+          <a:lstStyle/>
+          <a:p>
+            <a:pPr algn="ctr"/>
+            <a:r>
+              <a:rPr lang="en-PH" b="1" dirty="0"/>
+              <a:t>New</a:t>
+            </a:r>
+          </a:p>
+        </p:txBody>
+      </p:sp>
+      <p:sp>
+        <p:nvSpPr>
+          <p:cNvPr id="6" name="Rectangle 5">
+            <a:extLst>
+              <a:ext uri="{FF2B5EF4-FFF2-40B4-BE49-F238E27FC236}">
+                <a16:creationId xmlns:a16="http://schemas.microsoft.com/office/drawing/2014/main" id="{94B8E03B-83F4-366A-5F3E-8915C16FC5BE}"/>
+              </a:ext>
+            </a:extLst>
+          </p:cNvPr>
+          <p:cNvSpPr/>
+          <p:nvPr/>
+        </p:nvSpPr>
+        <p:spPr>
+          <a:xfrm>
+            <a:off x="8702633" y="2971800"/>
+            <a:ext cx="1805049" cy="914400"/>
+          </a:xfrm>
+          <a:prstGeom prst="rect">
+            <a:avLst/>
+          </a:prstGeom>
+        </p:spPr>
+        <p:style>
+          <a:lnRef idx="0">
+            <a:schemeClr val="accent2"/>
+          </a:lnRef>
+          <a:fillRef idx="3">
+            <a:schemeClr val="accent2"/>
+          </a:fillRef>
+          <a:effectRef idx="3">
+            <a:schemeClr val="accent2"/>
+          </a:effectRef>
+          <a:fontRef idx="minor">
+            <a:schemeClr val="lt1"/>
+          </a:fontRef>
+        </p:style>
+        <p:txBody>
+          <a:bodyPr rtlCol="0" anchor="ctr"/>
+          <a:lstStyle/>
+          <a:p>
+            <a:pPr algn="ctr"/>
+            <a:r>
+              <a:rPr lang="en-PH" b="1" dirty="0"/>
+              <a:t>Dead</a:t>
+            </a:r>
+          </a:p>
+        </p:txBody>
+      </p:sp>
+      <p:sp>
+        <p:nvSpPr>
+          <p:cNvPr id="7" name="Oval 6">
+            <a:extLst>
+              <a:ext uri="{FF2B5EF4-FFF2-40B4-BE49-F238E27FC236}">
+                <a16:creationId xmlns:a16="http://schemas.microsoft.com/office/drawing/2014/main" id="{191092CE-C273-8F9D-F367-2D97D2D2EABA}"/>
+              </a:ext>
+            </a:extLst>
+          </p:cNvPr>
+          <p:cNvSpPr/>
+          <p:nvPr/>
+        </p:nvSpPr>
+        <p:spPr>
+          <a:xfrm>
+            <a:off x="2396878" y="2520820"/>
+            <a:ext cx="1555502" cy="718459"/>
+          </a:xfrm>
+          <a:prstGeom prst="ellipse">
+            <a:avLst/>
+          </a:prstGeom>
+        </p:spPr>
+        <p:style>
+          <a:lnRef idx="0">
+            <a:schemeClr val="accent5"/>
+          </a:lnRef>
+          <a:fillRef idx="3">
+            <a:schemeClr val="accent5"/>
+          </a:fillRef>
+          <a:effectRef idx="3">
+            <a:schemeClr val="accent5"/>
+          </a:effectRef>
+          <a:fontRef idx="minor">
+            <a:schemeClr val="lt1"/>
+          </a:fontRef>
+        </p:style>
+        <p:txBody>
+          <a:bodyPr rtlCol="0" anchor="ctr"/>
+          <a:lstStyle/>
+          <a:p>
+            <a:pPr algn="ctr"/>
+            <a:r>
+              <a:rPr lang="en-PH" b="1" dirty="0"/>
+              <a:t>Runnable</a:t>
+            </a:r>
+          </a:p>
+        </p:txBody>
+      </p:sp>
+      <p:sp>
+        <p:nvSpPr>
+          <p:cNvPr id="8" name="Oval 7">
+            <a:extLst>
+              <a:ext uri="{FF2B5EF4-FFF2-40B4-BE49-F238E27FC236}">
+                <a16:creationId xmlns:a16="http://schemas.microsoft.com/office/drawing/2014/main" id="{158CB72E-5EAF-B750-10DD-DBA406F6F475}"/>
+              </a:ext>
+            </a:extLst>
+          </p:cNvPr>
+          <p:cNvSpPr/>
+          <p:nvPr/>
+        </p:nvSpPr>
+        <p:spPr>
+          <a:xfrm>
+            <a:off x="2396878" y="3698558"/>
+            <a:ext cx="1555502" cy="817529"/>
+          </a:xfrm>
+          <a:prstGeom prst="ellipse">
+            <a:avLst/>
+          </a:prstGeom>
+        </p:spPr>
+        <p:style>
+          <a:lnRef idx="0">
+            <a:schemeClr val="accent1"/>
+          </a:lnRef>
+          <a:fillRef idx="3">
+            <a:schemeClr val="accent1"/>
+          </a:fillRef>
+          <a:effectRef idx="3">
+            <a:schemeClr val="accent1"/>
+          </a:effectRef>
+          <a:fontRef idx="minor">
+            <a:schemeClr val="lt1"/>
+          </a:fontRef>
+        </p:style>
+        <p:txBody>
+          <a:bodyPr rtlCol="0" anchor="ctr"/>
+          <a:lstStyle/>
+          <a:p>
+            <a:pPr algn="ctr"/>
+            <a:r>
+              <a:rPr lang="en-PH" b="1" dirty="0"/>
+              <a:t>Running</a:t>
+            </a:r>
+          </a:p>
+        </p:txBody>
+      </p:sp>
+      <p:sp>
+        <p:nvSpPr>
+          <p:cNvPr id="10" name="Rectangle 9">
+            <a:extLst>
+              <a:ext uri="{FF2B5EF4-FFF2-40B4-BE49-F238E27FC236}">
+                <a16:creationId xmlns:a16="http://schemas.microsoft.com/office/drawing/2014/main" id="{B2B7BF79-17F2-1225-73A3-55F86D84F26C}"/>
+              </a:ext>
+            </a:extLst>
+          </p:cNvPr>
+          <p:cNvSpPr/>
+          <p:nvPr/>
+        </p:nvSpPr>
+        <p:spPr>
+          <a:xfrm>
+            <a:off x="2552663" y="5179359"/>
+            <a:ext cx="1236089" cy="692703"/>
+          </a:xfrm>
+          <a:prstGeom prst="rect">
+            <a:avLst/>
+          </a:prstGeom>
+        </p:spPr>
+        <p:style>
+          <a:lnRef idx="0">
+            <a:schemeClr val="accent4"/>
+          </a:lnRef>
+          <a:fillRef idx="3">
+            <a:schemeClr val="accent4"/>
+          </a:fillRef>
+          <a:effectRef idx="3">
+            <a:schemeClr val="accent4"/>
+          </a:effectRef>
+          <a:fontRef idx="minor">
+            <a:schemeClr val="lt1"/>
+          </a:fontRef>
+        </p:style>
+        <p:txBody>
+          <a:bodyPr rtlCol="0" anchor="ctr"/>
+          <a:lstStyle/>
+          <a:p>
+            <a:pPr algn="ctr"/>
+            <a:r>
+              <a:rPr lang="en-PH" b="1" dirty="0"/>
+              <a:t>Blocked</a:t>
+            </a:r>
+          </a:p>
+        </p:txBody>
+      </p:sp>
+      <p:cxnSp>
+        <p:nvCxnSpPr>
+          <p:cNvPr id="14" name="Straight Arrow Connector 13">
+            <a:extLst>
+              <a:ext uri="{FF2B5EF4-FFF2-40B4-BE49-F238E27FC236}">
+                <a16:creationId xmlns:a16="http://schemas.microsoft.com/office/drawing/2014/main" id="{6233C256-C5FF-1AA2-D5CC-A59B4D187191}"/>
+              </a:ext>
+            </a:extLst>
+          </p:cNvPr>
+          <p:cNvCxnSpPr>
+            <a:cxnSpLocks/>
+            <a:stCxn id="5" idx="3"/>
+            <a:endCxn id="6" idx="0"/>
+          </p:cNvCxnSpPr>
+          <p:nvPr/>
+        </p:nvCxnSpPr>
+        <p:spPr>
+          <a:xfrm>
+            <a:off x="3735518" y="1595124"/>
+            <a:ext cx="5869640" cy="1376676"/>
+          </a:xfrm>
+          <a:prstGeom prst="straightConnector1">
+            <a:avLst/>
+          </a:prstGeom>
+          <a:ln>
+            <a:tailEnd type="triangle"/>
+          </a:ln>
+        </p:spPr>
+        <p:style>
+          <a:lnRef idx="3">
+            <a:schemeClr val="dk1"/>
+          </a:lnRef>
+          <a:fillRef idx="0">
+            <a:schemeClr val="dk1"/>
+          </a:fillRef>
+          <a:effectRef idx="2">
+            <a:schemeClr val="dk1"/>
+          </a:effectRef>
+          <a:fontRef idx="minor">
+            <a:schemeClr val="tx1"/>
+          </a:fontRef>
+        </p:style>
+      </p:cxnSp>
+      <p:cxnSp>
+        <p:nvCxnSpPr>
+          <p:cNvPr id="15" name="Straight Arrow Connector 14">
+            <a:extLst>
+              <a:ext uri="{FF2B5EF4-FFF2-40B4-BE49-F238E27FC236}">
+                <a16:creationId xmlns:a16="http://schemas.microsoft.com/office/drawing/2014/main" id="{F7DF38A7-D745-23DA-9435-E2B98113B524}"/>
+              </a:ext>
+            </a:extLst>
+          </p:cNvPr>
+          <p:cNvCxnSpPr>
+            <a:cxnSpLocks/>
+            <a:stCxn id="7" idx="6"/>
+            <a:endCxn id="6" idx="1"/>
+          </p:cNvCxnSpPr>
+          <p:nvPr/>
+        </p:nvCxnSpPr>
+        <p:spPr>
+          <a:xfrm>
+            <a:off x="3952380" y="2880050"/>
+            <a:ext cx="4750253" cy="548950"/>
+          </a:xfrm>
+          <a:prstGeom prst="straightConnector1">
+            <a:avLst/>
+          </a:prstGeom>
+          <a:ln>
+            <a:tailEnd type="triangle"/>
+          </a:ln>
+        </p:spPr>
+        <p:style>
+          <a:lnRef idx="3">
+            <a:schemeClr val="dk1"/>
+          </a:lnRef>
+          <a:fillRef idx="0">
+            <a:schemeClr val="dk1"/>
+          </a:fillRef>
+          <a:effectRef idx="2">
+            <a:schemeClr val="dk1"/>
+          </a:effectRef>
+          <a:fontRef idx="minor">
+            <a:schemeClr val="tx1"/>
+          </a:fontRef>
+        </p:style>
+      </p:cxnSp>
+      <p:cxnSp>
+        <p:nvCxnSpPr>
+          <p:cNvPr id="18" name="Straight Arrow Connector 17">
+            <a:extLst>
+              <a:ext uri="{FF2B5EF4-FFF2-40B4-BE49-F238E27FC236}">
+                <a16:creationId xmlns:a16="http://schemas.microsoft.com/office/drawing/2014/main" id="{87EA7E24-AEA9-B57B-A06A-464ED7E6079A}"/>
+              </a:ext>
+            </a:extLst>
+          </p:cNvPr>
+          <p:cNvCxnSpPr>
+            <a:cxnSpLocks/>
+            <a:stCxn id="8" idx="6"/>
+            <a:endCxn id="6" idx="1"/>
+          </p:cNvCxnSpPr>
+          <p:nvPr/>
+        </p:nvCxnSpPr>
+        <p:spPr>
+          <a:xfrm flipV="1">
+            <a:off x="3952380" y="3429000"/>
+            <a:ext cx="4750253" cy="678323"/>
+          </a:xfrm>
+          <a:prstGeom prst="straightConnector1">
+            <a:avLst/>
+          </a:prstGeom>
+          <a:ln>
+            <a:tailEnd type="triangle"/>
+          </a:ln>
+        </p:spPr>
+        <p:style>
+          <a:lnRef idx="3">
+            <a:schemeClr val="dk1"/>
+          </a:lnRef>
+          <a:fillRef idx="0">
+            <a:schemeClr val="dk1"/>
+          </a:fillRef>
+          <a:effectRef idx="2">
+            <a:schemeClr val="dk1"/>
+          </a:effectRef>
+          <a:fontRef idx="minor">
+            <a:schemeClr val="tx1"/>
+          </a:fontRef>
+        </p:style>
+      </p:cxnSp>
+      <p:cxnSp>
+        <p:nvCxnSpPr>
+          <p:cNvPr id="21" name="Straight Arrow Connector 20">
+            <a:extLst>
+              <a:ext uri="{FF2B5EF4-FFF2-40B4-BE49-F238E27FC236}">
+                <a16:creationId xmlns:a16="http://schemas.microsoft.com/office/drawing/2014/main" id="{B7420DA8-E91C-B7CF-54D1-40F24D06282E}"/>
+              </a:ext>
+            </a:extLst>
+          </p:cNvPr>
+          <p:cNvCxnSpPr>
+            <a:cxnSpLocks/>
+            <a:stCxn id="10" idx="3"/>
+            <a:endCxn id="6" idx="2"/>
+          </p:cNvCxnSpPr>
+          <p:nvPr/>
+        </p:nvCxnSpPr>
+        <p:spPr>
+          <a:xfrm flipV="1">
+            <a:off x="3788752" y="3886200"/>
+            <a:ext cx="5816406" cy="1639511"/>
+          </a:xfrm>
+          <a:prstGeom prst="straightConnector1">
+            <a:avLst/>
+          </a:prstGeom>
+          <a:ln>
+            <a:tailEnd type="triangle"/>
+          </a:ln>
+        </p:spPr>
+        <p:style>
+          <a:lnRef idx="3">
+            <a:schemeClr val="dk1"/>
+          </a:lnRef>
+          <a:fillRef idx="0">
+            <a:schemeClr val="dk1"/>
+          </a:fillRef>
+          <a:effectRef idx="2">
+            <a:schemeClr val="dk1"/>
+          </a:effectRef>
+          <a:fontRef idx="minor">
+            <a:schemeClr val="tx1"/>
+          </a:fontRef>
+        </p:style>
+      </p:cxnSp>
+      <p:cxnSp>
+        <p:nvCxnSpPr>
+          <p:cNvPr id="24" name="Straight Arrow Connector 23">
+            <a:extLst>
+              <a:ext uri="{FF2B5EF4-FFF2-40B4-BE49-F238E27FC236}">
+                <a16:creationId xmlns:a16="http://schemas.microsoft.com/office/drawing/2014/main" id="{5142F068-7ECF-7183-CA8C-A2501E7AA624}"/>
+              </a:ext>
+            </a:extLst>
+          </p:cNvPr>
+          <p:cNvCxnSpPr>
+            <a:cxnSpLocks/>
+            <a:stCxn id="5" idx="2"/>
+            <a:endCxn id="7" idx="0"/>
+          </p:cNvCxnSpPr>
+          <p:nvPr/>
+        </p:nvCxnSpPr>
+        <p:spPr>
+          <a:xfrm>
+            <a:off x="3170709" y="1904688"/>
+            <a:ext cx="3920" cy="616132"/>
+          </a:xfrm>
+          <a:prstGeom prst="straightConnector1">
+            <a:avLst/>
+          </a:prstGeom>
+          <a:ln>
+            <a:tailEnd type="triangle"/>
+          </a:ln>
+        </p:spPr>
+        <p:style>
+          <a:lnRef idx="3">
+            <a:schemeClr val="dk1"/>
+          </a:lnRef>
+          <a:fillRef idx="0">
+            <a:schemeClr val="dk1"/>
+          </a:fillRef>
+          <a:effectRef idx="2">
+            <a:schemeClr val="dk1"/>
+          </a:effectRef>
+          <a:fontRef idx="minor">
+            <a:schemeClr val="tx1"/>
+          </a:fontRef>
+        </p:style>
+      </p:cxnSp>
+      <p:cxnSp>
+        <p:nvCxnSpPr>
+          <p:cNvPr id="27" name="Straight Arrow Connector 26">
+            <a:extLst>
+              <a:ext uri="{FF2B5EF4-FFF2-40B4-BE49-F238E27FC236}">
+                <a16:creationId xmlns:a16="http://schemas.microsoft.com/office/drawing/2014/main" id="{BA5BB82E-C828-3452-084F-DEF6D3B2B53E}"/>
+              </a:ext>
+            </a:extLst>
+          </p:cNvPr>
+          <p:cNvCxnSpPr>
+            <a:cxnSpLocks/>
+            <a:stCxn id="7" idx="4"/>
+            <a:endCxn id="8" idx="0"/>
+          </p:cNvCxnSpPr>
+          <p:nvPr/>
+        </p:nvCxnSpPr>
+        <p:spPr>
+          <a:xfrm>
+            <a:off x="3174629" y="3239279"/>
+            <a:ext cx="0" cy="459279"/>
+          </a:xfrm>
+          <a:prstGeom prst="straightConnector1">
+            <a:avLst/>
+          </a:prstGeom>
+          <a:ln>
+            <a:tailEnd type="triangle"/>
+          </a:ln>
+        </p:spPr>
+        <p:style>
+          <a:lnRef idx="3">
+            <a:schemeClr val="dk1"/>
+          </a:lnRef>
+          <a:fillRef idx="0">
+            <a:schemeClr val="dk1"/>
+          </a:fillRef>
+          <a:effectRef idx="2">
+            <a:schemeClr val="dk1"/>
+          </a:effectRef>
+          <a:fontRef idx="minor">
+            <a:schemeClr val="tx1"/>
+          </a:fontRef>
+        </p:style>
+      </p:cxnSp>
+      <p:cxnSp>
+        <p:nvCxnSpPr>
+          <p:cNvPr id="30" name="Straight Arrow Connector 29">
+            <a:extLst>
+              <a:ext uri="{FF2B5EF4-FFF2-40B4-BE49-F238E27FC236}">
+                <a16:creationId xmlns:a16="http://schemas.microsoft.com/office/drawing/2014/main" id="{4D9B11F8-EC81-6191-D87D-9EF752D7A51A}"/>
+              </a:ext>
+            </a:extLst>
+          </p:cNvPr>
+          <p:cNvCxnSpPr>
+            <a:cxnSpLocks/>
+            <a:stCxn id="8" idx="4"/>
+            <a:endCxn id="10" idx="0"/>
+          </p:cNvCxnSpPr>
+          <p:nvPr/>
+        </p:nvCxnSpPr>
+        <p:spPr>
+          <a:xfrm flipH="1">
+            <a:off x="3170708" y="4516087"/>
+            <a:ext cx="3921" cy="663272"/>
+          </a:xfrm>
+          <a:prstGeom prst="straightConnector1">
+            <a:avLst/>
+          </a:prstGeom>
+          <a:ln>
+            <a:tailEnd type="triangle"/>
+          </a:ln>
+        </p:spPr>
+        <p:style>
+          <a:lnRef idx="3">
+            <a:schemeClr val="dk1"/>
+          </a:lnRef>
+          <a:fillRef idx="0">
+            <a:schemeClr val="dk1"/>
+          </a:fillRef>
+          <a:effectRef idx="2">
+            <a:schemeClr val="dk1"/>
+          </a:effectRef>
+          <a:fontRef idx="minor">
+            <a:schemeClr val="tx1"/>
+          </a:fontRef>
+        </p:style>
+      </p:cxnSp>
+      <p:sp>
+        <p:nvSpPr>
+          <p:cNvPr id="33" name="TextBox 32">
+            <a:extLst>
+              <a:ext uri="{FF2B5EF4-FFF2-40B4-BE49-F238E27FC236}">
+                <a16:creationId xmlns:a16="http://schemas.microsoft.com/office/drawing/2014/main" id="{A5534606-8CF7-231E-BEB8-DA9A882E0DCB}"/>
+              </a:ext>
+            </a:extLst>
+          </p:cNvPr>
+          <p:cNvSpPr txBox="1"/>
+          <p:nvPr/>
+        </p:nvSpPr>
+        <p:spPr>
+          <a:xfrm>
+            <a:off x="6594954" y="1961847"/>
+            <a:ext cx="742511" cy="369332"/>
+          </a:xfrm>
+          <a:prstGeom prst="rect">
+            <a:avLst/>
+          </a:prstGeom>
+          <a:noFill/>
+        </p:spPr>
+        <p:txBody>
+          <a:bodyPr wrap="none" rtlCol="0">
+            <a:spAutoFit/>
+          </a:bodyPr>
+          <a:lstStyle/>
+          <a:p>
+            <a:r>
+              <a:rPr lang="en-PH" b="1" dirty="0"/>
+              <a:t>stop()</a:t>
+            </a:r>
+          </a:p>
+        </p:txBody>
+      </p:sp>
+      <p:sp>
+        <p:nvSpPr>
+          <p:cNvPr id="35" name="TextBox 34">
+            <a:extLst>
+              <a:ext uri="{FF2B5EF4-FFF2-40B4-BE49-F238E27FC236}">
+                <a16:creationId xmlns:a16="http://schemas.microsoft.com/office/drawing/2014/main" id="{765DE7DD-29D7-A767-3E63-267E9AB116F5}"/>
+              </a:ext>
+            </a:extLst>
+          </p:cNvPr>
+          <p:cNvSpPr txBox="1"/>
+          <p:nvPr/>
+        </p:nvSpPr>
+        <p:spPr>
+          <a:xfrm>
+            <a:off x="5852443" y="2790110"/>
+            <a:ext cx="742511" cy="369332"/>
+          </a:xfrm>
+          <a:prstGeom prst="rect">
+            <a:avLst/>
+          </a:prstGeom>
+          <a:noFill/>
+        </p:spPr>
+        <p:txBody>
+          <a:bodyPr wrap="none" rtlCol="0">
+            <a:spAutoFit/>
+          </a:bodyPr>
+          <a:lstStyle/>
+          <a:p>
+            <a:r>
+              <a:rPr lang="en-PH" b="1" dirty="0"/>
+              <a:t>stop()</a:t>
+            </a:r>
+          </a:p>
+        </p:txBody>
+      </p:sp>
+      <p:sp>
+        <p:nvSpPr>
+          <p:cNvPr id="36" name="TextBox 35">
+            <a:extLst>
+              <a:ext uri="{FF2B5EF4-FFF2-40B4-BE49-F238E27FC236}">
+                <a16:creationId xmlns:a16="http://schemas.microsoft.com/office/drawing/2014/main" id="{43D148DD-C26E-01E3-696A-96C359685AD0}"/>
+              </a:ext>
+            </a:extLst>
+          </p:cNvPr>
+          <p:cNvSpPr txBox="1"/>
+          <p:nvPr/>
+        </p:nvSpPr>
+        <p:spPr>
+          <a:xfrm>
+            <a:off x="5363045" y="3903354"/>
+            <a:ext cx="1776961" cy="369332"/>
+          </a:xfrm>
+          <a:prstGeom prst="rect">
+            <a:avLst/>
+          </a:prstGeom>
+          <a:noFill/>
+        </p:spPr>
+        <p:txBody>
+          <a:bodyPr wrap="none" rtlCol="0">
+            <a:spAutoFit/>
+          </a:bodyPr>
+          <a:lstStyle/>
+          <a:p>
+            <a:r>
+              <a:rPr lang="en-PH" b="1" dirty="0"/>
+              <a:t>End of execution</a:t>
+            </a:r>
+          </a:p>
+        </p:txBody>
+      </p:sp>
+      <p:sp>
+        <p:nvSpPr>
+          <p:cNvPr id="37" name="TextBox 36">
+            <a:extLst>
+              <a:ext uri="{FF2B5EF4-FFF2-40B4-BE49-F238E27FC236}">
+                <a16:creationId xmlns:a16="http://schemas.microsoft.com/office/drawing/2014/main" id="{4D5969A6-B9D4-457C-BD46-B84ED8D117BF}"/>
+              </a:ext>
+            </a:extLst>
+          </p:cNvPr>
+          <p:cNvSpPr txBox="1"/>
+          <p:nvPr/>
+        </p:nvSpPr>
+        <p:spPr>
+          <a:xfrm>
+            <a:off x="6594954" y="4693879"/>
+            <a:ext cx="742511" cy="369332"/>
+          </a:xfrm>
+          <a:prstGeom prst="rect">
+            <a:avLst/>
+          </a:prstGeom>
+          <a:noFill/>
+        </p:spPr>
+        <p:txBody>
+          <a:bodyPr wrap="none" rtlCol="0">
+            <a:spAutoFit/>
+          </a:bodyPr>
+          <a:lstStyle/>
+          <a:p>
+            <a:r>
+              <a:rPr lang="en-PH" b="1" dirty="0"/>
+              <a:t>stop()</a:t>
+            </a:r>
+          </a:p>
+        </p:txBody>
+      </p:sp>
+      <p:sp>
+        <p:nvSpPr>
+          <p:cNvPr id="70" name="TextBox 69">
+            <a:extLst>
+              <a:ext uri="{FF2B5EF4-FFF2-40B4-BE49-F238E27FC236}">
+                <a16:creationId xmlns:a16="http://schemas.microsoft.com/office/drawing/2014/main" id="{93EFEF4A-E07A-0B8D-C96B-E6C30F4A56D6}"/>
+              </a:ext>
+            </a:extLst>
+          </p:cNvPr>
+          <p:cNvSpPr txBox="1"/>
+          <p:nvPr/>
+        </p:nvSpPr>
+        <p:spPr>
+          <a:xfrm>
+            <a:off x="3194709" y="1987058"/>
+            <a:ext cx="771365" cy="369332"/>
+          </a:xfrm>
+          <a:prstGeom prst="rect">
+            <a:avLst/>
+          </a:prstGeom>
+          <a:noFill/>
+        </p:spPr>
+        <p:txBody>
+          <a:bodyPr wrap="none" rtlCol="0">
+            <a:spAutoFit/>
+          </a:bodyPr>
+          <a:lstStyle/>
+          <a:p>
+            <a:r>
+              <a:rPr lang="en-PH" b="1" dirty="0"/>
+              <a:t>start()</a:t>
+            </a:r>
+          </a:p>
+        </p:txBody>
+      </p:sp>
+      <p:sp>
+        <p:nvSpPr>
+          <p:cNvPr id="71" name="TextBox 70">
+            <a:extLst>
+              <a:ext uri="{FF2B5EF4-FFF2-40B4-BE49-F238E27FC236}">
+                <a16:creationId xmlns:a16="http://schemas.microsoft.com/office/drawing/2014/main" id="{2F53052E-B318-6452-122B-60ECC0AD24C1}"/>
+              </a:ext>
+            </a:extLst>
+          </p:cNvPr>
+          <p:cNvSpPr txBox="1"/>
+          <p:nvPr/>
+        </p:nvSpPr>
+        <p:spPr>
+          <a:xfrm>
+            <a:off x="3170708" y="3255517"/>
+            <a:ext cx="657552" cy="369332"/>
+          </a:xfrm>
+          <a:prstGeom prst="rect">
+            <a:avLst/>
+          </a:prstGeom>
+          <a:noFill/>
+        </p:spPr>
+        <p:txBody>
+          <a:bodyPr wrap="none" rtlCol="0">
+            <a:spAutoFit/>
+          </a:bodyPr>
+          <a:lstStyle/>
+          <a:p>
+            <a:r>
+              <a:rPr lang="en-PH" b="1" dirty="0"/>
+              <a:t>run()</a:t>
+            </a:r>
+          </a:p>
+        </p:txBody>
+      </p:sp>
+      <p:sp>
+        <p:nvSpPr>
+          <p:cNvPr id="72" name="TextBox 71">
+            <a:extLst>
+              <a:ext uri="{FF2B5EF4-FFF2-40B4-BE49-F238E27FC236}">
+                <a16:creationId xmlns:a16="http://schemas.microsoft.com/office/drawing/2014/main" id="{94164C64-14D9-D5EC-825F-87C2593F7284}"/>
+              </a:ext>
+            </a:extLst>
+          </p:cNvPr>
+          <p:cNvSpPr txBox="1"/>
+          <p:nvPr/>
+        </p:nvSpPr>
+        <p:spPr>
+          <a:xfrm>
+            <a:off x="3170708" y="4609731"/>
+            <a:ext cx="830677" cy="369332"/>
+          </a:xfrm>
+          <a:prstGeom prst="rect">
+            <a:avLst/>
+          </a:prstGeom>
+          <a:noFill/>
+        </p:spPr>
+        <p:txBody>
+          <a:bodyPr wrap="none" rtlCol="0">
+            <a:spAutoFit/>
+          </a:bodyPr>
+          <a:lstStyle/>
+          <a:p>
+            <a:r>
+              <a:rPr lang="en-PH" b="1" dirty="0"/>
+              <a:t>sleep()</a:t>
+            </a:r>
+          </a:p>
+        </p:txBody>
+      </p:sp>
+    </p:spTree>
+    <p:extLst>
+      <p:ext uri="{BB962C8B-B14F-4D97-AF65-F5344CB8AC3E}">
+        <p14:creationId xmlns:p14="http://schemas.microsoft.com/office/powerpoint/2010/main" val="4199068472"/>
+      </p:ext>
+    </p:extLst>
+  </p:cSld>
+  <p:clrMapOvr>
+    <a:masterClrMapping/>
+  </p:clrMapOvr>
+</p:sld>
+</file>
+
+<file path=ppt/slides/slide12.xml><?xml version="1.0" encoding="utf-8"?>
+<p:sld xmlns:a="http://schemas.openxmlformats.org/drawingml/2006/main" xmlns:r="http://schemas.openxmlformats.org/officeDocument/2006/relationships" xmlns:p="http://schemas.openxmlformats.org/presentationml/2006/main">
+  <p:cSld>
+    <p:bg>
+      <p:bgPr>
+        <a:blipFill dpi="0" rotWithShape="1">
+          <a:blip r:embed="rId3">
+            <a:alphaModFix amt="99000"/>
+            <a:lum/>
+          </a:blip>
+          <a:srcRect/>
+          <a:stretch>
+            <a:fillRect t="89000" r="85000" b="-1000"/>
+          </a:stretch>
+        </a:blipFill>
+        <a:effectLst/>
+      </p:bgPr>
+    </p:bg>
+    <p:spTree>
+      <p:nvGrpSpPr>
+        <p:cNvPr id="1" name=""/>
+        <p:cNvGrpSpPr/>
+        <p:nvPr/>
+      </p:nvGrpSpPr>
+      <p:grpSpPr>
+        <a:xfrm>
+          <a:off x="0" y="0"/>
+          <a:ext cx="0" cy="0"/>
+          <a:chOff x="0" y="0"/>
+          <a:chExt cx="0" cy="0"/>
+        </a:xfrm>
+      </p:grpSpPr>
+      <p:sp>
+        <p:nvSpPr>
+          <p:cNvPr id="2" name="Title 1">
+            <a:extLst>
+              <a:ext uri="{FF2B5EF4-FFF2-40B4-BE49-F238E27FC236}">
+                <a16:creationId xmlns:a16="http://schemas.microsoft.com/office/drawing/2014/main" id="{6A3DCE86-C2BA-4713-9E7A-73589E8D6CCF}"/>
+              </a:ext>
+            </a:extLst>
+          </p:cNvPr>
+          <p:cNvSpPr>
+            <a:spLocks noGrp="1"/>
+          </p:cNvSpPr>
+          <p:nvPr>
+            <p:ph type="ctrTitle"/>
+          </p:nvPr>
+        </p:nvSpPr>
+        <p:spPr>
+          <a:xfrm>
+            <a:off x="1524000" y="497150"/>
+            <a:ext cx="9144000" cy="718459"/>
+          </a:xfrm>
+        </p:spPr>
+        <p:txBody>
+          <a:bodyPr>
+            <a:normAutofit fontScale="90000"/>
+          </a:bodyPr>
+          <a:lstStyle/>
+          <a:p>
+            <a:r>
+              <a:rPr lang="en-PH" b="1" dirty="0"/>
+              <a:t>Thread Lifecycle</a:t>
+            </a:r>
+          </a:p>
+        </p:txBody>
+      </p:sp>
+      <p:sp>
+        <p:nvSpPr>
+          <p:cNvPr id="4" name="Footer Placeholder 3">
+            <a:extLst>
+              <a:ext uri="{FF2B5EF4-FFF2-40B4-BE49-F238E27FC236}">
+                <a16:creationId xmlns:a16="http://schemas.microsoft.com/office/drawing/2014/main" id="{638E7DE1-45EE-476A-A474-0F3C264AEDA3}"/>
+              </a:ext>
+            </a:extLst>
+          </p:cNvPr>
+          <p:cNvSpPr>
+            <a:spLocks noGrp="1"/>
+          </p:cNvSpPr>
+          <p:nvPr>
+            <p:ph type="ftr" sz="quarter" idx="11"/>
+          </p:nvPr>
+        </p:nvSpPr>
+        <p:spPr>
+          <a:xfrm>
+            <a:off x="0" y="6139541"/>
+            <a:ext cx="12192000" cy="718459"/>
+          </a:xfrm>
+          <a:ln w="28575">
+            <a:solidFill>
+              <a:schemeClr val="accent5">
+                <a:lumMod val="50000"/>
+              </a:schemeClr>
+            </a:solidFill>
+          </a:ln>
+        </p:spPr>
+        <p:txBody>
+          <a:bodyPr/>
+          <a:lstStyle/>
+          <a:p>
+            <a:pPr algn="r"/>
+            <a:r>
+              <a:rPr lang="en-PH" b="1">
+                <a:solidFill>
+                  <a:schemeClr val="tx1"/>
+                </a:solidFill>
+              </a:rPr>
+              <a:t>CCPRGG2L</a:t>
+            </a:r>
+            <a:endParaRPr lang="en-PH" dirty="0"/>
+          </a:p>
+        </p:txBody>
+      </p:sp>
+      <p:sp>
+        <p:nvSpPr>
+          <p:cNvPr id="3" name="TextBox 2">
+            <a:extLst>
+              <a:ext uri="{FF2B5EF4-FFF2-40B4-BE49-F238E27FC236}">
+                <a16:creationId xmlns:a16="http://schemas.microsoft.com/office/drawing/2014/main" id="{3585BB4D-48BF-F4D5-0836-77023A1B410A}"/>
+              </a:ext>
+            </a:extLst>
+          </p:cNvPr>
+          <p:cNvSpPr txBox="1"/>
+          <p:nvPr/>
+        </p:nvSpPr>
+        <p:spPr>
+          <a:xfrm>
+            <a:off x="1524000" y="1266869"/>
+            <a:ext cx="9144000" cy="5478423"/>
+          </a:xfrm>
+          <a:prstGeom prst="rect">
+            <a:avLst/>
+          </a:prstGeom>
+          <a:noFill/>
+        </p:spPr>
+        <p:txBody>
+          <a:bodyPr wrap="square" rtlCol="0">
+            <a:spAutoFit/>
+          </a:bodyPr>
+          <a:lstStyle/>
+          <a:p>
+            <a:pPr marL="342900" indent="-342900" algn="l">
+              <a:buFont typeface="Wingdings" panose="05000000000000000000" pitchFamily="2" charset="2"/>
+              <a:buChar char="q"/>
+            </a:pPr>
+            <a:r>
+              <a:rPr lang="en-US" sz="2500" b="1" dirty="0"/>
+              <a:t>New State</a:t>
+            </a:r>
+            <a:r>
+              <a:rPr lang="en-US" sz="2500" dirty="0"/>
+              <a:t>. As we use the Thread class to construct a thread entity, the thread is born and is defined as being in the New state. </a:t>
+            </a:r>
+          </a:p>
+          <a:p>
+            <a:pPr marL="342900" indent="-342900" algn="l">
+              <a:buFont typeface="Wingdings" panose="05000000000000000000" pitchFamily="2" charset="2"/>
+              <a:buChar char="q"/>
+            </a:pPr>
+            <a:endParaRPr lang="en-US" sz="2500" dirty="0"/>
+          </a:p>
+          <a:p>
+            <a:pPr marL="342900" indent="-342900" algn="l">
+              <a:buFont typeface="Wingdings" panose="05000000000000000000" pitchFamily="2" charset="2"/>
+              <a:buChar char="q"/>
+            </a:pPr>
+            <a:r>
+              <a:rPr lang="en-US" sz="2500" b="1" dirty="0"/>
+              <a:t>Runnable State</a:t>
+            </a:r>
+            <a:r>
+              <a:rPr lang="en-US" sz="2500" dirty="0"/>
+              <a:t>. A thread in the runnable state is prepared to execute the code. When a new thread's start() function is called, it enters a runnable state.</a:t>
+            </a:r>
+          </a:p>
+          <a:p>
+            <a:pPr marL="342900" indent="-342900" algn="l">
+              <a:buFont typeface="Wingdings" panose="05000000000000000000" pitchFamily="2" charset="2"/>
+              <a:buChar char="q"/>
+            </a:pPr>
+            <a:endParaRPr lang="en-US" sz="2500" dirty="0"/>
+          </a:p>
+          <a:p>
+            <a:pPr marL="342900" indent="-342900" algn="l">
+              <a:buFont typeface="Wingdings" panose="05000000000000000000" pitchFamily="2" charset="2"/>
+              <a:buChar char="q"/>
+            </a:pPr>
+            <a:r>
+              <a:rPr lang="en-US" sz="2500" b="1" dirty="0"/>
+              <a:t>Running State</a:t>
+            </a:r>
+            <a:r>
+              <a:rPr lang="en-US" sz="2500" dirty="0"/>
+              <a:t>. Running implies that the processor (CPU) has assigned a time slot to the thread for execution. When a thread from the runnable state is chosen for execution by the thread scheduler, it joins the running state.</a:t>
+            </a:r>
+          </a:p>
+          <a:p>
+            <a:pPr marL="342900" indent="-342900" algn="l">
+              <a:buFont typeface="Wingdings" panose="05000000000000000000" pitchFamily="2" charset="2"/>
+              <a:buChar char="q"/>
+            </a:pPr>
+            <a:endParaRPr lang="en-US" sz="2500" dirty="0"/>
+          </a:p>
+          <a:p>
+            <a:pPr marL="342900" indent="-342900" algn="l">
+              <a:buFont typeface="Wingdings" panose="05000000000000000000" pitchFamily="2" charset="2"/>
+              <a:buChar char="q"/>
+            </a:pPr>
+            <a:endParaRPr lang="en-US" sz="2500" dirty="0"/>
+          </a:p>
+          <a:p>
+            <a:pPr algn="l"/>
+            <a:endParaRPr lang="en-US" sz="2500" dirty="0"/>
+          </a:p>
+        </p:txBody>
+      </p:sp>
+    </p:spTree>
+    <p:extLst>
+      <p:ext uri="{BB962C8B-B14F-4D97-AF65-F5344CB8AC3E}">
+        <p14:creationId xmlns:p14="http://schemas.microsoft.com/office/powerpoint/2010/main" val="2413565988"/>
+      </p:ext>
+    </p:extLst>
+  </p:cSld>
+  <p:clrMapOvr>
+    <a:masterClrMapping/>
+  </p:clrMapOvr>
+</p:sld>
+</file>
+
+<file path=ppt/slides/slide13.xml><?xml version="1.0" encoding="utf-8"?>
+<p:sld xmlns:a="http://schemas.openxmlformats.org/drawingml/2006/main" xmlns:r="http://schemas.openxmlformats.org/officeDocument/2006/relationships" xmlns:p="http://schemas.openxmlformats.org/presentationml/2006/main">
+  <p:cSld>
+    <p:bg>
+      <p:bgPr>
+        <a:blipFill dpi="0" rotWithShape="1">
+          <a:blip r:embed="rId3">
+            <a:alphaModFix amt="99000"/>
+            <a:lum/>
+          </a:blip>
+          <a:srcRect/>
+          <a:stretch>
+            <a:fillRect t="89000" r="85000" b="-1000"/>
+          </a:stretch>
+        </a:blipFill>
+        <a:effectLst/>
+      </p:bgPr>
+    </p:bg>
+    <p:spTree>
+      <p:nvGrpSpPr>
+        <p:cNvPr id="1" name=""/>
+        <p:cNvGrpSpPr/>
+        <p:nvPr/>
+      </p:nvGrpSpPr>
+      <p:grpSpPr>
+        <a:xfrm>
+          <a:off x="0" y="0"/>
+          <a:ext cx="0" cy="0"/>
+          <a:chOff x="0" y="0"/>
+          <a:chExt cx="0" cy="0"/>
+        </a:xfrm>
+      </p:grpSpPr>
+      <p:sp>
+        <p:nvSpPr>
+          <p:cNvPr id="2" name="Title 1">
+            <a:extLst>
+              <a:ext uri="{FF2B5EF4-FFF2-40B4-BE49-F238E27FC236}">
+                <a16:creationId xmlns:a16="http://schemas.microsoft.com/office/drawing/2014/main" id="{6A3DCE86-C2BA-4713-9E7A-73589E8D6CCF}"/>
+              </a:ext>
+            </a:extLst>
+          </p:cNvPr>
+          <p:cNvSpPr>
+            <a:spLocks noGrp="1"/>
+          </p:cNvSpPr>
+          <p:nvPr>
+            <p:ph type="ctrTitle"/>
+          </p:nvPr>
+        </p:nvSpPr>
+        <p:spPr>
+          <a:xfrm>
+            <a:off x="1524000" y="497150"/>
+            <a:ext cx="9144000" cy="718459"/>
+          </a:xfrm>
+        </p:spPr>
+        <p:txBody>
+          <a:bodyPr>
+            <a:normAutofit fontScale="90000"/>
+          </a:bodyPr>
+          <a:lstStyle/>
+          <a:p>
+            <a:r>
+              <a:rPr lang="en-PH" b="1" dirty="0"/>
+              <a:t>Thread Lifecycle</a:t>
+            </a:r>
+          </a:p>
+        </p:txBody>
+      </p:sp>
+      <p:sp>
+        <p:nvSpPr>
+          <p:cNvPr id="4" name="Footer Placeholder 3">
+            <a:extLst>
+              <a:ext uri="{FF2B5EF4-FFF2-40B4-BE49-F238E27FC236}">
+                <a16:creationId xmlns:a16="http://schemas.microsoft.com/office/drawing/2014/main" id="{638E7DE1-45EE-476A-A474-0F3C264AEDA3}"/>
+              </a:ext>
+            </a:extLst>
+          </p:cNvPr>
+          <p:cNvSpPr>
+            <a:spLocks noGrp="1"/>
+          </p:cNvSpPr>
+          <p:nvPr>
+            <p:ph type="ftr" sz="quarter" idx="11"/>
+          </p:nvPr>
+        </p:nvSpPr>
+        <p:spPr>
+          <a:xfrm>
+            <a:off x="0" y="6139541"/>
+            <a:ext cx="12192000" cy="718459"/>
+          </a:xfrm>
+          <a:ln w="28575">
+            <a:solidFill>
+              <a:schemeClr val="accent5">
+                <a:lumMod val="50000"/>
+              </a:schemeClr>
+            </a:solidFill>
+          </a:ln>
+        </p:spPr>
+        <p:txBody>
+          <a:bodyPr/>
+          <a:lstStyle/>
+          <a:p>
+            <a:pPr algn="r"/>
+            <a:r>
+              <a:rPr lang="en-PH" b="1">
+                <a:solidFill>
+                  <a:schemeClr val="tx1"/>
+                </a:solidFill>
+              </a:rPr>
+              <a:t>CCPRGG2L</a:t>
+            </a:r>
+            <a:endParaRPr lang="en-PH" dirty="0"/>
+          </a:p>
+        </p:txBody>
+      </p:sp>
+      <p:sp>
+        <p:nvSpPr>
           <p:cNvPr id="3" name="TextBox 2">
             <a:extLst>
               <a:ext uri="{FF2B5EF4-FFF2-40B4-BE49-F238E27FC236}">
@@ -5687,7 +7376,7 @@
 </p:sld>
 </file>
 
-<file path=ppt/slides/slide12.xml><?xml version="1.0" encoding="utf-8"?>
+<file path=ppt/slides/slide14.xml><?xml version="1.0" encoding="utf-8"?>
 <p:sld xmlns:a="http://schemas.openxmlformats.org/drawingml/2006/main" xmlns:r="http://schemas.openxmlformats.org/officeDocument/2006/relationships" xmlns:p="http://schemas.openxmlformats.org/presentationml/2006/main">
   <p:cSld>
     <p:bg>
@@ -6218,7 +7907,7 @@
 </p:sld>
 </file>
 
-<file path=ppt/slides/slide13.xml><?xml version="1.0" encoding="utf-8"?>
+<file path=ppt/slides/slide15.xml><?xml version="1.0" encoding="utf-8"?>
 <p:sld xmlns:a="http://schemas.openxmlformats.org/drawingml/2006/main" xmlns:r="http://schemas.openxmlformats.org/officeDocument/2006/relationships" xmlns:p="http://schemas.openxmlformats.org/presentationml/2006/main">
   <p:cSld>
     <p:bg>
@@ -6739,7 +8428,7 @@
 </p:sld>
 </file>
 
-<file path=ppt/slides/slide14.xml><?xml version="1.0" encoding="utf-8"?>
+<file path=ppt/slides/slide16.xml><?xml version="1.0" encoding="utf-8"?>
 <p:sld xmlns:a="http://schemas.openxmlformats.org/drawingml/2006/main" xmlns:r="http://schemas.openxmlformats.org/officeDocument/2006/relationships" xmlns:p="http://schemas.openxmlformats.org/presentationml/2006/main">
   <p:cSld>
     <p:bg>
@@ -7781,7 +9470,7 @@
           <a:p>
             <a:r>
               <a:rPr lang="en-PH" b="1" dirty="0"/>
-              <a:t>Creating a thread</a:t>
+              <a:t>Real world use cases</a:t>
             </a:r>
           </a:p>
         </p:txBody>
@@ -7832,6 +9521,400 @@
           </a:p>
         </p:txBody>
       </p:sp>
+      <p:pic>
+        <p:nvPicPr>
+          <p:cNvPr id="6" name="Picture 5" descr="A group of laptops&#10;&#10;Description automatically generated with low confidence">
+            <a:extLst>
+              <a:ext uri="{FF2B5EF4-FFF2-40B4-BE49-F238E27FC236}">
+                <a16:creationId xmlns:a16="http://schemas.microsoft.com/office/drawing/2014/main" id="{34AD1597-B37E-D8A8-D1C3-F56690D38E9C}"/>
+              </a:ext>
+            </a:extLst>
+          </p:cNvPr>
+          <p:cNvPicPr>
+            <a:picLocks noChangeAspect="1"/>
+          </p:cNvPicPr>
+          <p:nvPr/>
+        </p:nvPicPr>
+        <p:blipFill>
+          <a:blip r:embed="rId4">
+            <a:extLst>
+              <a:ext uri="{28A0092B-C50C-407E-A947-70E740481C1C}">
+                <a14:useLocalDpi xmlns:a14="http://schemas.microsoft.com/office/drawing/2010/main" val="0"/>
+              </a:ext>
+            </a:extLst>
+          </a:blip>
+          <a:stretch>
+            <a:fillRect/>
+          </a:stretch>
+        </p:blipFill>
+        <p:spPr>
+          <a:xfrm>
+            <a:off x="3952875" y="1733550"/>
+            <a:ext cx="4286250" cy="3390900"/>
+          </a:xfrm>
+          <a:prstGeom prst="rect">
+            <a:avLst/>
+          </a:prstGeom>
+        </p:spPr>
+      </p:pic>
+      <p:sp>
+        <p:nvSpPr>
+          <p:cNvPr id="7" name="TextBox 6">
+            <a:extLst>
+              <a:ext uri="{FF2B5EF4-FFF2-40B4-BE49-F238E27FC236}">
+                <a16:creationId xmlns:a16="http://schemas.microsoft.com/office/drawing/2014/main" id="{DA563CF6-5B98-1816-C65D-2BA4BF0A37F1}"/>
+              </a:ext>
+            </a:extLst>
+          </p:cNvPr>
+          <p:cNvSpPr txBox="1"/>
+          <p:nvPr/>
+        </p:nvSpPr>
+        <p:spPr>
+          <a:xfrm>
+            <a:off x="2530258" y="5511452"/>
+            <a:ext cx="7133572" cy="369332"/>
+          </a:xfrm>
+          <a:prstGeom prst="rect">
+            <a:avLst/>
+          </a:prstGeom>
+          <a:noFill/>
+        </p:spPr>
+        <p:txBody>
+          <a:bodyPr wrap="square" rtlCol="0">
+            <a:spAutoFit/>
+          </a:bodyPr>
+          <a:lstStyle/>
+          <a:p>
+            <a:r>
+              <a:rPr lang="en-PH" b="1" dirty="0"/>
+              <a:t>Server handling multiple requests from different clients simultaneously</a:t>
+            </a:r>
+          </a:p>
+        </p:txBody>
+      </p:sp>
+    </p:spTree>
+    <p:extLst>
+      <p:ext uri="{BB962C8B-B14F-4D97-AF65-F5344CB8AC3E}">
+        <p14:creationId xmlns:p14="http://schemas.microsoft.com/office/powerpoint/2010/main" val="3233970761"/>
+      </p:ext>
+    </p:extLst>
+  </p:cSld>
+  <p:clrMapOvr>
+    <a:masterClrMapping/>
+  </p:clrMapOvr>
+</p:sld>
+</file>
+
+<file path=ppt/slides/slide7.xml><?xml version="1.0" encoding="utf-8"?>
+<p:sld xmlns:a="http://schemas.openxmlformats.org/drawingml/2006/main" xmlns:r="http://schemas.openxmlformats.org/officeDocument/2006/relationships" xmlns:p="http://schemas.openxmlformats.org/presentationml/2006/main">
+  <p:cSld>
+    <p:bg>
+      <p:bgPr>
+        <a:blipFill dpi="0" rotWithShape="1">
+          <a:blip r:embed="rId3">
+            <a:alphaModFix amt="99000"/>
+            <a:lum/>
+          </a:blip>
+          <a:srcRect/>
+          <a:stretch>
+            <a:fillRect t="89000" r="85000" b="-1000"/>
+          </a:stretch>
+        </a:blipFill>
+        <a:effectLst/>
+      </p:bgPr>
+    </p:bg>
+    <p:spTree>
+      <p:nvGrpSpPr>
+        <p:cNvPr id="1" name=""/>
+        <p:cNvGrpSpPr/>
+        <p:nvPr/>
+      </p:nvGrpSpPr>
+      <p:grpSpPr>
+        <a:xfrm>
+          <a:off x="0" y="0"/>
+          <a:ext cx="0" cy="0"/>
+          <a:chOff x="0" y="0"/>
+          <a:chExt cx="0" cy="0"/>
+        </a:xfrm>
+      </p:grpSpPr>
+      <p:sp>
+        <p:nvSpPr>
+          <p:cNvPr id="2" name="Title 1">
+            <a:extLst>
+              <a:ext uri="{FF2B5EF4-FFF2-40B4-BE49-F238E27FC236}">
+                <a16:creationId xmlns:a16="http://schemas.microsoft.com/office/drawing/2014/main" id="{6A3DCE86-C2BA-4713-9E7A-73589E8D6CCF}"/>
+              </a:ext>
+            </a:extLst>
+          </p:cNvPr>
+          <p:cNvSpPr>
+            <a:spLocks noGrp="1"/>
+          </p:cNvSpPr>
+          <p:nvPr>
+            <p:ph type="ctrTitle"/>
+          </p:nvPr>
+        </p:nvSpPr>
+        <p:spPr>
+          <a:xfrm>
+            <a:off x="1524000" y="497150"/>
+            <a:ext cx="9144000" cy="718459"/>
+          </a:xfrm>
+        </p:spPr>
+        <p:txBody>
+          <a:bodyPr>
+            <a:normAutofit fontScale="90000"/>
+          </a:bodyPr>
+          <a:lstStyle/>
+          <a:p>
+            <a:r>
+              <a:rPr lang="en-PH" b="1" dirty="0"/>
+              <a:t>Real world use cases</a:t>
+            </a:r>
+          </a:p>
+        </p:txBody>
+      </p:sp>
+      <p:sp>
+        <p:nvSpPr>
+          <p:cNvPr id="4" name="Footer Placeholder 3">
+            <a:extLst>
+              <a:ext uri="{FF2B5EF4-FFF2-40B4-BE49-F238E27FC236}">
+                <a16:creationId xmlns:a16="http://schemas.microsoft.com/office/drawing/2014/main" id="{638E7DE1-45EE-476A-A474-0F3C264AEDA3}"/>
+              </a:ext>
+            </a:extLst>
+          </p:cNvPr>
+          <p:cNvSpPr>
+            <a:spLocks noGrp="1"/>
+          </p:cNvSpPr>
+          <p:nvPr>
+            <p:ph type="ftr" sz="quarter" idx="11"/>
+          </p:nvPr>
+        </p:nvSpPr>
+        <p:spPr>
+          <a:xfrm>
+            <a:off x="0" y="6139541"/>
+            <a:ext cx="12192000" cy="718459"/>
+          </a:xfrm>
+          <a:ln w="28575">
+            <a:solidFill>
+              <a:schemeClr val="accent5">
+                <a:lumMod val="50000"/>
+              </a:schemeClr>
+            </a:solidFill>
+          </a:ln>
+        </p:spPr>
+        <p:txBody>
+          <a:bodyPr/>
+          <a:lstStyle/>
+          <a:p>
+            <a:pPr algn="r"/>
+            <a:r>
+              <a:rPr lang="en-PH" b="1">
+                <a:solidFill>
+                  <a:schemeClr val="tx1"/>
+                </a:solidFill>
+              </a:rPr>
+              <a:t>CCPRGG2L</a:t>
+            </a:r>
+            <a:endParaRPr lang="en-PH" dirty="0"/>
+          </a:p>
+        </p:txBody>
+      </p:sp>
+      <p:pic>
+        <p:nvPicPr>
+          <p:cNvPr id="5" name="Picture 4" descr="A picture containing text, indoor&#10;&#10;Description automatically generated">
+            <a:extLst>
+              <a:ext uri="{FF2B5EF4-FFF2-40B4-BE49-F238E27FC236}">
+                <a16:creationId xmlns:a16="http://schemas.microsoft.com/office/drawing/2014/main" id="{9B4E88ED-D1EC-4867-E692-649DAA824AED}"/>
+              </a:ext>
+            </a:extLst>
+          </p:cNvPr>
+          <p:cNvPicPr>
+            <a:picLocks noChangeAspect="1"/>
+          </p:cNvPicPr>
+          <p:nvPr/>
+        </p:nvPicPr>
+        <p:blipFill>
+          <a:blip r:embed="rId4">
+            <a:extLst>
+              <a:ext uri="{28A0092B-C50C-407E-A947-70E740481C1C}">
+                <a14:useLocalDpi xmlns:a14="http://schemas.microsoft.com/office/drawing/2010/main" val="0"/>
+              </a:ext>
+            </a:extLst>
+          </a:blip>
+          <a:stretch>
+            <a:fillRect/>
+          </a:stretch>
+        </p:blipFill>
+        <p:spPr>
+          <a:xfrm>
+            <a:off x="3470560" y="1810199"/>
+            <a:ext cx="5250879" cy="2952301"/>
+          </a:xfrm>
+          <a:prstGeom prst="rect">
+            <a:avLst/>
+          </a:prstGeom>
+        </p:spPr>
+      </p:pic>
+      <p:sp>
+        <p:nvSpPr>
+          <p:cNvPr id="7" name="TextBox 6">
+            <a:extLst>
+              <a:ext uri="{FF2B5EF4-FFF2-40B4-BE49-F238E27FC236}">
+                <a16:creationId xmlns:a16="http://schemas.microsoft.com/office/drawing/2014/main" id="{FC80047E-32CF-DF1D-C819-EC654FC18F1B}"/>
+              </a:ext>
+            </a:extLst>
+          </p:cNvPr>
+          <p:cNvSpPr txBox="1"/>
+          <p:nvPr/>
+        </p:nvSpPr>
+        <p:spPr>
+          <a:xfrm>
+            <a:off x="4736141" y="5118563"/>
+            <a:ext cx="2719715" cy="477054"/>
+          </a:xfrm>
+          <a:prstGeom prst="rect">
+            <a:avLst/>
+          </a:prstGeom>
+          <a:noFill/>
+        </p:spPr>
+        <p:txBody>
+          <a:bodyPr wrap="square" rtlCol="0">
+            <a:spAutoFit/>
+          </a:bodyPr>
+          <a:lstStyle/>
+          <a:p>
+            <a:r>
+              <a:rPr lang="en-PH" sz="2500" b="1" dirty="0"/>
+              <a:t>Multiplayer games</a:t>
+            </a:r>
+          </a:p>
+        </p:txBody>
+      </p:sp>
+    </p:spTree>
+    <p:extLst>
+      <p:ext uri="{BB962C8B-B14F-4D97-AF65-F5344CB8AC3E}">
+        <p14:creationId xmlns:p14="http://schemas.microsoft.com/office/powerpoint/2010/main" val="1313570444"/>
+      </p:ext>
+    </p:extLst>
+  </p:cSld>
+  <p:clrMapOvr>
+    <a:masterClrMapping/>
+  </p:clrMapOvr>
+</p:sld>
+</file>
+
+<file path=ppt/slides/slide8.xml><?xml version="1.0" encoding="utf-8"?>
+<p:sld xmlns:a="http://schemas.openxmlformats.org/drawingml/2006/main" xmlns:r="http://schemas.openxmlformats.org/officeDocument/2006/relationships" xmlns:p="http://schemas.openxmlformats.org/presentationml/2006/main">
+  <p:cSld>
+    <p:bg>
+      <p:bgPr>
+        <a:blipFill dpi="0" rotWithShape="1">
+          <a:blip r:embed="rId3">
+            <a:alphaModFix amt="99000"/>
+            <a:lum/>
+          </a:blip>
+          <a:srcRect/>
+          <a:stretch>
+            <a:fillRect t="89000" r="85000" b="-1000"/>
+          </a:stretch>
+        </a:blipFill>
+        <a:effectLst/>
+      </p:bgPr>
+    </p:bg>
+    <p:spTree>
+      <p:nvGrpSpPr>
+        <p:cNvPr id="1" name=""/>
+        <p:cNvGrpSpPr/>
+        <p:nvPr/>
+      </p:nvGrpSpPr>
+      <p:grpSpPr>
+        <a:xfrm>
+          <a:off x="0" y="0"/>
+          <a:ext cx="0" cy="0"/>
+          <a:chOff x="0" y="0"/>
+          <a:chExt cx="0" cy="0"/>
+        </a:xfrm>
+      </p:grpSpPr>
+      <p:sp>
+        <p:nvSpPr>
+          <p:cNvPr id="2" name="Title 1">
+            <a:extLst>
+              <a:ext uri="{FF2B5EF4-FFF2-40B4-BE49-F238E27FC236}">
+                <a16:creationId xmlns:a16="http://schemas.microsoft.com/office/drawing/2014/main" id="{6A3DCE86-C2BA-4713-9E7A-73589E8D6CCF}"/>
+              </a:ext>
+            </a:extLst>
+          </p:cNvPr>
+          <p:cNvSpPr>
+            <a:spLocks noGrp="1"/>
+          </p:cNvSpPr>
+          <p:nvPr>
+            <p:ph type="ctrTitle"/>
+          </p:nvPr>
+        </p:nvSpPr>
+        <p:spPr>
+          <a:xfrm>
+            <a:off x="1524000" y="497150"/>
+            <a:ext cx="9144000" cy="718459"/>
+          </a:xfrm>
+        </p:spPr>
+        <p:txBody>
+          <a:bodyPr>
+            <a:normAutofit fontScale="90000"/>
+          </a:bodyPr>
+          <a:lstStyle/>
+          <a:p>
+            <a:r>
+              <a:rPr lang="en-PH" b="1" dirty="0"/>
+              <a:t>Creating a thread</a:t>
+            </a:r>
+          </a:p>
+        </p:txBody>
+      </p:sp>
+      <p:sp>
+        <p:nvSpPr>
+          <p:cNvPr id="4" name="Footer Placeholder 3">
+            <a:extLst>
+              <a:ext uri="{FF2B5EF4-FFF2-40B4-BE49-F238E27FC236}">
+                <a16:creationId xmlns:a16="http://schemas.microsoft.com/office/drawing/2014/main" id="{638E7DE1-45EE-476A-A474-0F3C264AEDA3}"/>
+              </a:ext>
+            </a:extLst>
+          </p:cNvPr>
+          <p:cNvSpPr>
+            <a:spLocks noGrp="1"/>
+          </p:cNvSpPr>
+          <p:nvPr>
+            <p:ph type="ftr" sz="quarter" idx="11"/>
+          </p:nvPr>
+        </p:nvSpPr>
+        <p:spPr>
+          <a:xfrm>
+            <a:off x="0" y="6139541"/>
+            <a:ext cx="12192000" cy="718459"/>
+          </a:xfrm>
+          <a:ln w="28575">
+            <a:solidFill>
+              <a:schemeClr val="accent5">
+                <a:lumMod val="50000"/>
+              </a:schemeClr>
+            </a:solidFill>
+          </a:ln>
+        </p:spPr>
+        <p:txBody>
+          <a:bodyPr/>
+          <a:lstStyle/>
+          <a:p>
+            <a:pPr algn="r"/>
+            <a:r>
+              <a:rPr lang="en-PH" b="1">
+                <a:solidFill>
+                  <a:schemeClr val="tx1"/>
+                </a:solidFill>
+              </a:rPr>
+              <a:t>CCPRGG2L</a:t>
+            </a:r>
+            <a:endParaRPr lang="en-PH" dirty="0"/>
+          </a:p>
+        </p:txBody>
+      </p:sp>
       <p:sp>
         <p:nvSpPr>
           <p:cNvPr id="3" name="TextBox 2">
@@ -7977,7 +10060,7 @@
 </p:sld>
 </file>
 
-<file path=ppt/slides/slide7.xml><?xml version="1.0" encoding="utf-8"?>
+<file path=ppt/slides/slide9.xml><?xml version="1.0" encoding="utf-8"?>
 <p:sld xmlns:a="http://schemas.openxmlformats.org/drawingml/2006/main" xmlns:r="http://schemas.openxmlformats.org/officeDocument/2006/relationships" xmlns:p="http://schemas.openxmlformats.org/presentationml/2006/main">
   <p:cSld>
     <p:bg>
@@ -8586,1525 +10669,6 @@
       <p:bldP spid="10" grpId="0"/>
     </p:bldLst>
   </p:timing>
-</p:sld>
-</file>
-
-<file path=ppt/slides/slide8.xml><?xml version="1.0" encoding="utf-8"?>
-<p:sld xmlns:a="http://schemas.openxmlformats.org/drawingml/2006/main" xmlns:r="http://schemas.openxmlformats.org/officeDocument/2006/relationships" xmlns:p="http://schemas.openxmlformats.org/presentationml/2006/main">
-  <p:cSld>
-    <p:bg>
-      <p:bgPr>
-        <a:blipFill dpi="0" rotWithShape="1">
-          <a:blip r:embed="rId3">
-            <a:alphaModFix amt="99000"/>
-            <a:lum/>
-          </a:blip>
-          <a:srcRect/>
-          <a:stretch>
-            <a:fillRect t="89000" r="85000" b="-1000"/>
-          </a:stretch>
-        </a:blipFill>
-        <a:effectLst/>
-      </p:bgPr>
-    </p:bg>
-    <p:spTree>
-      <p:nvGrpSpPr>
-        <p:cNvPr id="1" name=""/>
-        <p:cNvGrpSpPr/>
-        <p:nvPr/>
-      </p:nvGrpSpPr>
-      <p:grpSpPr>
-        <a:xfrm>
-          <a:off x="0" y="0"/>
-          <a:ext cx="0" cy="0"/>
-          <a:chOff x="0" y="0"/>
-          <a:chExt cx="0" cy="0"/>
-        </a:xfrm>
-      </p:grpSpPr>
-      <p:sp>
-        <p:nvSpPr>
-          <p:cNvPr id="2" name="Title 1">
-            <a:extLst>
-              <a:ext uri="{FF2B5EF4-FFF2-40B4-BE49-F238E27FC236}">
-                <a16:creationId xmlns:a16="http://schemas.microsoft.com/office/drawing/2014/main" id="{6A3DCE86-C2BA-4713-9E7A-73589E8D6CCF}"/>
-              </a:ext>
-            </a:extLst>
-          </p:cNvPr>
-          <p:cNvSpPr>
-            <a:spLocks noGrp="1"/>
-          </p:cNvSpPr>
-          <p:nvPr>
-            <p:ph type="ctrTitle"/>
-          </p:nvPr>
-        </p:nvSpPr>
-        <p:spPr>
-          <a:xfrm>
-            <a:off x="1524000" y="497150"/>
-            <a:ext cx="9144000" cy="718459"/>
-          </a:xfrm>
-        </p:spPr>
-        <p:txBody>
-          <a:bodyPr>
-            <a:noAutofit/>
-          </a:bodyPr>
-          <a:lstStyle/>
-          <a:p>
-            <a:r>
-              <a:rPr lang="en-PH" sz="5000" b="1" dirty="0"/>
-              <a:t>Implementing a Runnable Interface</a:t>
-            </a:r>
-          </a:p>
-        </p:txBody>
-      </p:sp>
-      <p:sp>
-        <p:nvSpPr>
-          <p:cNvPr id="4" name="Footer Placeholder 3">
-            <a:extLst>
-              <a:ext uri="{FF2B5EF4-FFF2-40B4-BE49-F238E27FC236}">
-                <a16:creationId xmlns:a16="http://schemas.microsoft.com/office/drawing/2014/main" id="{638E7DE1-45EE-476A-A474-0F3C264AEDA3}"/>
-              </a:ext>
-            </a:extLst>
-          </p:cNvPr>
-          <p:cNvSpPr>
-            <a:spLocks noGrp="1"/>
-          </p:cNvSpPr>
-          <p:nvPr>
-            <p:ph type="ftr" sz="quarter" idx="11"/>
-          </p:nvPr>
-        </p:nvSpPr>
-        <p:spPr>
-          <a:xfrm>
-            <a:off x="0" y="6139541"/>
-            <a:ext cx="12192000" cy="718459"/>
-          </a:xfrm>
-          <a:ln w="28575">
-            <a:solidFill>
-              <a:schemeClr val="accent5">
-                <a:lumMod val="50000"/>
-              </a:schemeClr>
-            </a:solidFill>
-          </a:ln>
-        </p:spPr>
-        <p:txBody>
-          <a:bodyPr/>
-          <a:lstStyle/>
-          <a:p>
-            <a:pPr algn="r"/>
-            <a:r>
-              <a:rPr lang="en-PH" b="1">
-                <a:solidFill>
-                  <a:schemeClr val="tx1"/>
-                </a:solidFill>
-              </a:rPr>
-              <a:t>CCPRGG2L</a:t>
-            </a:r>
-            <a:endParaRPr lang="en-PH" dirty="0"/>
-          </a:p>
-        </p:txBody>
-      </p:sp>
-      <p:sp>
-        <p:nvSpPr>
-          <p:cNvPr id="5" name="TextBox 4">
-            <a:extLst>
-              <a:ext uri="{FF2B5EF4-FFF2-40B4-BE49-F238E27FC236}">
-                <a16:creationId xmlns:a16="http://schemas.microsoft.com/office/drawing/2014/main" id="{F9AC5282-A147-49E6-959C-FAD202E26B2C}"/>
-              </a:ext>
-            </a:extLst>
-          </p:cNvPr>
-          <p:cNvSpPr txBox="1"/>
-          <p:nvPr/>
-        </p:nvSpPr>
-        <p:spPr>
-          <a:xfrm>
-            <a:off x="1523999" y="1647024"/>
-            <a:ext cx="7751524" cy="477054"/>
-          </a:xfrm>
-          <a:prstGeom prst="rect">
-            <a:avLst/>
-          </a:prstGeom>
-          <a:noFill/>
-        </p:spPr>
-        <p:txBody>
-          <a:bodyPr wrap="square" rtlCol="0">
-            <a:spAutoFit/>
-          </a:bodyPr>
-          <a:lstStyle/>
-          <a:p>
-            <a:r>
-              <a:rPr lang="en-PH" sz="2500" dirty="0">
-                <a:solidFill>
-                  <a:srgbClr val="7030A0"/>
-                </a:solidFill>
-                <a:latin typeface="Consolas" panose="020B0609020204030204" pitchFamily="49" charset="0"/>
-              </a:rPr>
-              <a:t>public class </a:t>
-            </a:r>
-            <a:r>
-              <a:rPr lang="en-PH" sz="2500" dirty="0" err="1">
-                <a:solidFill>
-                  <a:srgbClr val="0070C0"/>
-                </a:solidFill>
-                <a:latin typeface="Consolas" panose="020B0609020204030204" pitchFamily="49" charset="0"/>
-              </a:rPr>
-              <a:t>myThread</a:t>
-            </a:r>
-            <a:r>
-              <a:rPr lang="en-PH" sz="2500" dirty="0">
-                <a:solidFill>
-                  <a:srgbClr val="7030A0"/>
-                </a:solidFill>
-                <a:latin typeface="Consolas" panose="020B0609020204030204" pitchFamily="49" charset="0"/>
-              </a:rPr>
-              <a:t> implements </a:t>
-            </a:r>
-            <a:r>
-              <a:rPr lang="en-PH" sz="2500" dirty="0">
-                <a:solidFill>
-                  <a:srgbClr val="0070C0"/>
-                </a:solidFill>
-                <a:latin typeface="Consolas" panose="020B0609020204030204" pitchFamily="49" charset="0"/>
-              </a:rPr>
-              <a:t>Runnable </a:t>
-            </a:r>
-            <a:r>
-              <a:rPr lang="en-PH" sz="2500" dirty="0">
-                <a:latin typeface="Consolas" panose="020B0609020204030204" pitchFamily="49" charset="0"/>
-              </a:rPr>
-              <a:t>{</a:t>
-            </a:r>
-            <a:endParaRPr lang="en-PH" sz="2500" dirty="0"/>
-          </a:p>
-        </p:txBody>
-      </p:sp>
-      <p:sp>
-        <p:nvSpPr>
-          <p:cNvPr id="9" name="TextBox 8">
-            <a:extLst>
-              <a:ext uri="{FF2B5EF4-FFF2-40B4-BE49-F238E27FC236}">
-                <a16:creationId xmlns:a16="http://schemas.microsoft.com/office/drawing/2014/main" id="{323B4072-E162-690F-F474-35AF6637EA82}"/>
-              </a:ext>
-            </a:extLst>
-          </p:cNvPr>
-          <p:cNvSpPr txBox="1"/>
-          <p:nvPr/>
-        </p:nvSpPr>
-        <p:spPr>
-          <a:xfrm>
-            <a:off x="1523999" y="4198441"/>
-            <a:ext cx="375781" cy="477054"/>
-          </a:xfrm>
-          <a:prstGeom prst="rect">
-            <a:avLst/>
-          </a:prstGeom>
-          <a:noFill/>
-        </p:spPr>
-        <p:txBody>
-          <a:bodyPr wrap="square" rtlCol="0">
-            <a:spAutoFit/>
-          </a:bodyPr>
-          <a:lstStyle/>
-          <a:p>
-            <a:r>
-              <a:rPr lang="en-PH" sz="2500" dirty="0">
-                <a:latin typeface="Consolas" panose="020B0609020204030204" pitchFamily="49" charset="0"/>
-              </a:rPr>
-              <a:t>}</a:t>
-            </a:r>
-            <a:endParaRPr lang="en-PH" sz="2500" dirty="0"/>
-          </a:p>
-        </p:txBody>
-      </p:sp>
-      <p:sp>
-        <p:nvSpPr>
-          <p:cNvPr id="10" name="TextBox 9">
-            <a:extLst>
-              <a:ext uri="{FF2B5EF4-FFF2-40B4-BE49-F238E27FC236}">
-                <a16:creationId xmlns:a16="http://schemas.microsoft.com/office/drawing/2014/main" id="{4D0F0BAC-48BC-12D7-4628-028A500146AF}"/>
-              </a:ext>
-            </a:extLst>
-          </p:cNvPr>
-          <p:cNvSpPr txBox="1"/>
-          <p:nvPr/>
-        </p:nvSpPr>
-        <p:spPr>
-          <a:xfrm>
-            <a:off x="1899781" y="2421032"/>
-            <a:ext cx="8240038" cy="2015936"/>
-          </a:xfrm>
-          <a:prstGeom prst="rect">
-            <a:avLst/>
-          </a:prstGeom>
-          <a:noFill/>
-        </p:spPr>
-        <p:txBody>
-          <a:bodyPr wrap="square" rtlCol="0">
-            <a:spAutoFit/>
-          </a:bodyPr>
-          <a:lstStyle/>
-          <a:p>
-            <a:r>
-              <a:rPr lang="en-PH" sz="2500" dirty="0">
-                <a:solidFill>
-                  <a:srgbClr val="7030A0"/>
-                </a:solidFill>
-                <a:latin typeface="Consolas" panose="020B0609020204030204" pitchFamily="49" charset="0"/>
-              </a:rPr>
-              <a:t>public</a:t>
-            </a:r>
-            <a:r>
-              <a:rPr lang="en-PH" sz="2500" dirty="0">
-                <a:latin typeface="Consolas" panose="020B0609020204030204" pitchFamily="49" charset="0"/>
-              </a:rPr>
-              <a:t> </a:t>
-            </a:r>
-            <a:r>
-              <a:rPr lang="en-PH" sz="2500" dirty="0">
-                <a:solidFill>
-                  <a:srgbClr val="00B0F0"/>
-                </a:solidFill>
-                <a:latin typeface="Consolas" panose="020B0609020204030204" pitchFamily="49" charset="0"/>
-              </a:rPr>
-              <a:t>void </a:t>
-            </a:r>
-            <a:r>
-              <a:rPr lang="en-PH" sz="2500" dirty="0">
-                <a:solidFill>
-                  <a:srgbClr val="0070C0"/>
-                </a:solidFill>
-                <a:latin typeface="Consolas" panose="020B0609020204030204" pitchFamily="49" charset="0"/>
-              </a:rPr>
-              <a:t>run</a:t>
-            </a:r>
-            <a:r>
-              <a:rPr lang="en-PH" sz="2500" dirty="0">
-                <a:latin typeface="Consolas" panose="020B0609020204030204" pitchFamily="49" charset="0"/>
-              </a:rPr>
-              <a:t>() {</a:t>
-            </a:r>
-          </a:p>
-          <a:p>
-            <a:endParaRPr lang="en-PH" sz="2500" dirty="0">
-              <a:latin typeface="Consolas" panose="020B0609020204030204" pitchFamily="49" charset="0"/>
-            </a:endParaRPr>
-          </a:p>
-          <a:p>
-            <a:r>
-              <a:rPr lang="en-PH" sz="2500" dirty="0">
-                <a:latin typeface="Consolas" panose="020B0609020204030204" pitchFamily="49" charset="0"/>
-              </a:rPr>
-              <a:t>	</a:t>
-            </a:r>
-            <a:r>
-              <a:rPr lang="en-PH" sz="2500" dirty="0" err="1">
-                <a:latin typeface="Consolas" panose="020B0609020204030204" pitchFamily="49" charset="0"/>
-              </a:rPr>
-              <a:t>System.out.println</a:t>
-            </a:r>
-            <a:r>
-              <a:rPr lang="en-PH" sz="2500" dirty="0">
-                <a:latin typeface="Consolas" panose="020B0609020204030204" pitchFamily="49" charset="0"/>
-              </a:rPr>
-              <a:t>(“Thread is running”);</a:t>
-            </a:r>
-          </a:p>
-          <a:p>
-            <a:r>
-              <a:rPr lang="en-PH" sz="2500" dirty="0">
-                <a:latin typeface="Consolas" panose="020B0609020204030204" pitchFamily="49" charset="0"/>
-              </a:rPr>
-              <a:t>}</a:t>
-            </a:r>
-          </a:p>
-          <a:p>
-            <a:endParaRPr lang="en-PH" sz="2500" dirty="0"/>
-          </a:p>
-        </p:txBody>
-      </p:sp>
-    </p:spTree>
-    <p:extLst>
-      <p:ext uri="{BB962C8B-B14F-4D97-AF65-F5344CB8AC3E}">
-        <p14:creationId xmlns:p14="http://schemas.microsoft.com/office/powerpoint/2010/main" val="55429838"/>
-      </p:ext>
-    </p:extLst>
-  </p:cSld>
-  <p:clrMapOvr>
-    <a:masterClrMapping/>
-  </p:clrMapOvr>
-  <p:timing>
-    <p:tnLst>
-      <p:par>
-        <p:cTn id="1" dur="indefinite" restart="never" nodeType="tmRoot">
-          <p:childTnLst>
-            <p:seq concurrent="1" nextAc="seek">
-              <p:cTn id="2" dur="indefinite" nodeType="mainSeq">
-                <p:childTnLst>
-                  <p:par>
-                    <p:cTn id="3" fill="hold">
-                      <p:stCondLst>
-                        <p:cond delay="indefinite"/>
-                      </p:stCondLst>
-                      <p:childTnLst>
-                        <p:par>
-                          <p:cTn id="4" fill="hold">
-                            <p:stCondLst>
-                              <p:cond delay="0"/>
-                            </p:stCondLst>
-                            <p:childTnLst>
-                              <p:par>
-                                <p:cTn id="5" presetID="14" presetClass="entr" presetSubtype="10" fill="hold" grpId="0" nodeType="clickEffect">
-                                  <p:stCondLst>
-                                    <p:cond delay="0"/>
-                                  </p:stCondLst>
-                                  <p:childTnLst>
-                                    <p:set>
-                                      <p:cBhvr>
-                                        <p:cTn id="6" dur="1" fill="hold">
-                                          <p:stCondLst>
-                                            <p:cond delay="0"/>
-                                          </p:stCondLst>
-                                        </p:cTn>
-                                        <p:tgtEl>
-                                          <p:spTgt spid="5"/>
-                                        </p:tgtEl>
-                                        <p:attrNameLst>
-                                          <p:attrName>style.visibility</p:attrName>
-                                        </p:attrNameLst>
-                                      </p:cBhvr>
-                                      <p:to>
-                                        <p:strVal val="visible"/>
-                                      </p:to>
-                                    </p:set>
-                                    <p:animEffect transition="in" filter="randombar(horizontal)">
-                                      <p:cBhvr>
-                                        <p:cTn id="7" dur="500"/>
-                                        <p:tgtEl>
-                                          <p:spTgt spid="5"/>
-                                        </p:tgtEl>
-                                      </p:cBhvr>
-                                    </p:animEffect>
-                                  </p:childTnLst>
-                                </p:cTn>
-                              </p:par>
-                              <p:par>
-                                <p:cTn id="8" presetID="42" presetClass="entr" presetSubtype="0" fill="hold" grpId="0" nodeType="withEffect">
-                                  <p:stCondLst>
-                                    <p:cond delay="0"/>
-                                  </p:stCondLst>
-                                  <p:childTnLst>
-                                    <p:set>
-                                      <p:cBhvr>
-                                        <p:cTn id="9" dur="1" fill="hold">
-                                          <p:stCondLst>
-                                            <p:cond delay="0"/>
-                                          </p:stCondLst>
-                                        </p:cTn>
-                                        <p:tgtEl>
-                                          <p:spTgt spid="9"/>
-                                        </p:tgtEl>
-                                        <p:attrNameLst>
-                                          <p:attrName>style.visibility</p:attrName>
-                                        </p:attrNameLst>
-                                      </p:cBhvr>
-                                      <p:to>
-                                        <p:strVal val="visible"/>
-                                      </p:to>
-                                    </p:set>
-                                    <p:animEffect transition="in" filter="fade">
-                                      <p:cBhvr>
-                                        <p:cTn id="10" dur="1000"/>
-                                        <p:tgtEl>
-                                          <p:spTgt spid="9"/>
-                                        </p:tgtEl>
-                                      </p:cBhvr>
-                                    </p:animEffect>
-                                    <p:anim calcmode="lin" valueType="num">
-                                      <p:cBhvr>
-                                        <p:cTn id="11" dur="1000" fill="hold"/>
-                                        <p:tgtEl>
-                                          <p:spTgt spid="9"/>
-                                        </p:tgtEl>
-                                        <p:attrNameLst>
-                                          <p:attrName>ppt_x</p:attrName>
-                                        </p:attrNameLst>
-                                      </p:cBhvr>
-                                      <p:tavLst>
-                                        <p:tav tm="0">
-                                          <p:val>
-                                            <p:strVal val="#ppt_x"/>
-                                          </p:val>
-                                        </p:tav>
-                                        <p:tav tm="100000">
-                                          <p:val>
-                                            <p:strVal val="#ppt_x"/>
-                                          </p:val>
-                                        </p:tav>
-                                      </p:tavLst>
-                                    </p:anim>
-                                    <p:anim calcmode="lin" valueType="num">
-                                      <p:cBhvr>
-                                        <p:cTn id="12" dur="1000" fill="hold"/>
-                                        <p:tgtEl>
-                                          <p:spTgt spid="9"/>
-                                        </p:tgtEl>
-                                        <p:attrNameLst>
-                                          <p:attrName>ppt_y</p:attrName>
-                                        </p:attrNameLst>
-                                      </p:cBhvr>
-                                      <p:tavLst>
-                                        <p:tav tm="0">
-                                          <p:val>
-                                            <p:strVal val="#ppt_y+.1"/>
-                                          </p:val>
-                                        </p:tav>
-                                        <p:tav tm="100000">
-                                          <p:val>
-                                            <p:strVal val="#ppt_y"/>
-                                          </p:val>
-                                        </p:tav>
-                                      </p:tavLst>
-                                    </p:anim>
-                                  </p:childTnLst>
-                                </p:cTn>
-                              </p:par>
-                            </p:childTnLst>
-                          </p:cTn>
-                        </p:par>
-                      </p:childTnLst>
-                    </p:cTn>
-                  </p:par>
-                  <p:par>
-                    <p:cTn id="13" fill="hold">
-                      <p:stCondLst>
-                        <p:cond delay="indefinite"/>
-                      </p:stCondLst>
-                      <p:childTnLst>
-                        <p:par>
-                          <p:cTn id="14" fill="hold">
-                            <p:stCondLst>
-                              <p:cond delay="0"/>
-                            </p:stCondLst>
-                            <p:childTnLst>
-                              <p:par>
-                                <p:cTn id="15" presetID="42" presetClass="entr" presetSubtype="0" fill="hold" grpId="0" nodeType="clickEffect">
-                                  <p:stCondLst>
-                                    <p:cond delay="0"/>
-                                  </p:stCondLst>
-                                  <p:childTnLst>
-                                    <p:set>
-                                      <p:cBhvr>
-                                        <p:cTn id="16" dur="1" fill="hold">
-                                          <p:stCondLst>
-                                            <p:cond delay="0"/>
-                                          </p:stCondLst>
-                                        </p:cTn>
-                                        <p:tgtEl>
-                                          <p:spTgt spid="10"/>
-                                        </p:tgtEl>
-                                        <p:attrNameLst>
-                                          <p:attrName>style.visibility</p:attrName>
-                                        </p:attrNameLst>
-                                      </p:cBhvr>
-                                      <p:to>
-                                        <p:strVal val="visible"/>
-                                      </p:to>
-                                    </p:set>
-                                    <p:animEffect transition="in" filter="fade">
-                                      <p:cBhvr>
-                                        <p:cTn id="17" dur="1000"/>
-                                        <p:tgtEl>
-                                          <p:spTgt spid="10"/>
-                                        </p:tgtEl>
-                                      </p:cBhvr>
-                                    </p:animEffect>
-                                    <p:anim calcmode="lin" valueType="num">
-                                      <p:cBhvr>
-                                        <p:cTn id="18" dur="1000" fill="hold"/>
-                                        <p:tgtEl>
-                                          <p:spTgt spid="10"/>
-                                        </p:tgtEl>
-                                        <p:attrNameLst>
-                                          <p:attrName>ppt_x</p:attrName>
-                                        </p:attrNameLst>
-                                      </p:cBhvr>
-                                      <p:tavLst>
-                                        <p:tav tm="0">
-                                          <p:val>
-                                            <p:strVal val="#ppt_x"/>
-                                          </p:val>
-                                        </p:tav>
-                                        <p:tav tm="100000">
-                                          <p:val>
-                                            <p:strVal val="#ppt_x"/>
-                                          </p:val>
-                                        </p:tav>
-                                      </p:tavLst>
-                                    </p:anim>
-                                    <p:anim calcmode="lin" valueType="num">
-                                      <p:cBhvr>
-                                        <p:cTn id="19" dur="1000" fill="hold"/>
-                                        <p:tgtEl>
-                                          <p:spTgt spid="10"/>
-                                        </p:tgtEl>
-                                        <p:attrNameLst>
-                                          <p:attrName>ppt_y</p:attrName>
-                                        </p:attrNameLst>
-                                      </p:cBhvr>
-                                      <p:tavLst>
-                                        <p:tav tm="0">
-                                          <p:val>
-                                            <p:strVal val="#ppt_y+.1"/>
-                                          </p:val>
-                                        </p:tav>
-                                        <p:tav tm="100000">
-                                          <p:val>
-                                            <p:strVal val="#ppt_y"/>
-                                          </p:val>
-                                        </p:tav>
-                                      </p:tavLst>
-                                    </p:anim>
-                                  </p:childTnLst>
-                                </p:cTn>
-                              </p:par>
-                            </p:childTnLst>
-                          </p:cTn>
-                        </p:par>
-                      </p:childTnLst>
-                    </p:cTn>
-                  </p:par>
-                </p:childTnLst>
-              </p:cTn>
-              <p:prevCondLst>
-                <p:cond evt="onPrev" delay="0">
-                  <p:tgtEl>
-                    <p:sldTgt/>
-                  </p:tgtEl>
-                </p:cond>
-              </p:prevCondLst>
-              <p:nextCondLst>
-                <p:cond evt="onNext" delay="0">
-                  <p:tgtEl>
-                    <p:sldTgt/>
-                  </p:tgtEl>
-                </p:cond>
-              </p:nextCondLst>
-            </p:seq>
-          </p:childTnLst>
-        </p:cTn>
-      </p:par>
-    </p:tnLst>
-    <p:bldLst>
-      <p:bldP spid="5" grpId="0"/>
-      <p:bldP spid="9" grpId="0"/>
-      <p:bldP spid="10" grpId="0"/>
-    </p:bldLst>
-  </p:timing>
-</p:sld>
-</file>
-
-<file path=ppt/slides/slide9.xml><?xml version="1.0" encoding="utf-8"?>
-<p:sld xmlns:a="http://schemas.openxmlformats.org/drawingml/2006/main" xmlns:r="http://schemas.openxmlformats.org/officeDocument/2006/relationships" xmlns:p="http://schemas.openxmlformats.org/presentationml/2006/main">
-  <p:cSld>
-    <p:bg>
-      <p:bgPr>
-        <a:blipFill dpi="0" rotWithShape="1">
-          <a:blip r:embed="rId3">
-            <a:alphaModFix amt="99000"/>
-            <a:lum/>
-          </a:blip>
-          <a:srcRect/>
-          <a:stretch>
-            <a:fillRect t="89000" r="85000" b="-1000"/>
-          </a:stretch>
-        </a:blipFill>
-        <a:effectLst/>
-      </p:bgPr>
-    </p:bg>
-    <p:spTree>
-      <p:nvGrpSpPr>
-        <p:cNvPr id="1" name=""/>
-        <p:cNvGrpSpPr/>
-        <p:nvPr/>
-      </p:nvGrpSpPr>
-      <p:grpSpPr>
-        <a:xfrm>
-          <a:off x="0" y="0"/>
-          <a:ext cx="0" cy="0"/>
-          <a:chOff x="0" y="0"/>
-          <a:chExt cx="0" cy="0"/>
-        </a:xfrm>
-      </p:grpSpPr>
-      <p:sp>
-        <p:nvSpPr>
-          <p:cNvPr id="2" name="Title 1">
-            <a:extLst>
-              <a:ext uri="{FF2B5EF4-FFF2-40B4-BE49-F238E27FC236}">
-                <a16:creationId xmlns:a16="http://schemas.microsoft.com/office/drawing/2014/main" id="{6A3DCE86-C2BA-4713-9E7A-73589E8D6CCF}"/>
-              </a:ext>
-            </a:extLst>
-          </p:cNvPr>
-          <p:cNvSpPr>
-            <a:spLocks noGrp="1"/>
-          </p:cNvSpPr>
-          <p:nvPr>
-            <p:ph type="ctrTitle"/>
-          </p:nvPr>
-        </p:nvSpPr>
-        <p:spPr>
-          <a:xfrm>
-            <a:off x="1524000" y="497150"/>
-            <a:ext cx="9144000" cy="718459"/>
-          </a:xfrm>
-        </p:spPr>
-        <p:txBody>
-          <a:bodyPr>
-            <a:normAutofit fontScale="90000"/>
-          </a:bodyPr>
-          <a:lstStyle/>
-          <a:p>
-            <a:r>
-              <a:rPr lang="en-PH" b="1" dirty="0"/>
-              <a:t>Thread Lifecycle</a:t>
-            </a:r>
-          </a:p>
-        </p:txBody>
-      </p:sp>
-      <p:sp>
-        <p:nvSpPr>
-          <p:cNvPr id="4" name="Footer Placeholder 3">
-            <a:extLst>
-              <a:ext uri="{FF2B5EF4-FFF2-40B4-BE49-F238E27FC236}">
-                <a16:creationId xmlns:a16="http://schemas.microsoft.com/office/drawing/2014/main" id="{638E7DE1-45EE-476A-A474-0F3C264AEDA3}"/>
-              </a:ext>
-            </a:extLst>
-          </p:cNvPr>
-          <p:cNvSpPr>
-            <a:spLocks noGrp="1"/>
-          </p:cNvSpPr>
-          <p:nvPr>
-            <p:ph type="ftr" sz="quarter" idx="11"/>
-          </p:nvPr>
-        </p:nvSpPr>
-        <p:spPr>
-          <a:xfrm>
-            <a:off x="0" y="6139541"/>
-            <a:ext cx="12192000" cy="718459"/>
-          </a:xfrm>
-          <a:ln w="28575">
-            <a:solidFill>
-              <a:schemeClr val="accent5">
-                <a:lumMod val="50000"/>
-              </a:schemeClr>
-            </a:solidFill>
-          </a:ln>
-        </p:spPr>
-        <p:txBody>
-          <a:bodyPr/>
-          <a:lstStyle/>
-          <a:p>
-            <a:pPr algn="r"/>
-            <a:r>
-              <a:rPr lang="en-PH" b="1">
-                <a:solidFill>
-                  <a:schemeClr val="tx1"/>
-                </a:solidFill>
-              </a:rPr>
-              <a:t>CCPRGG2L</a:t>
-            </a:r>
-            <a:endParaRPr lang="en-PH" dirty="0"/>
-          </a:p>
-        </p:txBody>
-      </p:sp>
-      <p:sp>
-        <p:nvSpPr>
-          <p:cNvPr id="5" name="Rectangle 4">
-            <a:extLst>
-              <a:ext uri="{FF2B5EF4-FFF2-40B4-BE49-F238E27FC236}">
-                <a16:creationId xmlns:a16="http://schemas.microsoft.com/office/drawing/2014/main" id="{59E25336-F742-2A51-E156-CD38D257A34C}"/>
-              </a:ext>
-            </a:extLst>
-          </p:cNvPr>
-          <p:cNvSpPr/>
-          <p:nvPr/>
-        </p:nvSpPr>
-        <p:spPr>
-          <a:xfrm>
-            <a:off x="2605899" y="1285559"/>
-            <a:ext cx="1129619" cy="619129"/>
-          </a:xfrm>
-          <a:prstGeom prst="rect">
-            <a:avLst/>
-          </a:prstGeom>
-        </p:spPr>
-        <p:style>
-          <a:lnRef idx="0">
-            <a:schemeClr val="accent6"/>
-          </a:lnRef>
-          <a:fillRef idx="3">
-            <a:schemeClr val="accent6"/>
-          </a:fillRef>
-          <a:effectRef idx="3">
-            <a:schemeClr val="accent6"/>
-          </a:effectRef>
-          <a:fontRef idx="minor">
-            <a:schemeClr val="lt1"/>
-          </a:fontRef>
-        </p:style>
-        <p:txBody>
-          <a:bodyPr rtlCol="0" anchor="ctr"/>
-          <a:lstStyle/>
-          <a:p>
-            <a:pPr algn="ctr"/>
-            <a:r>
-              <a:rPr lang="en-PH" b="1" dirty="0"/>
-              <a:t>New</a:t>
-            </a:r>
-          </a:p>
-        </p:txBody>
-      </p:sp>
-      <p:sp>
-        <p:nvSpPr>
-          <p:cNvPr id="6" name="Rectangle 5">
-            <a:extLst>
-              <a:ext uri="{FF2B5EF4-FFF2-40B4-BE49-F238E27FC236}">
-                <a16:creationId xmlns:a16="http://schemas.microsoft.com/office/drawing/2014/main" id="{94B8E03B-83F4-366A-5F3E-8915C16FC5BE}"/>
-              </a:ext>
-            </a:extLst>
-          </p:cNvPr>
-          <p:cNvSpPr/>
-          <p:nvPr/>
-        </p:nvSpPr>
-        <p:spPr>
-          <a:xfrm>
-            <a:off x="8702633" y="2971800"/>
-            <a:ext cx="1805049" cy="914400"/>
-          </a:xfrm>
-          <a:prstGeom prst="rect">
-            <a:avLst/>
-          </a:prstGeom>
-        </p:spPr>
-        <p:style>
-          <a:lnRef idx="0">
-            <a:schemeClr val="accent2"/>
-          </a:lnRef>
-          <a:fillRef idx="3">
-            <a:schemeClr val="accent2"/>
-          </a:fillRef>
-          <a:effectRef idx="3">
-            <a:schemeClr val="accent2"/>
-          </a:effectRef>
-          <a:fontRef idx="minor">
-            <a:schemeClr val="lt1"/>
-          </a:fontRef>
-        </p:style>
-        <p:txBody>
-          <a:bodyPr rtlCol="0" anchor="ctr"/>
-          <a:lstStyle/>
-          <a:p>
-            <a:pPr algn="ctr"/>
-            <a:r>
-              <a:rPr lang="en-PH" b="1" dirty="0"/>
-              <a:t>Dead</a:t>
-            </a:r>
-          </a:p>
-        </p:txBody>
-      </p:sp>
-      <p:sp>
-        <p:nvSpPr>
-          <p:cNvPr id="7" name="Oval 6">
-            <a:extLst>
-              <a:ext uri="{FF2B5EF4-FFF2-40B4-BE49-F238E27FC236}">
-                <a16:creationId xmlns:a16="http://schemas.microsoft.com/office/drawing/2014/main" id="{191092CE-C273-8F9D-F367-2D97D2D2EABA}"/>
-              </a:ext>
-            </a:extLst>
-          </p:cNvPr>
-          <p:cNvSpPr/>
-          <p:nvPr/>
-        </p:nvSpPr>
-        <p:spPr>
-          <a:xfrm>
-            <a:off x="2396878" y="2520820"/>
-            <a:ext cx="1555502" cy="718459"/>
-          </a:xfrm>
-          <a:prstGeom prst="ellipse">
-            <a:avLst/>
-          </a:prstGeom>
-        </p:spPr>
-        <p:style>
-          <a:lnRef idx="0">
-            <a:schemeClr val="accent5"/>
-          </a:lnRef>
-          <a:fillRef idx="3">
-            <a:schemeClr val="accent5"/>
-          </a:fillRef>
-          <a:effectRef idx="3">
-            <a:schemeClr val="accent5"/>
-          </a:effectRef>
-          <a:fontRef idx="minor">
-            <a:schemeClr val="lt1"/>
-          </a:fontRef>
-        </p:style>
-        <p:txBody>
-          <a:bodyPr rtlCol="0" anchor="ctr"/>
-          <a:lstStyle/>
-          <a:p>
-            <a:pPr algn="ctr"/>
-            <a:r>
-              <a:rPr lang="en-PH" b="1" dirty="0"/>
-              <a:t>Runnable</a:t>
-            </a:r>
-          </a:p>
-        </p:txBody>
-      </p:sp>
-      <p:sp>
-        <p:nvSpPr>
-          <p:cNvPr id="8" name="Oval 7">
-            <a:extLst>
-              <a:ext uri="{FF2B5EF4-FFF2-40B4-BE49-F238E27FC236}">
-                <a16:creationId xmlns:a16="http://schemas.microsoft.com/office/drawing/2014/main" id="{158CB72E-5EAF-B750-10DD-DBA406F6F475}"/>
-              </a:ext>
-            </a:extLst>
-          </p:cNvPr>
-          <p:cNvSpPr/>
-          <p:nvPr/>
-        </p:nvSpPr>
-        <p:spPr>
-          <a:xfrm>
-            <a:off x="2396878" y="3698558"/>
-            <a:ext cx="1555502" cy="817529"/>
-          </a:xfrm>
-          <a:prstGeom prst="ellipse">
-            <a:avLst/>
-          </a:prstGeom>
-        </p:spPr>
-        <p:style>
-          <a:lnRef idx="0">
-            <a:schemeClr val="accent1"/>
-          </a:lnRef>
-          <a:fillRef idx="3">
-            <a:schemeClr val="accent1"/>
-          </a:fillRef>
-          <a:effectRef idx="3">
-            <a:schemeClr val="accent1"/>
-          </a:effectRef>
-          <a:fontRef idx="minor">
-            <a:schemeClr val="lt1"/>
-          </a:fontRef>
-        </p:style>
-        <p:txBody>
-          <a:bodyPr rtlCol="0" anchor="ctr"/>
-          <a:lstStyle/>
-          <a:p>
-            <a:pPr algn="ctr"/>
-            <a:r>
-              <a:rPr lang="en-PH" b="1" dirty="0"/>
-              <a:t>Running</a:t>
-            </a:r>
-          </a:p>
-        </p:txBody>
-      </p:sp>
-      <p:sp>
-        <p:nvSpPr>
-          <p:cNvPr id="10" name="Rectangle 9">
-            <a:extLst>
-              <a:ext uri="{FF2B5EF4-FFF2-40B4-BE49-F238E27FC236}">
-                <a16:creationId xmlns:a16="http://schemas.microsoft.com/office/drawing/2014/main" id="{B2B7BF79-17F2-1225-73A3-55F86D84F26C}"/>
-              </a:ext>
-            </a:extLst>
-          </p:cNvPr>
-          <p:cNvSpPr/>
-          <p:nvPr/>
-        </p:nvSpPr>
-        <p:spPr>
-          <a:xfrm>
-            <a:off x="2552663" y="5179359"/>
-            <a:ext cx="1236089" cy="692703"/>
-          </a:xfrm>
-          <a:prstGeom prst="rect">
-            <a:avLst/>
-          </a:prstGeom>
-        </p:spPr>
-        <p:style>
-          <a:lnRef idx="0">
-            <a:schemeClr val="accent4"/>
-          </a:lnRef>
-          <a:fillRef idx="3">
-            <a:schemeClr val="accent4"/>
-          </a:fillRef>
-          <a:effectRef idx="3">
-            <a:schemeClr val="accent4"/>
-          </a:effectRef>
-          <a:fontRef idx="minor">
-            <a:schemeClr val="lt1"/>
-          </a:fontRef>
-        </p:style>
-        <p:txBody>
-          <a:bodyPr rtlCol="0" anchor="ctr"/>
-          <a:lstStyle/>
-          <a:p>
-            <a:pPr algn="ctr"/>
-            <a:r>
-              <a:rPr lang="en-PH" b="1" dirty="0"/>
-              <a:t>Blocked</a:t>
-            </a:r>
-          </a:p>
-        </p:txBody>
-      </p:sp>
-      <p:cxnSp>
-        <p:nvCxnSpPr>
-          <p:cNvPr id="14" name="Straight Arrow Connector 13">
-            <a:extLst>
-              <a:ext uri="{FF2B5EF4-FFF2-40B4-BE49-F238E27FC236}">
-                <a16:creationId xmlns:a16="http://schemas.microsoft.com/office/drawing/2014/main" id="{6233C256-C5FF-1AA2-D5CC-A59B4D187191}"/>
-              </a:ext>
-            </a:extLst>
-          </p:cNvPr>
-          <p:cNvCxnSpPr>
-            <a:cxnSpLocks/>
-            <a:stCxn id="5" idx="3"/>
-            <a:endCxn id="6" idx="0"/>
-          </p:cNvCxnSpPr>
-          <p:nvPr/>
-        </p:nvCxnSpPr>
-        <p:spPr>
-          <a:xfrm>
-            <a:off x="3735518" y="1595124"/>
-            <a:ext cx="5869640" cy="1376676"/>
-          </a:xfrm>
-          <a:prstGeom prst="straightConnector1">
-            <a:avLst/>
-          </a:prstGeom>
-          <a:ln>
-            <a:tailEnd type="triangle"/>
-          </a:ln>
-        </p:spPr>
-        <p:style>
-          <a:lnRef idx="3">
-            <a:schemeClr val="dk1"/>
-          </a:lnRef>
-          <a:fillRef idx="0">
-            <a:schemeClr val="dk1"/>
-          </a:fillRef>
-          <a:effectRef idx="2">
-            <a:schemeClr val="dk1"/>
-          </a:effectRef>
-          <a:fontRef idx="minor">
-            <a:schemeClr val="tx1"/>
-          </a:fontRef>
-        </p:style>
-      </p:cxnSp>
-      <p:cxnSp>
-        <p:nvCxnSpPr>
-          <p:cNvPr id="15" name="Straight Arrow Connector 14">
-            <a:extLst>
-              <a:ext uri="{FF2B5EF4-FFF2-40B4-BE49-F238E27FC236}">
-                <a16:creationId xmlns:a16="http://schemas.microsoft.com/office/drawing/2014/main" id="{F7DF38A7-D745-23DA-9435-E2B98113B524}"/>
-              </a:ext>
-            </a:extLst>
-          </p:cNvPr>
-          <p:cNvCxnSpPr>
-            <a:cxnSpLocks/>
-            <a:stCxn id="7" idx="6"/>
-            <a:endCxn id="6" idx="1"/>
-          </p:cNvCxnSpPr>
-          <p:nvPr/>
-        </p:nvCxnSpPr>
-        <p:spPr>
-          <a:xfrm>
-            <a:off x="3952380" y="2880050"/>
-            <a:ext cx="4750253" cy="548950"/>
-          </a:xfrm>
-          <a:prstGeom prst="straightConnector1">
-            <a:avLst/>
-          </a:prstGeom>
-          <a:ln>
-            <a:tailEnd type="triangle"/>
-          </a:ln>
-        </p:spPr>
-        <p:style>
-          <a:lnRef idx="3">
-            <a:schemeClr val="dk1"/>
-          </a:lnRef>
-          <a:fillRef idx="0">
-            <a:schemeClr val="dk1"/>
-          </a:fillRef>
-          <a:effectRef idx="2">
-            <a:schemeClr val="dk1"/>
-          </a:effectRef>
-          <a:fontRef idx="minor">
-            <a:schemeClr val="tx1"/>
-          </a:fontRef>
-        </p:style>
-      </p:cxnSp>
-      <p:cxnSp>
-        <p:nvCxnSpPr>
-          <p:cNvPr id="18" name="Straight Arrow Connector 17">
-            <a:extLst>
-              <a:ext uri="{FF2B5EF4-FFF2-40B4-BE49-F238E27FC236}">
-                <a16:creationId xmlns:a16="http://schemas.microsoft.com/office/drawing/2014/main" id="{87EA7E24-AEA9-B57B-A06A-464ED7E6079A}"/>
-              </a:ext>
-            </a:extLst>
-          </p:cNvPr>
-          <p:cNvCxnSpPr>
-            <a:cxnSpLocks/>
-            <a:stCxn id="8" idx="6"/>
-            <a:endCxn id="6" idx="1"/>
-          </p:cNvCxnSpPr>
-          <p:nvPr/>
-        </p:nvCxnSpPr>
-        <p:spPr>
-          <a:xfrm flipV="1">
-            <a:off x="3952380" y="3429000"/>
-            <a:ext cx="4750253" cy="678323"/>
-          </a:xfrm>
-          <a:prstGeom prst="straightConnector1">
-            <a:avLst/>
-          </a:prstGeom>
-          <a:ln>
-            <a:tailEnd type="triangle"/>
-          </a:ln>
-        </p:spPr>
-        <p:style>
-          <a:lnRef idx="3">
-            <a:schemeClr val="dk1"/>
-          </a:lnRef>
-          <a:fillRef idx="0">
-            <a:schemeClr val="dk1"/>
-          </a:fillRef>
-          <a:effectRef idx="2">
-            <a:schemeClr val="dk1"/>
-          </a:effectRef>
-          <a:fontRef idx="minor">
-            <a:schemeClr val="tx1"/>
-          </a:fontRef>
-        </p:style>
-      </p:cxnSp>
-      <p:cxnSp>
-        <p:nvCxnSpPr>
-          <p:cNvPr id="21" name="Straight Arrow Connector 20">
-            <a:extLst>
-              <a:ext uri="{FF2B5EF4-FFF2-40B4-BE49-F238E27FC236}">
-                <a16:creationId xmlns:a16="http://schemas.microsoft.com/office/drawing/2014/main" id="{B7420DA8-E91C-B7CF-54D1-40F24D06282E}"/>
-              </a:ext>
-            </a:extLst>
-          </p:cNvPr>
-          <p:cNvCxnSpPr>
-            <a:cxnSpLocks/>
-            <a:stCxn id="10" idx="3"/>
-            <a:endCxn id="6" idx="2"/>
-          </p:cNvCxnSpPr>
-          <p:nvPr/>
-        </p:nvCxnSpPr>
-        <p:spPr>
-          <a:xfrm flipV="1">
-            <a:off x="3788752" y="3886200"/>
-            <a:ext cx="5816406" cy="1639511"/>
-          </a:xfrm>
-          <a:prstGeom prst="straightConnector1">
-            <a:avLst/>
-          </a:prstGeom>
-          <a:ln>
-            <a:tailEnd type="triangle"/>
-          </a:ln>
-        </p:spPr>
-        <p:style>
-          <a:lnRef idx="3">
-            <a:schemeClr val="dk1"/>
-          </a:lnRef>
-          <a:fillRef idx="0">
-            <a:schemeClr val="dk1"/>
-          </a:fillRef>
-          <a:effectRef idx="2">
-            <a:schemeClr val="dk1"/>
-          </a:effectRef>
-          <a:fontRef idx="minor">
-            <a:schemeClr val="tx1"/>
-          </a:fontRef>
-        </p:style>
-      </p:cxnSp>
-      <p:cxnSp>
-        <p:nvCxnSpPr>
-          <p:cNvPr id="24" name="Straight Arrow Connector 23">
-            <a:extLst>
-              <a:ext uri="{FF2B5EF4-FFF2-40B4-BE49-F238E27FC236}">
-                <a16:creationId xmlns:a16="http://schemas.microsoft.com/office/drawing/2014/main" id="{5142F068-7ECF-7183-CA8C-A2501E7AA624}"/>
-              </a:ext>
-            </a:extLst>
-          </p:cNvPr>
-          <p:cNvCxnSpPr>
-            <a:cxnSpLocks/>
-            <a:stCxn id="5" idx="2"/>
-            <a:endCxn id="7" idx="0"/>
-          </p:cNvCxnSpPr>
-          <p:nvPr/>
-        </p:nvCxnSpPr>
-        <p:spPr>
-          <a:xfrm>
-            <a:off x="3170709" y="1904688"/>
-            <a:ext cx="3920" cy="616132"/>
-          </a:xfrm>
-          <a:prstGeom prst="straightConnector1">
-            <a:avLst/>
-          </a:prstGeom>
-          <a:ln>
-            <a:tailEnd type="triangle"/>
-          </a:ln>
-        </p:spPr>
-        <p:style>
-          <a:lnRef idx="3">
-            <a:schemeClr val="dk1"/>
-          </a:lnRef>
-          <a:fillRef idx="0">
-            <a:schemeClr val="dk1"/>
-          </a:fillRef>
-          <a:effectRef idx="2">
-            <a:schemeClr val="dk1"/>
-          </a:effectRef>
-          <a:fontRef idx="minor">
-            <a:schemeClr val="tx1"/>
-          </a:fontRef>
-        </p:style>
-      </p:cxnSp>
-      <p:cxnSp>
-        <p:nvCxnSpPr>
-          <p:cNvPr id="27" name="Straight Arrow Connector 26">
-            <a:extLst>
-              <a:ext uri="{FF2B5EF4-FFF2-40B4-BE49-F238E27FC236}">
-                <a16:creationId xmlns:a16="http://schemas.microsoft.com/office/drawing/2014/main" id="{BA5BB82E-C828-3452-084F-DEF6D3B2B53E}"/>
-              </a:ext>
-            </a:extLst>
-          </p:cNvPr>
-          <p:cNvCxnSpPr>
-            <a:cxnSpLocks/>
-            <a:stCxn id="7" idx="4"/>
-            <a:endCxn id="8" idx="0"/>
-          </p:cNvCxnSpPr>
-          <p:nvPr/>
-        </p:nvCxnSpPr>
-        <p:spPr>
-          <a:xfrm>
-            <a:off x="3174629" y="3239279"/>
-            <a:ext cx="0" cy="459279"/>
-          </a:xfrm>
-          <a:prstGeom prst="straightConnector1">
-            <a:avLst/>
-          </a:prstGeom>
-          <a:ln>
-            <a:tailEnd type="triangle"/>
-          </a:ln>
-        </p:spPr>
-        <p:style>
-          <a:lnRef idx="3">
-            <a:schemeClr val="dk1"/>
-          </a:lnRef>
-          <a:fillRef idx="0">
-            <a:schemeClr val="dk1"/>
-          </a:fillRef>
-          <a:effectRef idx="2">
-            <a:schemeClr val="dk1"/>
-          </a:effectRef>
-          <a:fontRef idx="minor">
-            <a:schemeClr val="tx1"/>
-          </a:fontRef>
-        </p:style>
-      </p:cxnSp>
-      <p:cxnSp>
-        <p:nvCxnSpPr>
-          <p:cNvPr id="30" name="Straight Arrow Connector 29">
-            <a:extLst>
-              <a:ext uri="{FF2B5EF4-FFF2-40B4-BE49-F238E27FC236}">
-                <a16:creationId xmlns:a16="http://schemas.microsoft.com/office/drawing/2014/main" id="{4D9B11F8-EC81-6191-D87D-9EF752D7A51A}"/>
-              </a:ext>
-            </a:extLst>
-          </p:cNvPr>
-          <p:cNvCxnSpPr>
-            <a:cxnSpLocks/>
-            <a:stCxn id="8" idx="4"/>
-            <a:endCxn id="10" idx="0"/>
-          </p:cNvCxnSpPr>
-          <p:nvPr/>
-        </p:nvCxnSpPr>
-        <p:spPr>
-          <a:xfrm flipH="1">
-            <a:off x="3170708" y="4516087"/>
-            <a:ext cx="3921" cy="663272"/>
-          </a:xfrm>
-          <a:prstGeom prst="straightConnector1">
-            <a:avLst/>
-          </a:prstGeom>
-          <a:ln>
-            <a:tailEnd type="triangle"/>
-          </a:ln>
-        </p:spPr>
-        <p:style>
-          <a:lnRef idx="3">
-            <a:schemeClr val="dk1"/>
-          </a:lnRef>
-          <a:fillRef idx="0">
-            <a:schemeClr val="dk1"/>
-          </a:fillRef>
-          <a:effectRef idx="2">
-            <a:schemeClr val="dk1"/>
-          </a:effectRef>
-          <a:fontRef idx="minor">
-            <a:schemeClr val="tx1"/>
-          </a:fontRef>
-        </p:style>
-      </p:cxnSp>
-      <p:sp>
-        <p:nvSpPr>
-          <p:cNvPr id="33" name="TextBox 32">
-            <a:extLst>
-              <a:ext uri="{FF2B5EF4-FFF2-40B4-BE49-F238E27FC236}">
-                <a16:creationId xmlns:a16="http://schemas.microsoft.com/office/drawing/2014/main" id="{A5534606-8CF7-231E-BEB8-DA9A882E0DCB}"/>
-              </a:ext>
-            </a:extLst>
-          </p:cNvPr>
-          <p:cNvSpPr txBox="1"/>
-          <p:nvPr/>
-        </p:nvSpPr>
-        <p:spPr>
-          <a:xfrm>
-            <a:off x="6594954" y="1961847"/>
-            <a:ext cx="742511" cy="369332"/>
-          </a:xfrm>
-          <a:prstGeom prst="rect">
-            <a:avLst/>
-          </a:prstGeom>
-          <a:noFill/>
-        </p:spPr>
-        <p:txBody>
-          <a:bodyPr wrap="none" rtlCol="0">
-            <a:spAutoFit/>
-          </a:bodyPr>
-          <a:lstStyle/>
-          <a:p>
-            <a:r>
-              <a:rPr lang="en-PH" b="1" dirty="0"/>
-              <a:t>stop()</a:t>
-            </a:r>
-          </a:p>
-        </p:txBody>
-      </p:sp>
-      <p:sp>
-        <p:nvSpPr>
-          <p:cNvPr id="35" name="TextBox 34">
-            <a:extLst>
-              <a:ext uri="{FF2B5EF4-FFF2-40B4-BE49-F238E27FC236}">
-                <a16:creationId xmlns:a16="http://schemas.microsoft.com/office/drawing/2014/main" id="{765DE7DD-29D7-A767-3E63-267E9AB116F5}"/>
-              </a:ext>
-            </a:extLst>
-          </p:cNvPr>
-          <p:cNvSpPr txBox="1"/>
-          <p:nvPr/>
-        </p:nvSpPr>
-        <p:spPr>
-          <a:xfrm>
-            <a:off x="5852443" y="2790110"/>
-            <a:ext cx="742511" cy="369332"/>
-          </a:xfrm>
-          <a:prstGeom prst="rect">
-            <a:avLst/>
-          </a:prstGeom>
-          <a:noFill/>
-        </p:spPr>
-        <p:txBody>
-          <a:bodyPr wrap="none" rtlCol="0">
-            <a:spAutoFit/>
-          </a:bodyPr>
-          <a:lstStyle/>
-          <a:p>
-            <a:r>
-              <a:rPr lang="en-PH" b="1" dirty="0"/>
-              <a:t>stop()</a:t>
-            </a:r>
-          </a:p>
-        </p:txBody>
-      </p:sp>
-      <p:sp>
-        <p:nvSpPr>
-          <p:cNvPr id="36" name="TextBox 35">
-            <a:extLst>
-              <a:ext uri="{FF2B5EF4-FFF2-40B4-BE49-F238E27FC236}">
-                <a16:creationId xmlns:a16="http://schemas.microsoft.com/office/drawing/2014/main" id="{43D148DD-C26E-01E3-696A-96C359685AD0}"/>
-              </a:ext>
-            </a:extLst>
-          </p:cNvPr>
-          <p:cNvSpPr txBox="1"/>
-          <p:nvPr/>
-        </p:nvSpPr>
-        <p:spPr>
-          <a:xfrm>
-            <a:off x="5363045" y="3903354"/>
-            <a:ext cx="1776961" cy="369332"/>
-          </a:xfrm>
-          <a:prstGeom prst="rect">
-            <a:avLst/>
-          </a:prstGeom>
-          <a:noFill/>
-        </p:spPr>
-        <p:txBody>
-          <a:bodyPr wrap="none" rtlCol="0">
-            <a:spAutoFit/>
-          </a:bodyPr>
-          <a:lstStyle/>
-          <a:p>
-            <a:r>
-              <a:rPr lang="en-PH" b="1" dirty="0"/>
-              <a:t>End of execution</a:t>
-            </a:r>
-          </a:p>
-        </p:txBody>
-      </p:sp>
-      <p:sp>
-        <p:nvSpPr>
-          <p:cNvPr id="37" name="TextBox 36">
-            <a:extLst>
-              <a:ext uri="{FF2B5EF4-FFF2-40B4-BE49-F238E27FC236}">
-                <a16:creationId xmlns:a16="http://schemas.microsoft.com/office/drawing/2014/main" id="{4D5969A6-B9D4-457C-BD46-B84ED8D117BF}"/>
-              </a:ext>
-            </a:extLst>
-          </p:cNvPr>
-          <p:cNvSpPr txBox="1"/>
-          <p:nvPr/>
-        </p:nvSpPr>
-        <p:spPr>
-          <a:xfrm>
-            <a:off x="6594954" y="4693879"/>
-            <a:ext cx="742511" cy="369332"/>
-          </a:xfrm>
-          <a:prstGeom prst="rect">
-            <a:avLst/>
-          </a:prstGeom>
-          <a:noFill/>
-        </p:spPr>
-        <p:txBody>
-          <a:bodyPr wrap="none" rtlCol="0">
-            <a:spAutoFit/>
-          </a:bodyPr>
-          <a:lstStyle/>
-          <a:p>
-            <a:r>
-              <a:rPr lang="en-PH" b="1" dirty="0"/>
-              <a:t>stop()</a:t>
-            </a:r>
-          </a:p>
-        </p:txBody>
-      </p:sp>
-      <p:sp>
-        <p:nvSpPr>
-          <p:cNvPr id="70" name="TextBox 69">
-            <a:extLst>
-              <a:ext uri="{FF2B5EF4-FFF2-40B4-BE49-F238E27FC236}">
-                <a16:creationId xmlns:a16="http://schemas.microsoft.com/office/drawing/2014/main" id="{93EFEF4A-E07A-0B8D-C96B-E6C30F4A56D6}"/>
-              </a:ext>
-            </a:extLst>
-          </p:cNvPr>
-          <p:cNvSpPr txBox="1"/>
-          <p:nvPr/>
-        </p:nvSpPr>
-        <p:spPr>
-          <a:xfrm>
-            <a:off x="3194709" y="1987058"/>
-            <a:ext cx="771365" cy="369332"/>
-          </a:xfrm>
-          <a:prstGeom prst="rect">
-            <a:avLst/>
-          </a:prstGeom>
-          <a:noFill/>
-        </p:spPr>
-        <p:txBody>
-          <a:bodyPr wrap="none" rtlCol="0">
-            <a:spAutoFit/>
-          </a:bodyPr>
-          <a:lstStyle/>
-          <a:p>
-            <a:r>
-              <a:rPr lang="en-PH" b="1" dirty="0"/>
-              <a:t>start()</a:t>
-            </a:r>
-          </a:p>
-        </p:txBody>
-      </p:sp>
-      <p:sp>
-        <p:nvSpPr>
-          <p:cNvPr id="71" name="TextBox 70">
-            <a:extLst>
-              <a:ext uri="{FF2B5EF4-FFF2-40B4-BE49-F238E27FC236}">
-                <a16:creationId xmlns:a16="http://schemas.microsoft.com/office/drawing/2014/main" id="{2F53052E-B318-6452-122B-60ECC0AD24C1}"/>
-              </a:ext>
-            </a:extLst>
-          </p:cNvPr>
-          <p:cNvSpPr txBox="1"/>
-          <p:nvPr/>
-        </p:nvSpPr>
-        <p:spPr>
-          <a:xfrm>
-            <a:off x="3170708" y="3255517"/>
-            <a:ext cx="657552" cy="369332"/>
-          </a:xfrm>
-          <a:prstGeom prst="rect">
-            <a:avLst/>
-          </a:prstGeom>
-          <a:noFill/>
-        </p:spPr>
-        <p:txBody>
-          <a:bodyPr wrap="none" rtlCol="0">
-            <a:spAutoFit/>
-          </a:bodyPr>
-          <a:lstStyle/>
-          <a:p>
-            <a:r>
-              <a:rPr lang="en-PH" b="1" dirty="0"/>
-              <a:t>run()</a:t>
-            </a:r>
-          </a:p>
-        </p:txBody>
-      </p:sp>
-      <p:sp>
-        <p:nvSpPr>
-          <p:cNvPr id="72" name="TextBox 71">
-            <a:extLst>
-              <a:ext uri="{FF2B5EF4-FFF2-40B4-BE49-F238E27FC236}">
-                <a16:creationId xmlns:a16="http://schemas.microsoft.com/office/drawing/2014/main" id="{94164C64-14D9-D5EC-825F-87C2593F7284}"/>
-              </a:ext>
-            </a:extLst>
-          </p:cNvPr>
-          <p:cNvSpPr txBox="1"/>
-          <p:nvPr/>
-        </p:nvSpPr>
-        <p:spPr>
-          <a:xfrm>
-            <a:off x="3170708" y="4609731"/>
-            <a:ext cx="830677" cy="369332"/>
-          </a:xfrm>
-          <a:prstGeom prst="rect">
-            <a:avLst/>
-          </a:prstGeom>
-          <a:noFill/>
-        </p:spPr>
-        <p:txBody>
-          <a:bodyPr wrap="none" rtlCol="0">
-            <a:spAutoFit/>
-          </a:bodyPr>
-          <a:lstStyle/>
-          <a:p>
-            <a:r>
-              <a:rPr lang="en-PH" b="1" dirty="0"/>
-              <a:t>sleep()</a:t>
-            </a:r>
-          </a:p>
-        </p:txBody>
-      </p:sp>
-    </p:spTree>
-    <p:extLst>
-      <p:ext uri="{BB962C8B-B14F-4D97-AF65-F5344CB8AC3E}">
-        <p14:creationId xmlns:p14="http://schemas.microsoft.com/office/powerpoint/2010/main" val="4199068472"/>
-      </p:ext>
-    </p:extLst>
-  </p:cSld>
-  <p:clrMapOvr>
-    <a:masterClrMapping/>
-  </p:clrMapOvr>
 </p:sld>
 </file>
 

</xml_diff>